<commit_message>
big ai chapter rewrite
</commit_message>
<xml_diff>
--- a/figures/figures.pptx
+++ b/figures/figures.pptx
@@ -6,6 +6,8 @@
   </p:sldMasterIdLst>
   <p:sldIdLst>
     <p:sldId id="256" r:id="rId2"/>
+    <p:sldId id="257" r:id="rId3"/>
+    <p:sldId id="258" r:id="rId4"/>
   </p:sldIdLst>
   <p:sldSz cx="9144000" cy="6858000" type="screen4x3"/>
   <p:notesSz cx="6858000" cy="9144000"/>
@@ -288,7 +290,7 @@
           <a:p>
             <a:fld id="{AF8A4314-7EE0-3B48-A3CB-01AED7CBB16F}" type="datetimeFigureOut">
               <a:rPr lang="en-US" smtClean="0"/>
-              <a:t>10/1/12</a:t>
+              <a:t>10/26/12</a:t>
             </a:fld>
             <a:endParaRPr lang="en-US"/>
           </a:p>
@@ -458,7 +460,7 @@
           <a:p>
             <a:fld id="{AF8A4314-7EE0-3B48-A3CB-01AED7CBB16F}" type="datetimeFigureOut">
               <a:rPr lang="en-US" smtClean="0"/>
-              <a:t>10/1/12</a:t>
+              <a:t>10/26/12</a:t>
             </a:fld>
             <a:endParaRPr lang="en-US"/>
           </a:p>
@@ -638,7 +640,7 @@
           <a:p>
             <a:fld id="{AF8A4314-7EE0-3B48-A3CB-01AED7CBB16F}" type="datetimeFigureOut">
               <a:rPr lang="en-US" smtClean="0"/>
-              <a:t>10/1/12</a:t>
+              <a:t>10/26/12</a:t>
             </a:fld>
             <a:endParaRPr lang="en-US"/>
           </a:p>
@@ -808,7 +810,7 @@
           <a:p>
             <a:fld id="{AF8A4314-7EE0-3B48-A3CB-01AED7CBB16F}" type="datetimeFigureOut">
               <a:rPr lang="en-US" smtClean="0"/>
-              <a:t>10/1/12</a:t>
+              <a:t>10/26/12</a:t>
             </a:fld>
             <a:endParaRPr lang="en-US"/>
           </a:p>
@@ -1054,7 +1056,7 @@
           <a:p>
             <a:fld id="{AF8A4314-7EE0-3B48-A3CB-01AED7CBB16F}" type="datetimeFigureOut">
               <a:rPr lang="en-US" smtClean="0"/>
-              <a:t>10/1/12</a:t>
+              <a:t>10/26/12</a:t>
             </a:fld>
             <a:endParaRPr lang="en-US"/>
           </a:p>
@@ -1342,7 +1344,7 @@
           <a:p>
             <a:fld id="{AF8A4314-7EE0-3B48-A3CB-01AED7CBB16F}" type="datetimeFigureOut">
               <a:rPr lang="en-US" smtClean="0"/>
-              <a:t>10/1/12</a:t>
+              <a:t>10/26/12</a:t>
             </a:fld>
             <a:endParaRPr lang="en-US"/>
           </a:p>
@@ -1764,7 +1766,7 @@
           <a:p>
             <a:fld id="{AF8A4314-7EE0-3B48-A3CB-01AED7CBB16F}" type="datetimeFigureOut">
               <a:rPr lang="en-US" smtClean="0"/>
-              <a:t>10/1/12</a:t>
+              <a:t>10/26/12</a:t>
             </a:fld>
             <a:endParaRPr lang="en-US"/>
           </a:p>
@@ -1882,7 +1884,7 @@
           <a:p>
             <a:fld id="{AF8A4314-7EE0-3B48-A3CB-01AED7CBB16F}" type="datetimeFigureOut">
               <a:rPr lang="en-US" smtClean="0"/>
-              <a:t>10/1/12</a:t>
+              <a:t>10/26/12</a:t>
             </a:fld>
             <a:endParaRPr lang="en-US"/>
           </a:p>
@@ -1977,7 +1979,7 @@
           <a:p>
             <a:fld id="{AF8A4314-7EE0-3B48-A3CB-01AED7CBB16F}" type="datetimeFigureOut">
               <a:rPr lang="en-US" smtClean="0"/>
-              <a:t>10/1/12</a:t>
+              <a:t>10/26/12</a:t>
             </a:fld>
             <a:endParaRPr lang="en-US"/>
           </a:p>
@@ -2254,7 +2256,7 @@
           <a:p>
             <a:fld id="{AF8A4314-7EE0-3B48-A3CB-01AED7CBB16F}" type="datetimeFigureOut">
               <a:rPr lang="en-US" smtClean="0"/>
-              <a:t>10/1/12</a:t>
+              <a:t>10/26/12</a:t>
             </a:fld>
             <a:endParaRPr lang="en-US"/>
           </a:p>
@@ -2507,7 +2509,7 @@
           <a:p>
             <a:fld id="{AF8A4314-7EE0-3B48-A3CB-01AED7CBB16F}" type="datetimeFigureOut">
               <a:rPr lang="en-US" smtClean="0"/>
-              <a:t>10/1/12</a:t>
+              <a:t>10/26/12</a:t>
             </a:fld>
             <a:endParaRPr lang="en-US"/>
           </a:p>
@@ -2720,7 +2722,7 @@
           <a:p>
             <a:fld id="{AF8A4314-7EE0-3B48-A3CB-01AED7CBB16F}" type="datetimeFigureOut">
               <a:rPr lang="en-US" smtClean="0"/>
-              <a:t>10/1/12</a:t>
+              <a:t>10/26/12</a:t>
             </a:fld>
             <a:endParaRPr lang="en-US"/>
           </a:p>
@@ -3473,6 +3475,1044 @@
     <p:extLst>
       <p:ext uri="{BB962C8B-B14F-4D97-AF65-F5344CB8AC3E}">
         <p14:creationId xmlns:p14="http://schemas.microsoft.com/office/powerpoint/2010/main" val="4101819949"/>
+      </p:ext>
+    </p:extLst>
+  </p:cSld>
+  <p:clrMapOvr>
+    <a:masterClrMapping/>
+  </p:clrMapOvr>
+</p:sld>
+</file>
+
+<file path=ppt/slides/slide2.xml><?xml version="1.0" encoding="utf-8"?>
+<p:sld xmlns:a="http://schemas.openxmlformats.org/drawingml/2006/main" xmlns:r="http://schemas.openxmlformats.org/officeDocument/2006/relationships" xmlns:p="http://schemas.openxmlformats.org/presentationml/2006/main">
+  <p:cSld>
+    <p:spTree>
+      <p:nvGrpSpPr>
+        <p:cNvPr id="1" name=""/>
+        <p:cNvGrpSpPr/>
+        <p:nvPr/>
+      </p:nvGrpSpPr>
+      <p:grpSpPr>
+        <a:xfrm>
+          <a:off x="0" y="0"/>
+          <a:ext cx="0" cy="0"/>
+          <a:chOff x="0" y="0"/>
+          <a:chExt cx="0" cy="0"/>
+        </a:xfrm>
+      </p:grpSpPr>
+      <p:sp>
+        <p:nvSpPr>
+          <p:cNvPr id="2" name="Title 1"/>
+          <p:cNvSpPr>
+            <a:spLocks noGrp="1"/>
+          </p:cNvSpPr>
+          <p:nvPr>
+            <p:ph type="title"/>
+          </p:nvPr>
+        </p:nvSpPr>
+        <p:spPr/>
+        <p:txBody>
+          <a:bodyPr/>
+          <a:lstStyle/>
+          <a:p>
+            <a:endParaRPr lang="en-US"/>
+          </a:p>
+        </p:txBody>
+      </p:sp>
+      <p:sp>
+        <p:nvSpPr>
+          <p:cNvPr id="3" name="Content Placeholder 2"/>
+          <p:cNvSpPr>
+            <a:spLocks noGrp="1"/>
+          </p:cNvSpPr>
+          <p:nvPr>
+            <p:ph idx="1"/>
+          </p:nvPr>
+        </p:nvSpPr>
+        <p:spPr/>
+        <p:txBody>
+          <a:bodyPr/>
+          <a:lstStyle/>
+          <a:p>
+            <a:endParaRPr lang="en-US"/>
+          </a:p>
+        </p:txBody>
+      </p:sp>
+    </p:spTree>
+    <p:extLst>
+      <p:ext uri="{BB962C8B-B14F-4D97-AF65-F5344CB8AC3E}">
+        <p14:creationId xmlns:p14="http://schemas.microsoft.com/office/powerpoint/2010/main" val="3291362728"/>
+      </p:ext>
+    </p:extLst>
+  </p:cSld>
+  <p:clrMapOvr>
+    <a:masterClrMapping/>
+  </p:clrMapOvr>
+</p:sld>
+</file>
+
+<file path=ppt/slides/slide3.xml><?xml version="1.0" encoding="utf-8"?>
+<p:sld xmlns:a="http://schemas.openxmlformats.org/drawingml/2006/main" xmlns:r="http://schemas.openxmlformats.org/officeDocument/2006/relationships" xmlns:p="http://schemas.openxmlformats.org/presentationml/2006/main">
+  <p:cSld>
+    <p:spTree>
+      <p:nvGrpSpPr>
+        <p:cNvPr id="1" name=""/>
+        <p:cNvGrpSpPr/>
+        <p:nvPr/>
+      </p:nvGrpSpPr>
+      <p:grpSpPr>
+        <a:xfrm>
+          <a:off x="0" y="0"/>
+          <a:ext cx="0" cy="0"/>
+          <a:chOff x="0" y="0"/>
+          <a:chExt cx="0" cy="0"/>
+        </a:xfrm>
+      </p:grpSpPr>
+      <p:graphicFrame>
+        <p:nvGraphicFramePr>
+          <p:cNvPr id="4" name="Table 3"/>
+          <p:cNvGraphicFramePr>
+            <a:graphicFrameLocks noGrp="1"/>
+          </p:cNvGraphicFramePr>
+          <p:nvPr>
+            <p:extLst>
+              <p:ext uri="{D42A27DB-BD31-4B8C-83A1-F6EECF244321}">
+                <p14:modId xmlns:p14="http://schemas.microsoft.com/office/powerpoint/2010/main" val="2497061050"/>
+              </p:ext>
+            </p:extLst>
+          </p:nvPr>
+        </p:nvGraphicFramePr>
+        <p:xfrm>
+          <a:off x="1524000" y="1397000"/>
+          <a:ext cx="4656668" cy="3295952"/>
+        </p:xfrm>
+        <a:graphic>
+          <a:graphicData uri="http://schemas.openxmlformats.org/drawingml/2006/table">
+            <a:tbl>
+              <a:tblPr firstRow="1" bandRow="1">
+                <a:tableStyleId>{3B4B98B0-60AC-42C2-AFA5-B58CD77FA1E5}</a:tableStyleId>
+              </a:tblPr>
+              <a:tblGrid>
+                <a:gridCol w="1164167"/>
+                <a:gridCol w="1164167"/>
+                <a:gridCol w="1164167"/>
+                <a:gridCol w="1164167"/>
+              </a:tblGrid>
+              <a:tr h="823988">
+                <a:tc>
+                  <a:txBody>
+                    <a:bodyPr/>
+                    <a:lstStyle/>
+                    <a:p>
+                      <a:endParaRPr lang="en-US" dirty="0"/>
+                    </a:p>
+                  </a:txBody>
+                  <a:tcPr>
+                    <a:lnL w="12700" cap="flat" cmpd="sng" algn="ctr">
+                      <a:solidFill>
+                        <a:scrgbClr r="0" g="0" b="0"/>
+                      </a:solidFill>
+                      <a:prstDash val="solid"/>
+                      <a:round/>
+                      <a:headEnd type="none" w="med" len="med"/>
+                      <a:tailEnd type="none" w="med" len="med"/>
+                    </a:lnL>
+                    <a:lnR w="12700" cap="flat" cmpd="sng" algn="ctr">
+                      <a:solidFill>
+                        <a:scrgbClr r="0" g="0" b="0"/>
+                      </a:solidFill>
+                      <a:prstDash val="solid"/>
+                      <a:round/>
+                      <a:headEnd type="none" w="med" len="med"/>
+                      <a:tailEnd type="none" w="med" len="med"/>
+                    </a:lnR>
+                    <a:lnT w="12700" cap="flat" cmpd="sng" algn="ctr">
+                      <a:solidFill>
+                        <a:scrgbClr r="0" g="0" b="0"/>
+                      </a:solidFill>
+                      <a:prstDash val="solid"/>
+                      <a:round/>
+                      <a:headEnd type="none" w="med" len="med"/>
+                      <a:tailEnd type="none" w="med" len="med"/>
+                    </a:lnT>
+                    <a:lnB w="12700" cap="flat" cmpd="sng" algn="ctr">
+                      <a:solidFill>
+                        <a:scrgbClr r="0" g="0" b="0"/>
+                      </a:solidFill>
+                      <a:prstDash val="solid"/>
+                      <a:round/>
+                      <a:headEnd type="none" w="med" len="med"/>
+                      <a:tailEnd type="none" w="med" len="med"/>
+                    </a:lnB>
+                    <a:solidFill>
+                      <a:schemeClr val="bg1"/>
+                    </a:solidFill>
+                  </a:tcPr>
+                </a:tc>
+                <a:tc>
+                  <a:txBody>
+                    <a:bodyPr/>
+                    <a:lstStyle/>
+                    <a:p>
+                      <a:endParaRPr lang="en-US"/>
+                    </a:p>
+                  </a:txBody>
+                  <a:tcPr>
+                    <a:lnL w="12700" cap="flat" cmpd="sng" algn="ctr">
+                      <a:solidFill>
+                        <a:scrgbClr r="0" g="0" b="0"/>
+                      </a:solidFill>
+                      <a:prstDash val="solid"/>
+                      <a:round/>
+                      <a:headEnd type="none" w="med" len="med"/>
+                      <a:tailEnd type="none" w="med" len="med"/>
+                    </a:lnL>
+                    <a:lnR w="12700" cap="flat" cmpd="sng" algn="ctr">
+                      <a:solidFill>
+                        <a:scrgbClr r="0" g="0" b="0"/>
+                      </a:solidFill>
+                      <a:prstDash val="solid"/>
+                      <a:round/>
+                      <a:headEnd type="none" w="med" len="med"/>
+                      <a:tailEnd type="none" w="med" len="med"/>
+                    </a:lnR>
+                    <a:lnT w="12700" cap="flat" cmpd="sng" algn="ctr">
+                      <a:solidFill>
+                        <a:scrgbClr r="0" g="0" b="0"/>
+                      </a:solidFill>
+                      <a:prstDash val="solid"/>
+                      <a:round/>
+                      <a:headEnd type="none" w="med" len="med"/>
+                      <a:tailEnd type="none" w="med" len="med"/>
+                    </a:lnT>
+                    <a:lnB w="12700" cap="flat" cmpd="sng" algn="ctr">
+                      <a:solidFill>
+                        <a:scrgbClr r="0" g="0" b="0"/>
+                      </a:solidFill>
+                      <a:prstDash val="solid"/>
+                      <a:round/>
+                      <a:headEnd type="none" w="med" len="med"/>
+                      <a:tailEnd type="none" w="med" len="med"/>
+                    </a:lnB>
+                    <a:solidFill>
+                      <a:schemeClr val="bg1"/>
+                    </a:solidFill>
+                  </a:tcPr>
+                </a:tc>
+                <a:tc>
+                  <a:txBody>
+                    <a:bodyPr/>
+                    <a:lstStyle/>
+                    <a:p>
+                      <a:endParaRPr lang="en-US" dirty="0"/>
+                    </a:p>
+                  </a:txBody>
+                  <a:tcPr>
+                    <a:lnL w="12700" cap="flat" cmpd="sng" algn="ctr">
+                      <a:solidFill>
+                        <a:scrgbClr r="0" g="0" b="0"/>
+                      </a:solidFill>
+                      <a:prstDash val="solid"/>
+                      <a:round/>
+                      <a:headEnd type="none" w="med" len="med"/>
+                      <a:tailEnd type="none" w="med" len="med"/>
+                    </a:lnL>
+                    <a:lnR w="12700" cap="flat" cmpd="sng" algn="ctr">
+                      <a:solidFill>
+                        <a:scrgbClr r="0" g="0" b="0"/>
+                      </a:solidFill>
+                      <a:prstDash val="solid"/>
+                      <a:round/>
+                      <a:headEnd type="none" w="med" len="med"/>
+                      <a:tailEnd type="none" w="med" len="med"/>
+                    </a:lnR>
+                    <a:lnT w="12700" cap="flat" cmpd="sng" algn="ctr">
+                      <a:solidFill>
+                        <a:scrgbClr r="0" g="0" b="0"/>
+                      </a:solidFill>
+                      <a:prstDash val="solid"/>
+                      <a:round/>
+                      <a:headEnd type="none" w="med" len="med"/>
+                      <a:tailEnd type="none" w="med" len="med"/>
+                    </a:lnT>
+                    <a:lnB w="12700" cap="flat" cmpd="sng" algn="ctr">
+                      <a:solidFill>
+                        <a:scrgbClr r="0" g="0" b="0"/>
+                      </a:solidFill>
+                      <a:prstDash val="solid"/>
+                      <a:round/>
+                      <a:headEnd type="none" w="med" len="med"/>
+                      <a:tailEnd type="none" w="med" len="med"/>
+                    </a:lnB>
+                    <a:solidFill>
+                      <a:schemeClr val="bg1"/>
+                    </a:solidFill>
+                  </a:tcPr>
+                </a:tc>
+                <a:tc>
+                  <a:txBody>
+                    <a:bodyPr/>
+                    <a:lstStyle/>
+                    <a:p>
+                      <a:endParaRPr lang="en-US"/>
+                    </a:p>
+                  </a:txBody>
+                  <a:tcPr>
+                    <a:lnL w="12700" cap="flat" cmpd="sng" algn="ctr">
+                      <a:solidFill>
+                        <a:scrgbClr r="0" g="0" b="0"/>
+                      </a:solidFill>
+                      <a:prstDash val="solid"/>
+                      <a:round/>
+                      <a:headEnd type="none" w="med" len="med"/>
+                      <a:tailEnd type="none" w="med" len="med"/>
+                    </a:lnL>
+                    <a:lnR w="12700" cap="flat" cmpd="sng" algn="ctr">
+                      <a:solidFill>
+                        <a:scrgbClr r="0" g="0" b="0"/>
+                      </a:solidFill>
+                      <a:prstDash val="solid"/>
+                      <a:round/>
+                      <a:headEnd type="none" w="med" len="med"/>
+                      <a:tailEnd type="none" w="med" len="med"/>
+                    </a:lnR>
+                    <a:lnT w="12700" cap="flat" cmpd="sng" algn="ctr">
+                      <a:solidFill>
+                        <a:scrgbClr r="0" g="0" b="0"/>
+                      </a:solidFill>
+                      <a:prstDash val="solid"/>
+                      <a:round/>
+                      <a:headEnd type="none" w="med" len="med"/>
+                      <a:tailEnd type="none" w="med" len="med"/>
+                    </a:lnT>
+                    <a:lnB w="12700" cap="flat" cmpd="sng" algn="ctr">
+                      <a:solidFill>
+                        <a:scrgbClr r="0" g="0" b="0"/>
+                      </a:solidFill>
+                      <a:prstDash val="solid"/>
+                      <a:round/>
+                      <a:headEnd type="none" w="med" len="med"/>
+                      <a:tailEnd type="none" w="med" len="med"/>
+                    </a:lnB>
+                    <a:solidFill>
+                      <a:schemeClr val="bg1"/>
+                    </a:solidFill>
+                  </a:tcPr>
+                </a:tc>
+              </a:tr>
+              <a:tr h="823988">
+                <a:tc>
+                  <a:txBody>
+                    <a:bodyPr/>
+                    <a:lstStyle/>
+                    <a:p>
+                      <a:endParaRPr lang="en-US" dirty="0"/>
+                    </a:p>
+                  </a:txBody>
+                  <a:tcPr>
+                    <a:lnL w="12700" cap="flat" cmpd="sng" algn="ctr">
+                      <a:solidFill>
+                        <a:scrgbClr r="0" g="0" b="0"/>
+                      </a:solidFill>
+                      <a:prstDash val="solid"/>
+                      <a:round/>
+                      <a:headEnd type="none" w="med" len="med"/>
+                      <a:tailEnd type="none" w="med" len="med"/>
+                    </a:lnL>
+                    <a:lnR w="12700" cap="flat" cmpd="sng" algn="ctr">
+                      <a:solidFill>
+                        <a:scrgbClr r="0" g="0" b="0"/>
+                      </a:solidFill>
+                      <a:prstDash val="solid"/>
+                      <a:round/>
+                      <a:headEnd type="none" w="med" len="med"/>
+                      <a:tailEnd type="none" w="med" len="med"/>
+                    </a:lnR>
+                    <a:lnT w="12700" cap="flat" cmpd="sng" algn="ctr">
+                      <a:solidFill>
+                        <a:scrgbClr r="0" g="0" b="0"/>
+                      </a:solidFill>
+                      <a:prstDash val="solid"/>
+                      <a:round/>
+                      <a:headEnd type="none" w="med" len="med"/>
+                      <a:tailEnd type="none" w="med" len="med"/>
+                    </a:lnT>
+                    <a:lnB w="12700" cap="flat" cmpd="sng" algn="ctr">
+                      <a:solidFill>
+                        <a:scrgbClr r="0" g="0" b="0"/>
+                      </a:solidFill>
+                      <a:prstDash val="solid"/>
+                      <a:round/>
+                      <a:headEnd type="none" w="med" len="med"/>
+                      <a:tailEnd type="none" w="med" len="med"/>
+                    </a:lnB>
+                    <a:solidFill>
+                      <a:schemeClr val="bg1"/>
+                    </a:solidFill>
+                  </a:tcPr>
+                </a:tc>
+                <a:tc>
+                  <a:txBody>
+                    <a:bodyPr/>
+                    <a:lstStyle/>
+                    <a:p>
+                      <a:endParaRPr lang="en-US"/>
+                    </a:p>
+                  </a:txBody>
+                  <a:tcPr>
+                    <a:lnL w="12700" cap="flat" cmpd="sng" algn="ctr">
+                      <a:solidFill>
+                        <a:scrgbClr r="0" g="0" b="0"/>
+                      </a:solidFill>
+                      <a:prstDash val="solid"/>
+                      <a:round/>
+                      <a:headEnd type="none" w="med" len="med"/>
+                      <a:tailEnd type="none" w="med" len="med"/>
+                    </a:lnL>
+                    <a:lnR w="12700" cap="flat" cmpd="sng" algn="ctr">
+                      <a:solidFill>
+                        <a:scrgbClr r="0" g="0" b="0"/>
+                      </a:solidFill>
+                      <a:prstDash val="solid"/>
+                      <a:round/>
+                      <a:headEnd type="none" w="med" len="med"/>
+                      <a:tailEnd type="none" w="med" len="med"/>
+                    </a:lnR>
+                    <a:lnT w="12700" cap="flat" cmpd="sng" algn="ctr">
+                      <a:solidFill>
+                        <a:scrgbClr r="0" g="0" b="0"/>
+                      </a:solidFill>
+                      <a:prstDash val="solid"/>
+                      <a:round/>
+                      <a:headEnd type="none" w="med" len="med"/>
+                      <a:tailEnd type="none" w="med" len="med"/>
+                    </a:lnT>
+                    <a:lnB w="12700" cap="flat" cmpd="sng" algn="ctr">
+                      <a:solidFill>
+                        <a:scrgbClr r="0" g="0" b="0"/>
+                      </a:solidFill>
+                      <a:prstDash val="solid"/>
+                      <a:round/>
+                      <a:headEnd type="none" w="med" len="med"/>
+                      <a:tailEnd type="none" w="med" len="med"/>
+                    </a:lnB>
+                    <a:solidFill>
+                      <a:schemeClr val="bg1"/>
+                    </a:solidFill>
+                  </a:tcPr>
+                </a:tc>
+                <a:tc>
+                  <a:txBody>
+                    <a:bodyPr/>
+                    <a:lstStyle/>
+                    <a:p>
+                      <a:endParaRPr lang="en-US"/>
+                    </a:p>
+                  </a:txBody>
+                  <a:tcPr>
+                    <a:lnL w="12700" cap="flat" cmpd="sng" algn="ctr">
+                      <a:solidFill>
+                        <a:scrgbClr r="0" g="0" b="0"/>
+                      </a:solidFill>
+                      <a:prstDash val="solid"/>
+                      <a:round/>
+                      <a:headEnd type="none" w="med" len="med"/>
+                      <a:tailEnd type="none" w="med" len="med"/>
+                    </a:lnL>
+                    <a:lnR w="12700" cap="flat" cmpd="sng" algn="ctr">
+                      <a:solidFill>
+                        <a:scrgbClr r="0" g="0" b="0"/>
+                      </a:solidFill>
+                      <a:prstDash val="solid"/>
+                      <a:round/>
+                      <a:headEnd type="none" w="med" len="med"/>
+                      <a:tailEnd type="none" w="med" len="med"/>
+                    </a:lnR>
+                    <a:lnT w="12700" cap="flat" cmpd="sng" algn="ctr">
+                      <a:solidFill>
+                        <a:scrgbClr r="0" g="0" b="0"/>
+                      </a:solidFill>
+                      <a:prstDash val="solid"/>
+                      <a:round/>
+                      <a:headEnd type="none" w="med" len="med"/>
+                      <a:tailEnd type="none" w="med" len="med"/>
+                    </a:lnT>
+                    <a:lnB w="12700" cap="flat" cmpd="sng" algn="ctr">
+                      <a:solidFill>
+                        <a:scrgbClr r="0" g="0" b="0"/>
+                      </a:solidFill>
+                      <a:prstDash val="solid"/>
+                      <a:round/>
+                      <a:headEnd type="none" w="med" len="med"/>
+                      <a:tailEnd type="none" w="med" len="med"/>
+                    </a:lnB>
+                    <a:solidFill>
+                      <a:schemeClr val="bg1"/>
+                    </a:solidFill>
+                  </a:tcPr>
+                </a:tc>
+                <a:tc>
+                  <a:txBody>
+                    <a:bodyPr/>
+                    <a:lstStyle/>
+                    <a:p>
+                      <a:endParaRPr lang="en-US"/>
+                    </a:p>
+                  </a:txBody>
+                  <a:tcPr>
+                    <a:lnL w="12700" cap="flat" cmpd="sng" algn="ctr">
+                      <a:solidFill>
+                        <a:scrgbClr r="0" g="0" b="0"/>
+                      </a:solidFill>
+                      <a:prstDash val="solid"/>
+                      <a:round/>
+                      <a:headEnd type="none" w="med" len="med"/>
+                      <a:tailEnd type="none" w="med" len="med"/>
+                    </a:lnL>
+                    <a:lnR w="12700" cap="flat" cmpd="sng" algn="ctr">
+                      <a:solidFill>
+                        <a:scrgbClr r="0" g="0" b="0"/>
+                      </a:solidFill>
+                      <a:prstDash val="solid"/>
+                      <a:round/>
+                      <a:headEnd type="none" w="med" len="med"/>
+                      <a:tailEnd type="none" w="med" len="med"/>
+                    </a:lnR>
+                    <a:lnT w="12700" cap="flat" cmpd="sng" algn="ctr">
+                      <a:solidFill>
+                        <a:scrgbClr r="0" g="0" b="0"/>
+                      </a:solidFill>
+                      <a:prstDash val="solid"/>
+                      <a:round/>
+                      <a:headEnd type="none" w="med" len="med"/>
+                      <a:tailEnd type="none" w="med" len="med"/>
+                    </a:lnT>
+                    <a:lnB w="12700" cap="flat" cmpd="sng" algn="ctr">
+                      <a:solidFill>
+                        <a:scrgbClr r="0" g="0" b="0"/>
+                      </a:solidFill>
+                      <a:prstDash val="solid"/>
+                      <a:round/>
+                      <a:headEnd type="none" w="med" len="med"/>
+                      <a:tailEnd type="none" w="med" len="med"/>
+                    </a:lnB>
+                    <a:solidFill>
+                      <a:schemeClr val="bg1"/>
+                    </a:solidFill>
+                  </a:tcPr>
+                </a:tc>
+              </a:tr>
+              <a:tr h="823988">
+                <a:tc>
+                  <a:txBody>
+                    <a:bodyPr/>
+                    <a:lstStyle/>
+                    <a:p>
+                      <a:endParaRPr lang="en-US"/>
+                    </a:p>
+                  </a:txBody>
+                  <a:tcPr>
+                    <a:lnL w="12700" cap="flat" cmpd="sng" algn="ctr">
+                      <a:solidFill>
+                        <a:scrgbClr r="0" g="0" b="0"/>
+                      </a:solidFill>
+                      <a:prstDash val="solid"/>
+                      <a:round/>
+                      <a:headEnd type="none" w="med" len="med"/>
+                      <a:tailEnd type="none" w="med" len="med"/>
+                    </a:lnL>
+                    <a:lnR w="12700" cap="flat" cmpd="sng" algn="ctr">
+                      <a:solidFill>
+                        <a:scrgbClr r="0" g="0" b="0"/>
+                      </a:solidFill>
+                      <a:prstDash val="solid"/>
+                      <a:round/>
+                      <a:headEnd type="none" w="med" len="med"/>
+                      <a:tailEnd type="none" w="med" len="med"/>
+                    </a:lnR>
+                    <a:lnT w="12700" cap="flat" cmpd="sng" algn="ctr">
+                      <a:solidFill>
+                        <a:scrgbClr r="0" g="0" b="0"/>
+                      </a:solidFill>
+                      <a:prstDash val="solid"/>
+                      <a:round/>
+                      <a:headEnd type="none" w="med" len="med"/>
+                      <a:tailEnd type="none" w="med" len="med"/>
+                    </a:lnT>
+                    <a:lnB w="12700" cap="flat" cmpd="sng" algn="ctr">
+                      <a:solidFill>
+                        <a:scrgbClr r="0" g="0" b="0"/>
+                      </a:solidFill>
+                      <a:prstDash val="solid"/>
+                      <a:round/>
+                      <a:headEnd type="none" w="med" len="med"/>
+                      <a:tailEnd type="none" w="med" len="med"/>
+                    </a:lnB>
+                    <a:solidFill>
+                      <a:schemeClr val="bg1"/>
+                    </a:solidFill>
+                  </a:tcPr>
+                </a:tc>
+                <a:tc>
+                  <a:txBody>
+                    <a:bodyPr/>
+                    <a:lstStyle/>
+                    <a:p>
+                      <a:endParaRPr lang="en-US"/>
+                    </a:p>
+                  </a:txBody>
+                  <a:tcPr>
+                    <a:lnL w="12700" cap="flat" cmpd="sng" algn="ctr">
+                      <a:solidFill>
+                        <a:scrgbClr r="0" g="0" b="0"/>
+                      </a:solidFill>
+                      <a:prstDash val="solid"/>
+                      <a:round/>
+                      <a:headEnd type="none" w="med" len="med"/>
+                      <a:tailEnd type="none" w="med" len="med"/>
+                    </a:lnL>
+                    <a:lnR w="12700" cap="flat" cmpd="sng" algn="ctr">
+                      <a:solidFill>
+                        <a:scrgbClr r="0" g="0" b="0"/>
+                      </a:solidFill>
+                      <a:prstDash val="solid"/>
+                      <a:round/>
+                      <a:headEnd type="none" w="med" len="med"/>
+                      <a:tailEnd type="none" w="med" len="med"/>
+                    </a:lnR>
+                    <a:lnT w="12700" cap="flat" cmpd="sng" algn="ctr">
+                      <a:solidFill>
+                        <a:scrgbClr r="0" g="0" b="0"/>
+                      </a:solidFill>
+                      <a:prstDash val="solid"/>
+                      <a:round/>
+                      <a:headEnd type="none" w="med" len="med"/>
+                      <a:tailEnd type="none" w="med" len="med"/>
+                    </a:lnT>
+                    <a:lnB w="12700" cap="flat" cmpd="sng" algn="ctr">
+                      <a:solidFill>
+                        <a:scrgbClr r="0" g="0" b="0"/>
+                      </a:solidFill>
+                      <a:prstDash val="solid"/>
+                      <a:round/>
+                      <a:headEnd type="none" w="med" len="med"/>
+                      <a:tailEnd type="none" w="med" len="med"/>
+                    </a:lnB>
+                    <a:solidFill>
+                      <a:schemeClr val="bg1"/>
+                    </a:solidFill>
+                  </a:tcPr>
+                </a:tc>
+                <a:tc>
+                  <a:txBody>
+                    <a:bodyPr/>
+                    <a:lstStyle/>
+                    <a:p>
+                      <a:endParaRPr lang="en-US"/>
+                    </a:p>
+                  </a:txBody>
+                  <a:tcPr>
+                    <a:lnL w="12700" cap="flat" cmpd="sng" algn="ctr">
+                      <a:solidFill>
+                        <a:scrgbClr r="0" g="0" b="0"/>
+                      </a:solidFill>
+                      <a:prstDash val="solid"/>
+                      <a:round/>
+                      <a:headEnd type="none" w="med" len="med"/>
+                      <a:tailEnd type="none" w="med" len="med"/>
+                    </a:lnL>
+                    <a:lnR w="12700" cap="flat" cmpd="sng" algn="ctr">
+                      <a:solidFill>
+                        <a:scrgbClr r="0" g="0" b="0"/>
+                      </a:solidFill>
+                      <a:prstDash val="solid"/>
+                      <a:round/>
+                      <a:headEnd type="none" w="med" len="med"/>
+                      <a:tailEnd type="none" w="med" len="med"/>
+                    </a:lnR>
+                    <a:lnT w="12700" cap="flat" cmpd="sng" algn="ctr">
+                      <a:solidFill>
+                        <a:scrgbClr r="0" g="0" b="0"/>
+                      </a:solidFill>
+                      <a:prstDash val="solid"/>
+                      <a:round/>
+                      <a:headEnd type="none" w="med" len="med"/>
+                      <a:tailEnd type="none" w="med" len="med"/>
+                    </a:lnT>
+                    <a:lnB w="12700" cap="flat" cmpd="sng" algn="ctr">
+                      <a:solidFill>
+                        <a:scrgbClr r="0" g="0" b="0"/>
+                      </a:solidFill>
+                      <a:prstDash val="solid"/>
+                      <a:round/>
+                      <a:headEnd type="none" w="med" len="med"/>
+                      <a:tailEnd type="none" w="med" len="med"/>
+                    </a:lnB>
+                    <a:solidFill>
+                      <a:schemeClr val="bg1"/>
+                    </a:solidFill>
+                  </a:tcPr>
+                </a:tc>
+                <a:tc>
+                  <a:txBody>
+                    <a:bodyPr/>
+                    <a:lstStyle/>
+                    <a:p>
+                      <a:endParaRPr lang="en-US"/>
+                    </a:p>
+                  </a:txBody>
+                  <a:tcPr>
+                    <a:lnL w="12700" cap="flat" cmpd="sng" algn="ctr">
+                      <a:solidFill>
+                        <a:scrgbClr r="0" g="0" b="0"/>
+                      </a:solidFill>
+                      <a:prstDash val="solid"/>
+                      <a:round/>
+                      <a:headEnd type="none" w="med" len="med"/>
+                      <a:tailEnd type="none" w="med" len="med"/>
+                    </a:lnL>
+                    <a:lnR w="12700" cap="flat" cmpd="sng" algn="ctr">
+                      <a:solidFill>
+                        <a:scrgbClr r="0" g="0" b="0"/>
+                      </a:solidFill>
+                      <a:prstDash val="solid"/>
+                      <a:round/>
+                      <a:headEnd type="none" w="med" len="med"/>
+                      <a:tailEnd type="none" w="med" len="med"/>
+                    </a:lnR>
+                    <a:lnT w="12700" cap="flat" cmpd="sng" algn="ctr">
+                      <a:solidFill>
+                        <a:scrgbClr r="0" g="0" b="0"/>
+                      </a:solidFill>
+                      <a:prstDash val="solid"/>
+                      <a:round/>
+                      <a:headEnd type="none" w="med" len="med"/>
+                      <a:tailEnd type="none" w="med" len="med"/>
+                    </a:lnT>
+                    <a:lnB w="12700" cap="flat" cmpd="sng" algn="ctr">
+                      <a:solidFill>
+                        <a:scrgbClr r="0" g="0" b="0"/>
+                      </a:solidFill>
+                      <a:prstDash val="solid"/>
+                      <a:round/>
+                      <a:headEnd type="none" w="med" len="med"/>
+                      <a:tailEnd type="none" w="med" len="med"/>
+                    </a:lnB>
+                    <a:solidFill>
+                      <a:schemeClr val="bg1"/>
+                    </a:solidFill>
+                  </a:tcPr>
+                </a:tc>
+              </a:tr>
+              <a:tr h="823988">
+                <a:tc>
+                  <a:txBody>
+                    <a:bodyPr/>
+                    <a:lstStyle/>
+                    <a:p>
+                      <a:endParaRPr lang="en-US"/>
+                    </a:p>
+                  </a:txBody>
+                  <a:tcPr>
+                    <a:lnL w="12700" cap="flat" cmpd="sng" algn="ctr">
+                      <a:solidFill>
+                        <a:scrgbClr r="0" g="0" b="0"/>
+                      </a:solidFill>
+                      <a:prstDash val="solid"/>
+                      <a:round/>
+                      <a:headEnd type="none" w="med" len="med"/>
+                      <a:tailEnd type="none" w="med" len="med"/>
+                    </a:lnL>
+                    <a:lnR w="12700" cap="flat" cmpd="sng" algn="ctr">
+                      <a:solidFill>
+                        <a:scrgbClr r="0" g="0" b="0"/>
+                      </a:solidFill>
+                      <a:prstDash val="solid"/>
+                      <a:round/>
+                      <a:headEnd type="none" w="med" len="med"/>
+                      <a:tailEnd type="none" w="med" len="med"/>
+                    </a:lnR>
+                    <a:lnT w="12700" cap="flat" cmpd="sng" algn="ctr">
+                      <a:solidFill>
+                        <a:scrgbClr r="0" g="0" b="0"/>
+                      </a:solidFill>
+                      <a:prstDash val="solid"/>
+                      <a:round/>
+                      <a:headEnd type="none" w="med" len="med"/>
+                      <a:tailEnd type="none" w="med" len="med"/>
+                    </a:lnT>
+                    <a:lnB w="12700" cap="flat" cmpd="sng" algn="ctr">
+                      <a:solidFill>
+                        <a:scrgbClr r="0" g="0" b="0"/>
+                      </a:solidFill>
+                      <a:prstDash val="solid"/>
+                      <a:round/>
+                      <a:headEnd type="none" w="med" len="med"/>
+                      <a:tailEnd type="none" w="med" len="med"/>
+                    </a:lnB>
+                    <a:solidFill>
+                      <a:schemeClr val="bg1"/>
+                    </a:solidFill>
+                  </a:tcPr>
+                </a:tc>
+                <a:tc>
+                  <a:txBody>
+                    <a:bodyPr/>
+                    <a:lstStyle/>
+                    <a:p>
+                      <a:endParaRPr lang="en-US"/>
+                    </a:p>
+                  </a:txBody>
+                  <a:tcPr>
+                    <a:lnL w="12700" cap="flat" cmpd="sng" algn="ctr">
+                      <a:solidFill>
+                        <a:scrgbClr r="0" g="0" b="0"/>
+                      </a:solidFill>
+                      <a:prstDash val="solid"/>
+                      <a:round/>
+                      <a:headEnd type="none" w="med" len="med"/>
+                      <a:tailEnd type="none" w="med" len="med"/>
+                    </a:lnL>
+                    <a:lnR w="12700" cap="flat" cmpd="sng" algn="ctr">
+                      <a:solidFill>
+                        <a:scrgbClr r="0" g="0" b="0"/>
+                      </a:solidFill>
+                      <a:prstDash val="solid"/>
+                      <a:round/>
+                      <a:headEnd type="none" w="med" len="med"/>
+                      <a:tailEnd type="none" w="med" len="med"/>
+                    </a:lnR>
+                    <a:lnT w="12700" cap="flat" cmpd="sng" algn="ctr">
+                      <a:solidFill>
+                        <a:scrgbClr r="0" g="0" b="0"/>
+                      </a:solidFill>
+                      <a:prstDash val="solid"/>
+                      <a:round/>
+                      <a:headEnd type="none" w="med" len="med"/>
+                      <a:tailEnd type="none" w="med" len="med"/>
+                    </a:lnT>
+                    <a:lnB w="12700" cap="flat" cmpd="sng" algn="ctr">
+                      <a:solidFill>
+                        <a:scrgbClr r="0" g="0" b="0"/>
+                      </a:solidFill>
+                      <a:prstDash val="solid"/>
+                      <a:round/>
+                      <a:headEnd type="none" w="med" len="med"/>
+                      <a:tailEnd type="none" w="med" len="med"/>
+                    </a:lnB>
+                    <a:solidFill>
+                      <a:schemeClr val="bg1"/>
+                    </a:solidFill>
+                  </a:tcPr>
+                </a:tc>
+                <a:tc>
+                  <a:txBody>
+                    <a:bodyPr/>
+                    <a:lstStyle/>
+                    <a:p>
+                      <a:endParaRPr lang="en-US"/>
+                    </a:p>
+                  </a:txBody>
+                  <a:tcPr>
+                    <a:lnL w="12700" cap="flat" cmpd="sng" algn="ctr">
+                      <a:solidFill>
+                        <a:scrgbClr r="0" g="0" b="0"/>
+                      </a:solidFill>
+                      <a:prstDash val="solid"/>
+                      <a:round/>
+                      <a:headEnd type="none" w="med" len="med"/>
+                      <a:tailEnd type="none" w="med" len="med"/>
+                    </a:lnL>
+                    <a:lnR w="12700" cap="flat" cmpd="sng" algn="ctr">
+                      <a:solidFill>
+                        <a:scrgbClr r="0" g="0" b="0"/>
+                      </a:solidFill>
+                      <a:prstDash val="solid"/>
+                      <a:round/>
+                      <a:headEnd type="none" w="med" len="med"/>
+                      <a:tailEnd type="none" w="med" len="med"/>
+                    </a:lnR>
+                    <a:lnT w="12700" cap="flat" cmpd="sng" algn="ctr">
+                      <a:solidFill>
+                        <a:scrgbClr r="0" g="0" b="0"/>
+                      </a:solidFill>
+                      <a:prstDash val="solid"/>
+                      <a:round/>
+                      <a:headEnd type="none" w="med" len="med"/>
+                      <a:tailEnd type="none" w="med" len="med"/>
+                    </a:lnT>
+                    <a:lnB w="12700" cap="flat" cmpd="sng" algn="ctr">
+                      <a:solidFill>
+                        <a:scrgbClr r="0" g="0" b="0"/>
+                      </a:solidFill>
+                      <a:prstDash val="solid"/>
+                      <a:round/>
+                      <a:headEnd type="none" w="med" len="med"/>
+                      <a:tailEnd type="none" w="med" len="med"/>
+                    </a:lnB>
+                    <a:solidFill>
+                      <a:schemeClr val="bg1"/>
+                    </a:solidFill>
+                  </a:tcPr>
+                </a:tc>
+                <a:tc>
+                  <a:txBody>
+                    <a:bodyPr/>
+                    <a:lstStyle/>
+                    <a:p>
+                      <a:endParaRPr lang="en-US" dirty="0"/>
+                    </a:p>
+                  </a:txBody>
+                  <a:tcPr>
+                    <a:lnL w="12700" cap="flat" cmpd="sng" algn="ctr">
+                      <a:solidFill>
+                        <a:scrgbClr r="0" g="0" b="0"/>
+                      </a:solidFill>
+                      <a:prstDash val="solid"/>
+                      <a:round/>
+                      <a:headEnd type="none" w="med" len="med"/>
+                      <a:tailEnd type="none" w="med" len="med"/>
+                    </a:lnL>
+                    <a:lnR w="12700" cap="flat" cmpd="sng" algn="ctr">
+                      <a:solidFill>
+                        <a:scrgbClr r="0" g="0" b="0"/>
+                      </a:solidFill>
+                      <a:prstDash val="solid"/>
+                      <a:round/>
+                      <a:headEnd type="none" w="med" len="med"/>
+                      <a:tailEnd type="none" w="med" len="med"/>
+                    </a:lnR>
+                    <a:lnT w="12700" cap="flat" cmpd="sng" algn="ctr">
+                      <a:solidFill>
+                        <a:scrgbClr r="0" g="0" b="0"/>
+                      </a:solidFill>
+                      <a:prstDash val="solid"/>
+                      <a:round/>
+                      <a:headEnd type="none" w="med" len="med"/>
+                      <a:tailEnd type="none" w="med" len="med"/>
+                    </a:lnT>
+                    <a:lnB w="12700" cap="flat" cmpd="sng" algn="ctr">
+                      <a:solidFill>
+                        <a:scrgbClr r="0" g="0" b="0"/>
+                      </a:solidFill>
+                      <a:prstDash val="solid"/>
+                      <a:round/>
+                      <a:headEnd type="none" w="med" len="med"/>
+                      <a:tailEnd type="none" w="med" len="med"/>
+                    </a:lnB>
+                    <a:solidFill>
+                      <a:schemeClr val="bg1"/>
+                    </a:solidFill>
+                  </a:tcPr>
+                </a:tc>
+              </a:tr>
+            </a:tbl>
+          </a:graphicData>
+        </a:graphic>
+      </p:graphicFrame>
+      <p:sp>
+        <p:nvSpPr>
+          <p:cNvPr id="5" name="TextBox 4"/>
+          <p:cNvSpPr txBox="1"/>
+          <p:nvPr/>
+        </p:nvSpPr>
+        <p:spPr>
+          <a:xfrm>
+            <a:off x="3447143" y="4862286"/>
+            <a:ext cx="1403048" cy="369332"/>
+          </a:xfrm>
+          <a:prstGeom prst="rect">
+            <a:avLst/>
+          </a:prstGeom>
+          <a:noFill/>
+        </p:spPr>
+        <p:txBody>
+          <a:bodyPr wrap="square" rtlCol="0">
+            <a:spAutoFit/>
+          </a:bodyPr>
+          <a:lstStyle/>
+          <a:p>
+            <a:r>
+              <a:rPr lang="en-US" dirty="0" smtClean="0"/>
+              <a:t>M</a:t>
+            </a:r>
+            <a:endParaRPr lang="en-US" dirty="0"/>
+          </a:p>
+        </p:txBody>
+      </p:sp>
+      <p:sp>
+        <p:nvSpPr>
+          <p:cNvPr id="6" name="TextBox 5"/>
+          <p:cNvSpPr txBox="1"/>
+          <p:nvPr/>
+        </p:nvSpPr>
+        <p:spPr>
+          <a:xfrm>
+            <a:off x="6405638" y="2402114"/>
+            <a:ext cx="1403048" cy="369332"/>
+          </a:xfrm>
+          <a:prstGeom prst="rect">
+            <a:avLst/>
+          </a:prstGeom>
+          <a:noFill/>
+        </p:spPr>
+        <p:txBody>
+          <a:bodyPr wrap="square" rtlCol="0">
+            <a:spAutoFit/>
+          </a:bodyPr>
+          <a:lstStyle/>
+          <a:p>
+            <a:r>
+              <a:rPr lang="en-US" dirty="0" smtClean="0"/>
+              <a:t>N</a:t>
+            </a:r>
+            <a:endParaRPr lang="en-US" dirty="0"/>
+          </a:p>
+        </p:txBody>
+      </p:sp>
+      <p:sp>
+        <p:nvSpPr>
+          <p:cNvPr id="8" name="Plaque 7"/>
+          <p:cNvSpPr/>
+          <p:nvPr/>
+        </p:nvSpPr>
+        <p:spPr>
+          <a:xfrm>
+            <a:off x="2987524" y="3132667"/>
+            <a:ext cx="634737" cy="616857"/>
+          </a:xfrm>
+          <a:prstGeom prst="plaque">
+            <a:avLst/>
+          </a:prstGeom>
+        </p:spPr>
+        <p:style>
+          <a:lnRef idx="1">
+            <a:schemeClr val="accent1"/>
+          </a:lnRef>
+          <a:fillRef idx="3">
+            <a:schemeClr val="accent1"/>
+          </a:fillRef>
+          <a:effectRef idx="2">
+            <a:schemeClr val="accent1"/>
+          </a:effectRef>
+          <a:fontRef idx="minor">
+            <a:schemeClr val="lt1"/>
+          </a:fontRef>
+        </p:style>
+        <p:txBody>
+          <a:bodyPr rtlCol="0" anchor="ctr"/>
+          <a:lstStyle/>
+          <a:p>
+            <a:pPr algn="ctr"/>
+            <a:endParaRPr lang="en-US"/>
+          </a:p>
+        </p:txBody>
+      </p:sp>
+    </p:spTree>
+    <p:extLst>
+      <p:ext uri="{BB962C8B-B14F-4D97-AF65-F5344CB8AC3E}">
+        <p14:creationId xmlns:p14="http://schemas.microsoft.com/office/powerpoint/2010/main" val="1627213259"/>
       </p:ext>
     </p:extLst>
   </p:cSld>

</xml_diff>

<commit_message>
more figure real stuff
</commit_message>
<xml_diff>
--- a/figures/figures.pptx
+++ b/figures/figures.pptx
@@ -7,7 +7,8 @@
   <p:sldIdLst>
     <p:sldId id="256" r:id="rId2"/>
     <p:sldId id="257" r:id="rId3"/>
-    <p:sldId id="258" r:id="rId4"/>
+    <p:sldId id="259" r:id="rId4"/>
+    <p:sldId id="258" r:id="rId5"/>
   </p:sldIdLst>
   <p:sldSz cx="9144000" cy="6858000" type="screen4x3"/>
   <p:notesSz cx="6858000" cy="9144000"/>
@@ -4209,6 +4210,533 @@
 </file>
 
 <file path=ppt/slides/slide3.xml><?xml version="1.0" encoding="utf-8"?>
+<p:sld xmlns:a="http://schemas.openxmlformats.org/drawingml/2006/main" xmlns:r="http://schemas.openxmlformats.org/officeDocument/2006/relationships" xmlns:p="http://schemas.openxmlformats.org/presentationml/2006/main">
+  <p:cSld>
+    <p:spTree>
+      <p:nvGrpSpPr>
+        <p:cNvPr id="1" name=""/>
+        <p:cNvGrpSpPr/>
+        <p:nvPr/>
+      </p:nvGrpSpPr>
+      <p:grpSpPr>
+        <a:xfrm>
+          <a:off x="0" y="0"/>
+          <a:ext cx="0" cy="0"/>
+          <a:chOff x="0" y="0"/>
+          <a:chExt cx="0" cy="0"/>
+        </a:xfrm>
+      </p:grpSpPr>
+      <p:grpSp>
+        <p:nvGrpSpPr>
+          <p:cNvPr id="14" name="Group 13"/>
+          <p:cNvGrpSpPr/>
+          <p:nvPr/>
+        </p:nvGrpSpPr>
+        <p:grpSpPr>
+          <a:xfrm>
+            <a:off x="1366762" y="2116667"/>
+            <a:ext cx="520096" cy="520096"/>
+            <a:chOff x="2467428" y="1596571"/>
+            <a:chExt cx="520096" cy="520096"/>
+          </a:xfrm>
+        </p:grpSpPr>
+        <p:cxnSp>
+          <p:nvCxnSpPr>
+            <p:cNvPr id="10" name="Straight Arrow Connector 9"/>
+            <p:cNvCxnSpPr/>
+            <p:nvPr/>
+          </p:nvCxnSpPr>
+          <p:spPr>
+            <a:xfrm flipV="1">
+              <a:off x="2467428" y="1596571"/>
+              <a:ext cx="0" cy="520096"/>
+            </a:xfrm>
+            <a:prstGeom prst="straightConnector1">
+              <a:avLst/>
+            </a:prstGeom>
+            <a:ln>
+              <a:solidFill>
+                <a:schemeClr val="bg1">
+                  <a:lumMod val="50000"/>
+                </a:schemeClr>
+              </a:solidFill>
+              <a:tailEnd type="arrow"/>
+            </a:ln>
+            <a:effectLst/>
+          </p:spPr>
+          <p:style>
+            <a:lnRef idx="2">
+              <a:schemeClr val="dk1"/>
+            </a:lnRef>
+            <a:fillRef idx="0">
+              <a:schemeClr val="dk1"/>
+            </a:fillRef>
+            <a:effectRef idx="1">
+              <a:schemeClr val="dk1"/>
+            </a:effectRef>
+            <a:fontRef idx="minor">
+              <a:schemeClr val="tx1"/>
+            </a:fontRef>
+          </p:style>
+        </p:cxnSp>
+        <p:cxnSp>
+          <p:nvCxnSpPr>
+            <p:cNvPr id="11" name="Straight Arrow Connector 10"/>
+            <p:cNvCxnSpPr/>
+            <p:nvPr/>
+          </p:nvCxnSpPr>
+          <p:spPr>
+            <a:xfrm rot="5400000" flipV="1">
+              <a:off x="2727476" y="1845733"/>
+              <a:ext cx="0" cy="520096"/>
+            </a:xfrm>
+            <a:prstGeom prst="straightConnector1">
+              <a:avLst/>
+            </a:prstGeom>
+            <a:ln>
+              <a:solidFill>
+                <a:schemeClr val="bg1">
+                  <a:lumMod val="50000"/>
+                </a:schemeClr>
+              </a:solidFill>
+              <a:tailEnd type="arrow"/>
+            </a:ln>
+            <a:effectLst/>
+          </p:spPr>
+          <p:style>
+            <a:lnRef idx="2">
+              <a:schemeClr val="dk1"/>
+            </a:lnRef>
+            <a:fillRef idx="0">
+              <a:schemeClr val="dk1"/>
+            </a:fillRef>
+            <a:effectRef idx="1">
+              <a:schemeClr val="dk1"/>
+            </a:effectRef>
+            <a:fontRef idx="minor">
+              <a:schemeClr val="tx1"/>
+            </a:fontRef>
+          </p:style>
+        </p:cxnSp>
+      </p:grpSp>
+      <p:cxnSp>
+        <p:nvCxnSpPr>
+          <p:cNvPr id="20" name="Straight Arrow Connector 19"/>
+          <p:cNvCxnSpPr/>
+          <p:nvPr/>
+        </p:nvCxnSpPr>
+        <p:spPr>
+          <a:xfrm flipV="1">
+            <a:off x="1366762" y="1672167"/>
+            <a:ext cx="929821" cy="964597"/>
+          </a:xfrm>
+          <a:prstGeom prst="straightConnector1">
+            <a:avLst/>
+          </a:prstGeom>
+          <a:ln w="28575" cmpd="sng">
+            <a:tailEnd type="arrow"/>
+          </a:ln>
+          <a:effectLst/>
+        </p:spPr>
+        <p:style>
+          <a:lnRef idx="2">
+            <a:schemeClr val="dk1"/>
+          </a:lnRef>
+          <a:fillRef idx="0">
+            <a:schemeClr val="dk1"/>
+          </a:fillRef>
+          <a:effectRef idx="1">
+            <a:schemeClr val="dk1"/>
+          </a:effectRef>
+          <a:fontRef idx="minor">
+            <a:schemeClr val="tx1"/>
+          </a:fontRef>
+        </p:style>
+      </p:cxnSp>
+      <p:sp>
+        <p:nvSpPr>
+          <p:cNvPr id="24" name="TextBox 23"/>
+          <p:cNvSpPr txBox="1"/>
+          <p:nvPr/>
+        </p:nvSpPr>
+        <p:spPr>
+          <a:xfrm>
+            <a:off x="1602621" y="1696148"/>
+            <a:ext cx="399142" cy="369332"/>
+          </a:xfrm>
+          <a:prstGeom prst="rect">
+            <a:avLst/>
+          </a:prstGeom>
+          <a:noFill/>
+        </p:spPr>
+        <p:txBody>
+          <a:bodyPr wrap="square" rtlCol="0">
+            <a:spAutoFit/>
+          </a:bodyPr>
+          <a:lstStyle/>
+          <a:p>
+            <a:r>
+              <a:rPr lang="en-US" dirty="0" smtClean="0"/>
+              <a:t>X</a:t>
+            </a:r>
+            <a:r>
+              <a:rPr lang="en-US" baseline="-25000" dirty="0" smtClean="0"/>
+              <a:t>0</a:t>
+            </a:r>
+            <a:endParaRPr lang="en-US" baseline="-25000" dirty="0"/>
+          </a:p>
+        </p:txBody>
+      </p:sp>
+      <p:cxnSp>
+        <p:nvCxnSpPr>
+          <p:cNvPr id="25" name="Straight Arrow Connector 24"/>
+          <p:cNvCxnSpPr/>
+          <p:nvPr/>
+        </p:nvCxnSpPr>
+        <p:spPr>
+          <a:xfrm>
+            <a:off x="2296583" y="1672169"/>
+            <a:ext cx="690133" cy="330388"/>
+          </a:xfrm>
+          <a:prstGeom prst="straightConnector1">
+            <a:avLst/>
+          </a:prstGeom>
+          <a:ln w="28575" cmpd="sng">
+            <a:tailEnd type="arrow"/>
+          </a:ln>
+          <a:effectLst/>
+        </p:spPr>
+        <p:style>
+          <a:lnRef idx="2">
+            <a:schemeClr val="dk1"/>
+          </a:lnRef>
+          <a:fillRef idx="0">
+            <a:schemeClr val="dk1"/>
+          </a:fillRef>
+          <a:effectRef idx="1">
+            <a:schemeClr val="dk1"/>
+          </a:effectRef>
+          <a:fontRef idx="minor">
+            <a:schemeClr val="tx1"/>
+          </a:fontRef>
+        </p:style>
+      </p:cxnSp>
+      <p:sp>
+        <p:nvSpPr>
+          <p:cNvPr id="28" name="TextBox 27"/>
+          <p:cNvSpPr txBox="1"/>
+          <p:nvPr/>
+        </p:nvSpPr>
+        <p:spPr>
+          <a:xfrm>
+            <a:off x="2587574" y="1487503"/>
+            <a:ext cx="399142" cy="369332"/>
+          </a:xfrm>
+          <a:prstGeom prst="rect">
+            <a:avLst/>
+          </a:prstGeom>
+          <a:noFill/>
+        </p:spPr>
+        <p:txBody>
+          <a:bodyPr wrap="square" rtlCol="0">
+            <a:spAutoFit/>
+          </a:bodyPr>
+          <a:lstStyle/>
+          <a:p>
+            <a:r>
+              <a:rPr lang="en-US" dirty="0" smtClean="0"/>
+              <a:t>d</a:t>
+            </a:r>
+            <a:endParaRPr lang="en-US" baseline="-25000" dirty="0"/>
+          </a:p>
+        </p:txBody>
+      </p:sp>
+      <p:grpSp>
+        <p:nvGrpSpPr>
+          <p:cNvPr id="37" name="Group 36"/>
+          <p:cNvGrpSpPr/>
+          <p:nvPr/>
+        </p:nvGrpSpPr>
+        <p:grpSpPr>
+          <a:xfrm>
+            <a:off x="4864496" y="2117574"/>
+            <a:ext cx="520096" cy="520096"/>
+            <a:chOff x="2467428" y="1596571"/>
+            <a:chExt cx="520096" cy="520096"/>
+          </a:xfrm>
+        </p:grpSpPr>
+        <p:cxnSp>
+          <p:nvCxnSpPr>
+            <p:cNvPr id="38" name="Straight Arrow Connector 37"/>
+            <p:cNvCxnSpPr/>
+            <p:nvPr/>
+          </p:nvCxnSpPr>
+          <p:spPr>
+            <a:xfrm flipV="1">
+              <a:off x="2467428" y="1596571"/>
+              <a:ext cx="0" cy="520096"/>
+            </a:xfrm>
+            <a:prstGeom prst="straightConnector1">
+              <a:avLst/>
+            </a:prstGeom>
+            <a:ln>
+              <a:solidFill>
+                <a:schemeClr val="bg1">
+                  <a:lumMod val="50000"/>
+                </a:schemeClr>
+              </a:solidFill>
+              <a:tailEnd type="arrow"/>
+            </a:ln>
+            <a:effectLst/>
+          </p:spPr>
+          <p:style>
+            <a:lnRef idx="2">
+              <a:schemeClr val="dk1"/>
+            </a:lnRef>
+            <a:fillRef idx="0">
+              <a:schemeClr val="dk1"/>
+            </a:fillRef>
+            <a:effectRef idx="1">
+              <a:schemeClr val="dk1"/>
+            </a:effectRef>
+            <a:fontRef idx="minor">
+              <a:schemeClr val="tx1"/>
+            </a:fontRef>
+          </p:style>
+        </p:cxnSp>
+        <p:cxnSp>
+          <p:nvCxnSpPr>
+            <p:cNvPr id="39" name="Straight Arrow Connector 38"/>
+            <p:cNvCxnSpPr/>
+            <p:nvPr/>
+          </p:nvCxnSpPr>
+          <p:spPr>
+            <a:xfrm rot="5400000" flipV="1">
+              <a:off x="2727476" y="1845733"/>
+              <a:ext cx="0" cy="520096"/>
+            </a:xfrm>
+            <a:prstGeom prst="straightConnector1">
+              <a:avLst/>
+            </a:prstGeom>
+            <a:ln>
+              <a:solidFill>
+                <a:schemeClr val="bg1">
+                  <a:lumMod val="50000"/>
+                </a:schemeClr>
+              </a:solidFill>
+              <a:tailEnd type="arrow"/>
+            </a:ln>
+            <a:effectLst/>
+          </p:spPr>
+          <p:style>
+            <a:lnRef idx="2">
+              <a:schemeClr val="dk1"/>
+            </a:lnRef>
+            <a:fillRef idx="0">
+              <a:schemeClr val="dk1"/>
+            </a:fillRef>
+            <a:effectRef idx="1">
+              <a:schemeClr val="dk1"/>
+            </a:effectRef>
+            <a:fontRef idx="minor">
+              <a:schemeClr val="tx1"/>
+            </a:fontRef>
+          </p:style>
+        </p:cxnSp>
+      </p:grpSp>
+      <p:sp>
+        <p:nvSpPr>
+          <p:cNvPr id="46" name="Right Arrow 45"/>
+          <p:cNvSpPr/>
+          <p:nvPr/>
+        </p:nvSpPr>
+        <p:spPr>
+          <a:xfrm>
+            <a:off x="3226741" y="1553323"/>
+            <a:ext cx="1476963" cy="1024314"/>
+          </a:xfrm>
+          <a:prstGeom prst="rightArrow">
+            <a:avLst/>
+          </a:prstGeom>
+        </p:spPr>
+        <p:style>
+          <a:lnRef idx="1">
+            <a:schemeClr val="dk1"/>
+          </a:lnRef>
+          <a:fillRef idx="3">
+            <a:schemeClr val="dk1"/>
+          </a:fillRef>
+          <a:effectRef idx="2">
+            <a:schemeClr val="dk1"/>
+          </a:effectRef>
+          <a:fontRef idx="minor">
+            <a:schemeClr val="lt1"/>
+          </a:fontRef>
+        </p:style>
+        <p:txBody>
+          <a:bodyPr rtlCol="0" anchor="ctr"/>
+          <a:lstStyle/>
+          <a:p>
+            <a:pPr algn="ctr"/>
+            <a:r>
+              <a:rPr lang="en-US" dirty="0" smtClean="0"/>
+              <a:t>Integration</a:t>
+            </a:r>
+            <a:endParaRPr lang="en-US" dirty="0"/>
+          </a:p>
+        </p:txBody>
+      </p:sp>
+      <p:sp>
+        <p:nvSpPr>
+          <p:cNvPr id="47" name="Oval 46"/>
+          <p:cNvSpPr/>
+          <p:nvPr/>
+        </p:nvSpPr>
+        <p:spPr>
+          <a:xfrm>
+            <a:off x="5743911" y="1602947"/>
+            <a:ext cx="100811" cy="100811"/>
+          </a:xfrm>
+          <a:prstGeom prst="ellipse">
+            <a:avLst/>
+          </a:prstGeom>
+          <a:solidFill>
+            <a:schemeClr val="tx1"/>
+          </a:solidFill>
+          <a:effectLst/>
+        </p:spPr>
+        <p:style>
+          <a:lnRef idx="1">
+            <a:schemeClr val="dk1"/>
+          </a:lnRef>
+          <a:fillRef idx="3">
+            <a:schemeClr val="dk1"/>
+          </a:fillRef>
+          <a:effectRef idx="2">
+            <a:schemeClr val="dk1"/>
+          </a:effectRef>
+          <a:fontRef idx="minor">
+            <a:schemeClr val="lt1"/>
+          </a:fontRef>
+        </p:style>
+        <p:txBody>
+          <a:bodyPr rtlCol="0" anchor="ctr"/>
+          <a:lstStyle/>
+          <a:p>
+            <a:pPr algn="ctr"/>
+            <a:endParaRPr lang="en-US"/>
+          </a:p>
+        </p:txBody>
+      </p:sp>
+      <p:sp>
+        <p:nvSpPr>
+          <p:cNvPr id="63" name="TextBox 62"/>
+          <p:cNvSpPr txBox="1"/>
+          <p:nvPr/>
+        </p:nvSpPr>
+        <p:spPr>
+          <a:xfrm>
+            <a:off x="5445580" y="1237097"/>
+            <a:ext cx="518716" cy="369332"/>
+          </a:xfrm>
+          <a:prstGeom prst="rect">
+            <a:avLst/>
+          </a:prstGeom>
+          <a:noFill/>
+        </p:spPr>
+        <p:txBody>
+          <a:bodyPr wrap="square" rtlCol="0">
+            <a:spAutoFit/>
+          </a:bodyPr>
+          <a:lstStyle/>
+          <a:p>
+            <a:r>
+              <a:rPr lang="en-US" dirty="0" smtClean="0"/>
+              <a:t>t=0</a:t>
+            </a:r>
+            <a:endParaRPr lang="en-US" baseline="-25000" dirty="0"/>
+          </a:p>
+        </p:txBody>
+      </p:sp>
+      <p:sp>
+        <p:nvSpPr>
+          <p:cNvPr id="64" name="TextBox 63"/>
+          <p:cNvSpPr txBox="1"/>
+          <p:nvPr/>
+        </p:nvSpPr>
+        <p:spPr>
+          <a:xfrm>
+            <a:off x="7041040" y="1817891"/>
+            <a:ext cx="518716" cy="369332"/>
+          </a:xfrm>
+          <a:prstGeom prst="rect">
+            <a:avLst/>
+          </a:prstGeom>
+          <a:noFill/>
+        </p:spPr>
+        <p:txBody>
+          <a:bodyPr wrap="square" rtlCol="0">
+            <a:spAutoFit/>
+          </a:bodyPr>
+          <a:lstStyle/>
+          <a:p>
+            <a:r>
+              <a:rPr lang="en-US" dirty="0" smtClean="0"/>
+              <a:t>t&gt;0</a:t>
+            </a:r>
+            <a:endParaRPr lang="en-US" baseline="-25000" dirty="0"/>
+          </a:p>
+        </p:txBody>
+      </p:sp>
+      <p:cxnSp>
+        <p:nvCxnSpPr>
+          <p:cNvPr id="31" name="Straight Arrow Connector 30"/>
+          <p:cNvCxnSpPr/>
+          <p:nvPr/>
+        </p:nvCxnSpPr>
+        <p:spPr>
+          <a:xfrm>
+            <a:off x="5794962" y="1668782"/>
+            <a:ext cx="1505436" cy="720699"/>
+          </a:xfrm>
+          <a:prstGeom prst="straightConnector1">
+            <a:avLst/>
+          </a:prstGeom>
+          <a:ln w="28575" cmpd="sng">
+            <a:prstDash val="dash"/>
+            <a:tailEnd type="arrow"/>
+          </a:ln>
+          <a:effectLst/>
+        </p:spPr>
+        <p:style>
+          <a:lnRef idx="2">
+            <a:schemeClr val="dk1"/>
+          </a:lnRef>
+          <a:fillRef idx="0">
+            <a:schemeClr val="dk1"/>
+          </a:fillRef>
+          <a:effectRef idx="1">
+            <a:schemeClr val="dk1"/>
+          </a:effectRef>
+          <a:fontRef idx="minor">
+            <a:schemeClr val="tx1"/>
+          </a:fontRef>
+        </p:style>
+      </p:cxnSp>
+    </p:spTree>
+    <p:extLst>
+      <p:ext uri="{BB962C8B-B14F-4D97-AF65-F5344CB8AC3E}">
+        <p14:creationId xmlns:p14="http://schemas.microsoft.com/office/powerpoint/2010/main" val="2294981694"/>
+      </p:ext>
+    </p:extLst>
+  </p:cSld>
+  <p:clrMapOvr>
+    <a:masterClrMapping/>
+  </p:clrMapOvr>
+</p:sld>
+</file>
+
+<file path=ppt/slides/slide4.xml><?xml version="1.0" encoding="utf-8"?>
 <p:sld xmlns:a="http://schemas.openxmlformats.org/drawingml/2006/main" xmlns:r="http://schemas.openxmlformats.org/officeDocument/2006/relationships" xmlns:p="http://schemas.openxmlformats.org/presentationml/2006/main">
   <p:cSld>
     <p:spTree>

</xml_diff>

<commit_message>
waiting for pool to open
</commit_message>
<xml_diff>
--- a/figures/figures.pptx
+++ b/figures/figures.pptx
@@ -11183,7 +11183,7 @@
           <a:p>
             <a:r>
               <a:rPr lang="en-US" dirty="0" smtClean="0"/>
-              <a:t>X</a:t>
+              <a:t>x</a:t>
             </a:r>
             <a:r>
               <a:rPr lang="en-US" baseline="-25000" dirty="0" smtClean="0"/>
@@ -11251,7 +11251,11 @@
           <a:p>
             <a:r>
               <a:rPr lang="en-US" dirty="0" smtClean="0"/>
-              <a:t>d</a:t>
+              <a:t>v</a:t>
+            </a:r>
+            <a:r>
+              <a:rPr lang="en-US" baseline="-25000" dirty="0" smtClean="0"/>
+              <a:t>0</a:t>
             </a:r>
             <a:endParaRPr lang="en-US" baseline="-25000" dirty="0"/>
           </a:p>
@@ -11529,6 +11533,156 @@
           </a:fontRef>
         </p:style>
       </p:cxnSp>
+      <p:grpSp>
+        <p:nvGrpSpPr>
+          <p:cNvPr id="2" name="Group 1"/>
+          <p:cNvGrpSpPr/>
+          <p:nvPr/>
+        </p:nvGrpSpPr>
+        <p:grpSpPr>
+          <a:xfrm>
+            <a:off x="1137812" y="2216670"/>
+            <a:ext cx="686793" cy="650638"/>
+            <a:chOff x="1137812" y="2216670"/>
+            <a:chExt cx="686793" cy="650638"/>
+          </a:xfrm>
+        </p:grpSpPr>
+        <p:sp>
+          <p:nvSpPr>
+            <p:cNvPr id="17" name="TextBox 16"/>
+            <p:cNvSpPr txBox="1"/>
+            <p:nvPr/>
+          </p:nvSpPr>
+          <p:spPr>
+            <a:xfrm>
+              <a:off x="1425463" y="2528754"/>
+              <a:ext cx="399142" cy="338554"/>
+            </a:xfrm>
+            <a:prstGeom prst="rect">
+              <a:avLst/>
+            </a:prstGeom>
+            <a:noFill/>
+          </p:spPr>
+          <p:txBody>
+            <a:bodyPr wrap="square" rtlCol="0">
+              <a:spAutoFit/>
+            </a:bodyPr>
+            <a:lstStyle/>
+            <a:p>
+              <a:r>
+                <a:rPr lang="en-US" sz="1600" dirty="0" smtClean="0"/>
+                <a:t>x</a:t>
+              </a:r>
+              <a:endParaRPr lang="en-US" sz="1600" baseline="-25000" dirty="0"/>
+            </a:p>
+          </p:txBody>
+        </p:sp>
+        <p:sp>
+          <p:nvSpPr>
+            <p:cNvPr id="18" name="TextBox 17"/>
+            <p:cNvSpPr txBox="1"/>
+            <p:nvPr/>
+          </p:nvSpPr>
+          <p:spPr>
+            <a:xfrm>
+              <a:off x="1137812" y="2216670"/>
+              <a:ext cx="399142" cy="338554"/>
+            </a:xfrm>
+            <a:prstGeom prst="rect">
+              <a:avLst/>
+            </a:prstGeom>
+            <a:noFill/>
+          </p:spPr>
+          <p:txBody>
+            <a:bodyPr wrap="square" rtlCol="0">
+              <a:spAutoFit/>
+            </a:bodyPr>
+            <a:lstStyle/>
+            <a:p>
+              <a:r>
+                <a:rPr lang="en-US" sz="1600" dirty="0" smtClean="0"/>
+                <a:t>y</a:t>
+              </a:r>
+              <a:endParaRPr lang="en-US" sz="1600" baseline="-25000" dirty="0"/>
+            </a:p>
+          </p:txBody>
+        </p:sp>
+      </p:grpSp>
+      <p:grpSp>
+        <p:nvGrpSpPr>
+          <p:cNvPr id="21" name="Group 20"/>
+          <p:cNvGrpSpPr/>
+          <p:nvPr/>
+        </p:nvGrpSpPr>
+        <p:grpSpPr>
+          <a:xfrm>
+            <a:off x="4650250" y="2217744"/>
+            <a:ext cx="686793" cy="650638"/>
+            <a:chOff x="1137812" y="2216670"/>
+            <a:chExt cx="686793" cy="650638"/>
+          </a:xfrm>
+        </p:grpSpPr>
+        <p:sp>
+          <p:nvSpPr>
+            <p:cNvPr id="22" name="TextBox 21"/>
+            <p:cNvSpPr txBox="1"/>
+            <p:nvPr/>
+          </p:nvSpPr>
+          <p:spPr>
+            <a:xfrm>
+              <a:off x="1425463" y="2528754"/>
+              <a:ext cx="399142" cy="338554"/>
+            </a:xfrm>
+            <a:prstGeom prst="rect">
+              <a:avLst/>
+            </a:prstGeom>
+            <a:noFill/>
+          </p:spPr>
+          <p:txBody>
+            <a:bodyPr wrap="square" rtlCol="0">
+              <a:spAutoFit/>
+            </a:bodyPr>
+            <a:lstStyle/>
+            <a:p>
+              <a:r>
+                <a:rPr lang="en-US" sz="1600" dirty="0" smtClean="0"/>
+                <a:t>x</a:t>
+              </a:r>
+              <a:endParaRPr lang="en-US" sz="1600" baseline="-25000" dirty="0"/>
+            </a:p>
+          </p:txBody>
+        </p:sp>
+        <p:sp>
+          <p:nvSpPr>
+            <p:cNvPr id="23" name="TextBox 22"/>
+            <p:cNvSpPr txBox="1"/>
+            <p:nvPr/>
+          </p:nvSpPr>
+          <p:spPr>
+            <a:xfrm>
+              <a:off x="1137812" y="2216670"/>
+              <a:ext cx="399142" cy="338554"/>
+            </a:xfrm>
+            <a:prstGeom prst="rect">
+              <a:avLst/>
+            </a:prstGeom>
+            <a:noFill/>
+          </p:spPr>
+          <p:txBody>
+            <a:bodyPr wrap="square" rtlCol="0">
+              <a:spAutoFit/>
+            </a:bodyPr>
+            <a:lstStyle/>
+            <a:p>
+              <a:r>
+                <a:rPr lang="en-US" sz="1600" dirty="0" smtClean="0"/>
+                <a:t>y</a:t>
+              </a:r>
+              <a:endParaRPr lang="en-US" sz="1600" baseline="-25000" dirty="0"/>
+            </a:p>
+          </p:txBody>
+        </p:sp>
+      </p:grpSp>
     </p:spTree>
     <p:extLst>
       <p:ext uri="{BB962C8B-B14F-4D97-AF65-F5344CB8AC3E}">
@@ -12191,7 +12345,7 @@
           <a:p>
             <a:r>
               <a:rPr lang="en-US" dirty="0" smtClean="0"/>
-              <a:t>X</a:t>
+              <a:t>x</a:t>
             </a:r>
             <a:r>
               <a:rPr lang="en-US" baseline="-25000" dirty="0" smtClean="0"/>
@@ -12421,6 +12575,156 @@
           </a:p>
         </p:txBody>
       </p:sp>
+      <p:grpSp>
+        <p:nvGrpSpPr>
+          <p:cNvPr id="41" name="Group 40"/>
+          <p:cNvGrpSpPr/>
+          <p:nvPr/>
+        </p:nvGrpSpPr>
+        <p:grpSpPr>
+          <a:xfrm>
+            <a:off x="1167347" y="2181228"/>
+            <a:ext cx="686793" cy="650638"/>
+            <a:chOff x="1137812" y="2216670"/>
+            <a:chExt cx="686793" cy="650638"/>
+          </a:xfrm>
+        </p:grpSpPr>
+        <p:sp>
+          <p:nvSpPr>
+            <p:cNvPr id="42" name="TextBox 41"/>
+            <p:cNvSpPr txBox="1"/>
+            <p:nvPr/>
+          </p:nvSpPr>
+          <p:spPr>
+            <a:xfrm>
+              <a:off x="1425463" y="2528754"/>
+              <a:ext cx="399142" cy="338554"/>
+            </a:xfrm>
+            <a:prstGeom prst="rect">
+              <a:avLst/>
+            </a:prstGeom>
+            <a:noFill/>
+          </p:spPr>
+          <p:txBody>
+            <a:bodyPr wrap="square" rtlCol="0">
+              <a:spAutoFit/>
+            </a:bodyPr>
+            <a:lstStyle/>
+            <a:p>
+              <a:r>
+                <a:rPr lang="en-US" sz="1600" dirty="0" smtClean="0"/>
+                <a:t>x</a:t>
+              </a:r>
+              <a:endParaRPr lang="en-US" sz="1600" baseline="-25000" dirty="0"/>
+            </a:p>
+          </p:txBody>
+        </p:sp>
+        <p:sp>
+          <p:nvSpPr>
+            <p:cNvPr id="43" name="TextBox 42"/>
+            <p:cNvSpPr txBox="1"/>
+            <p:nvPr/>
+          </p:nvSpPr>
+          <p:spPr>
+            <a:xfrm>
+              <a:off x="1137812" y="2216670"/>
+              <a:ext cx="399142" cy="338554"/>
+            </a:xfrm>
+            <a:prstGeom prst="rect">
+              <a:avLst/>
+            </a:prstGeom>
+            <a:noFill/>
+          </p:spPr>
+          <p:txBody>
+            <a:bodyPr wrap="square" rtlCol="0">
+              <a:spAutoFit/>
+            </a:bodyPr>
+            <a:lstStyle/>
+            <a:p>
+              <a:r>
+                <a:rPr lang="en-US" sz="1600" dirty="0" smtClean="0"/>
+                <a:t>y</a:t>
+              </a:r>
+              <a:endParaRPr lang="en-US" sz="1600" baseline="-25000" dirty="0"/>
+            </a:p>
+          </p:txBody>
+        </p:sp>
+      </p:grpSp>
+      <p:grpSp>
+        <p:nvGrpSpPr>
+          <p:cNvPr id="44" name="Group 43"/>
+          <p:cNvGrpSpPr/>
+          <p:nvPr/>
+        </p:nvGrpSpPr>
+        <p:grpSpPr>
+          <a:xfrm>
+            <a:off x="4650238" y="2181228"/>
+            <a:ext cx="686793" cy="650638"/>
+            <a:chOff x="1137812" y="2216670"/>
+            <a:chExt cx="686793" cy="650638"/>
+          </a:xfrm>
+        </p:grpSpPr>
+        <p:sp>
+          <p:nvSpPr>
+            <p:cNvPr id="45" name="TextBox 44"/>
+            <p:cNvSpPr txBox="1"/>
+            <p:nvPr/>
+          </p:nvSpPr>
+          <p:spPr>
+            <a:xfrm>
+              <a:off x="1425463" y="2528754"/>
+              <a:ext cx="399142" cy="338554"/>
+            </a:xfrm>
+            <a:prstGeom prst="rect">
+              <a:avLst/>
+            </a:prstGeom>
+            <a:noFill/>
+          </p:spPr>
+          <p:txBody>
+            <a:bodyPr wrap="square" rtlCol="0">
+              <a:spAutoFit/>
+            </a:bodyPr>
+            <a:lstStyle/>
+            <a:p>
+              <a:r>
+                <a:rPr lang="en-US" sz="1600" dirty="0" smtClean="0"/>
+                <a:t>x</a:t>
+              </a:r>
+              <a:endParaRPr lang="en-US" sz="1600" baseline="-25000" dirty="0"/>
+            </a:p>
+          </p:txBody>
+        </p:sp>
+        <p:sp>
+          <p:nvSpPr>
+            <p:cNvPr id="46" name="TextBox 45"/>
+            <p:cNvSpPr txBox="1"/>
+            <p:nvPr/>
+          </p:nvSpPr>
+          <p:spPr>
+            <a:xfrm>
+              <a:off x="1137812" y="2216670"/>
+              <a:ext cx="399142" cy="338554"/>
+            </a:xfrm>
+            <a:prstGeom prst="rect">
+              <a:avLst/>
+            </a:prstGeom>
+            <a:noFill/>
+          </p:spPr>
+          <p:txBody>
+            <a:bodyPr wrap="square" rtlCol="0">
+              <a:spAutoFit/>
+            </a:bodyPr>
+            <a:lstStyle/>
+            <a:p>
+              <a:r>
+                <a:rPr lang="en-US" sz="1600" dirty="0" smtClean="0"/>
+                <a:t>y</a:t>
+              </a:r>
+              <a:endParaRPr lang="en-US" sz="1600" baseline="-25000" dirty="0"/>
+            </a:p>
+          </p:txBody>
+        </p:sp>
+      </p:grpSp>
     </p:spTree>
     <p:extLst>
       <p:ext uri="{BB962C8B-B14F-4D97-AF65-F5344CB8AC3E}">

</xml_diff>

<commit_message>
LOOK INTO MY EYES kaskade
</commit_message>
<xml_diff>
--- a/figures/figures.pptx
+++ b/figures/figures.pptx
@@ -15,16 +15,17 @@
     <p:sldId id="262" r:id="rId9"/>
     <p:sldId id="263" r:id="rId10"/>
     <p:sldId id="264" r:id="rId11"/>
-    <p:sldId id="265" r:id="rId12"/>
-    <p:sldId id="266" r:id="rId13"/>
-    <p:sldId id="267" r:id="rId14"/>
-    <p:sldId id="268" r:id="rId15"/>
-    <p:sldId id="269" r:id="rId16"/>
-    <p:sldId id="270" r:id="rId17"/>
-    <p:sldId id="271" r:id="rId18"/>
-    <p:sldId id="272" r:id="rId19"/>
-    <p:sldId id="273" r:id="rId20"/>
-    <p:sldId id="274" r:id="rId21"/>
+    <p:sldId id="276" r:id="rId12"/>
+    <p:sldId id="265" r:id="rId13"/>
+    <p:sldId id="266" r:id="rId14"/>
+    <p:sldId id="267" r:id="rId15"/>
+    <p:sldId id="268" r:id="rId16"/>
+    <p:sldId id="269" r:id="rId17"/>
+    <p:sldId id="270" r:id="rId18"/>
+    <p:sldId id="271" r:id="rId19"/>
+    <p:sldId id="272" r:id="rId20"/>
+    <p:sldId id="273" r:id="rId21"/>
+    <p:sldId id="274" r:id="rId22"/>
   </p:sldIdLst>
   <p:sldSz cx="9144000" cy="6858000" type="screen4x3"/>
   <p:notesSz cx="6858000" cy="9144000"/>
@@ -4120,7 +4121,7 @@
         <p:spPr>
           <a:xfrm>
             <a:off x="5445580" y="1282452"/>
-            <a:ext cx="518716" cy="369332"/>
+            <a:ext cx="738232" cy="369332"/>
           </a:xfrm>
           <a:prstGeom prst="rect">
             <a:avLst/>
@@ -4135,7 +4136,11 @@
           <a:p>
             <a:r>
               <a:rPr lang="en-US" dirty="0" smtClean="0"/>
-              <a:t>t=1</a:t>
+              <a:t>t=</a:t>
+            </a:r>
+            <a:r>
+              <a:rPr lang="en-US" dirty="0" smtClean="0"/>
+              <a:t>1.0</a:t>
             </a:r>
             <a:endParaRPr lang="en-US" baseline="-25000" dirty="0"/>
           </a:p>
@@ -4149,8 +4154,8 @@
         </p:nvSpPr>
         <p:spPr>
           <a:xfrm>
-            <a:off x="6548227" y="2315814"/>
-            <a:ext cx="518716" cy="369332"/>
+            <a:off x="6542680" y="2376820"/>
+            <a:ext cx="678237" cy="369332"/>
           </a:xfrm>
           <a:prstGeom prst="rect">
             <a:avLst/>
@@ -4165,7 +4170,11 @@
           <a:p>
             <a:r>
               <a:rPr lang="en-US" dirty="0" smtClean="0"/>
-              <a:t>t=2</a:t>
+              <a:t>t=</a:t>
+            </a:r>
+            <a:r>
+              <a:rPr lang="en-US" dirty="0" smtClean="0"/>
+              <a:t>2.0</a:t>
             </a:r>
             <a:endParaRPr lang="en-US" baseline="-25000" dirty="0"/>
           </a:p>
@@ -4285,7 +4294,7 @@
           <p:spPr>
             <a:xfrm>
               <a:off x="5013805" y="4254762"/>
-              <a:ext cx="529566" cy="369332"/>
+              <a:ext cx="571500" cy="338554"/>
             </a:xfrm>
             <a:prstGeom prst="rect">
               <a:avLst/>
@@ -4299,14 +4308,18 @@
             <a:lstStyle/>
             <a:p>
               <a:r>
-                <a:rPr lang="en-US" dirty="0" smtClean="0"/>
+                <a:rPr lang="en-US" sz="1600" dirty="0" smtClean="0"/>
                 <a:t>a</a:t>
               </a:r>
               <a:r>
-                <a:rPr lang="en-US" baseline="-25000" dirty="0" smtClean="0"/>
-                <a:t>t=1</a:t>
+                <a:rPr lang="en-US" sz="1600" baseline="-25000" dirty="0" smtClean="0"/>
+                <a:t>t=</a:t>
               </a:r>
-              <a:endParaRPr lang="en-US" baseline="-25000" dirty="0"/>
+              <a:r>
+                <a:rPr lang="en-US" sz="1600" baseline="-25000" dirty="0" smtClean="0"/>
+                <a:t>1.0</a:t>
+              </a:r>
+              <a:endParaRPr lang="en-US" sz="1600" baseline="-25000" dirty="0"/>
             </a:p>
           </p:txBody>
         </p:sp>
@@ -4390,8 +4403,8 @@
           </p:nvSpPr>
           <p:spPr>
             <a:xfrm>
-              <a:off x="4300605" y="3856219"/>
-              <a:ext cx="529566" cy="369332"/>
+              <a:off x="4212907" y="3856219"/>
+              <a:ext cx="617264" cy="338554"/>
             </a:xfrm>
             <a:prstGeom prst="rect">
               <a:avLst/>
@@ -4405,14 +4418,18 @@
             <a:lstStyle/>
             <a:p>
               <a:r>
-                <a:rPr lang="en-US" dirty="0" smtClean="0"/>
+                <a:rPr lang="en-US" sz="1600" dirty="0" smtClean="0"/>
                 <a:t>a</a:t>
               </a:r>
               <a:r>
-                <a:rPr lang="en-US" baseline="-25000" dirty="0" smtClean="0"/>
-                <a:t>t=2</a:t>
+                <a:rPr lang="en-US" sz="1600" baseline="-25000" dirty="0" smtClean="0"/>
+                <a:t>t=</a:t>
               </a:r>
-              <a:endParaRPr lang="en-US" baseline="-25000" dirty="0"/>
+              <a:r>
+                <a:rPr lang="en-US" sz="1600" baseline="-25000" dirty="0" smtClean="0"/>
+                <a:t>2.0</a:t>
+              </a:r>
+              <a:endParaRPr lang="en-US" sz="1600" baseline="-25000" dirty="0"/>
             </a:p>
           </p:txBody>
         </p:sp>
@@ -4495,6 +4512,1400 @@
 </file>
 
 <file path=ppt/slides/slide11.xml><?xml version="1.0" encoding="utf-8"?>
+<p:sld xmlns:a="http://schemas.openxmlformats.org/drawingml/2006/main" xmlns:r="http://schemas.openxmlformats.org/officeDocument/2006/relationships" xmlns:p="http://schemas.openxmlformats.org/presentationml/2006/main">
+  <p:cSld>
+    <p:spTree>
+      <p:nvGrpSpPr>
+        <p:cNvPr id="1" name=""/>
+        <p:cNvGrpSpPr/>
+        <p:nvPr/>
+      </p:nvGrpSpPr>
+      <p:grpSpPr>
+        <a:xfrm>
+          <a:off x="0" y="0"/>
+          <a:ext cx="0" cy="0"/>
+          <a:chOff x="0" y="0"/>
+          <a:chExt cx="0" cy="0"/>
+        </a:xfrm>
+      </p:grpSpPr>
+      <p:sp>
+        <p:nvSpPr>
+          <p:cNvPr id="16" name="Right Arrow 15"/>
+          <p:cNvSpPr/>
+          <p:nvPr/>
+        </p:nvSpPr>
+        <p:spPr>
+          <a:xfrm>
+            <a:off x="4811294" y="3884395"/>
+            <a:ext cx="1476963" cy="1024314"/>
+          </a:xfrm>
+          <a:prstGeom prst="rightArrow">
+            <a:avLst/>
+          </a:prstGeom>
+        </p:spPr>
+        <p:style>
+          <a:lnRef idx="1">
+            <a:schemeClr val="dk1"/>
+          </a:lnRef>
+          <a:fillRef idx="3">
+            <a:schemeClr val="dk1"/>
+          </a:fillRef>
+          <a:effectRef idx="2">
+            <a:schemeClr val="dk1"/>
+          </a:effectRef>
+          <a:fontRef idx="minor">
+            <a:schemeClr val="lt1"/>
+          </a:fontRef>
+        </p:style>
+        <p:txBody>
+          <a:bodyPr rtlCol="0" anchor="ctr"/>
+          <a:lstStyle/>
+          <a:p>
+            <a:pPr algn="ctr"/>
+            <a:r>
+              <a:rPr lang="en-US" dirty="0" smtClean="0"/>
+              <a:t>Projection</a:t>
+            </a:r>
+            <a:endParaRPr lang="en-US" dirty="0"/>
+          </a:p>
+        </p:txBody>
+      </p:sp>
+      <p:grpSp>
+        <p:nvGrpSpPr>
+          <p:cNvPr id="13" name="Group 12"/>
+          <p:cNvGrpSpPr/>
+          <p:nvPr/>
+        </p:nvGrpSpPr>
+        <p:grpSpPr>
+          <a:xfrm>
+            <a:off x="2940724" y="361955"/>
+            <a:ext cx="1372398" cy="1379838"/>
+            <a:chOff x="5441415" y="227422"/>
+            <a:chExt cx="1372398" cy="1379838"/>
+          </a:xfrm>
+        </p:grpSpPr>
+        <p:sp>
+          <p:nvSpPr>
+            <p:cNvPr id="26" name="Rectangle 25"/>
+            <p:cNvSpPr/>
+            <p:nvPr/>
+          </p:nvSpPr>
+          <p:spPr>
+            <a:xfrm>
+              <a:off x="5441415" y="227422"/>
+              <a:ext cx="1372398" cy="1379838"/>
+            </a:xfrm>
+            <a:prstGeom prst="rect">
+              <a:avLst/>
+            </a:prstGeom>
+            <a:noFill/>
+            <a:ln w="12700" cmpd="sng"/>
+          </p:spPr>
+          <p:style>
+            <a:lnRef idx="2">
+              <a:schemeClr val="dk1"/>
+            </a:lnRef>
+            <a:fillRef idx="1">
+              <a:schemeClr val="lt1"/>
+            </a:fillRef>
+            <a:effectRef idx="0">
+              <a:schemeClr val="dk1"/>
+            </a:effectRef>
+            <a:fontRef idx="minor">
+              <a:schemeClr val="dk1"/>
+            </a:fontRef>
+          </p:style>
+          <p:txBody>
+            <a:bodyPr rtlCol="0" anchor="ctr"/>
+            <a:lstStyle/>
+            <a:p>
+              <a:pPr algn="ctr"/>
+              <a:endParaRPr lang="en-US"/>
+            </a:p>
+          </p:txBody>
+        </p:sp>
+        <p:sp>
+          <p:nvSpPr>
+            <p:cNvPr id="28" name="Arc 27"/>
+            <p:cNvSpPr/>
+            <p:nvPr/>
+          </p:nvSpPr>
+          <p:spPr>
+            <a:xfrm rot="10800000" flipH="1">
+              <a:off x="5526617" y="295088"/>
+              <a:ext cx="1143000" cy="1141532"/>
+            </a:xfrm>
+            <a:prstGeom prst="arc">
+              <a:avLst>
+                <a:gd name="adj1" fmla="val 15966533"/>
+                <a:gd name="adj2" fmla="val 18690824"/>
+              </a:avLst>
+            </a:prstGeom>
+            <a:ln>
+              <a:solidFill>
+                <a:schemeClr val="bg1">
+                  <a:lumMod val="50000"/>
+                </a:schemeClr>
+              </a:solidFill>
+              <a:prstDash val="sysDash"/>
+              <a:headEnd type="none"/>
+              <a:tailEnd type="arrow"/>
+            </a:ln>
+          </p:spPr>
+          <p:style>
+            <a:lnRef idx="2">
+              <a:schemeClr val="dk1"/>
+            </a:lnRef>
+            <a:fillRef idx="0">
+              <a:schemeClr val="dk1"/>
+            </a:fillRef>
+            <a:effectRef idx="1">
+              <a:schemeClr val="dk1"/>
+            </a:effectRef>
+            <a:fontRef idx="minor">
+              <a:schemeClr val="tx1"/>
+            </a:fontRef>
+          </p:style>
+          <p:txBody>
+            <a:bodyPr rtlCol="0" anchor="ctr"/>
+            <a:lstStyle/>
+            <a:p>
+              <a:pPr algn="ctr"/>
+              <a:endParaRPr lang="en-US"/>
+            </a:p>
+          </p:txBody>
+        </p:sp>
+        <p:sp>
+          <p:nvSpPr>
+            <p:cNvPr id="33" name="TextBox 32"/>
+            <p:cNvSpPr txBox="1"/>
+            <p:nvPr/>
+          </p:nvSpPr>
+          <p:spPr>
+            <a:xfrm>
+              <a:off x="5507967" y="939542"/>
+              <a:ext cx="680059" cy="338554"/>
+            </a:xfrm>
+            <a:prstGeom prst="rect">
+              <a:avLst/>
+            </a:prstGeom>
+            <a:noFill/>
+          </p:spPr>
+          <p:txBody>
+            <a:bodyPr wrap="square" rtlCol="0">
+              <a:spAutoFit/>
+            </a:bodyPr>
+            <a:lstStyle/>
+            <a:p>
+              <a:r>
+                <a:rPr lang="en-US" sz="1600" dirty="0" smtClean="0"/>
+                <a:t>a</a:t>
+              </a:r>
+              <a:r>
+                <a:rPr lang="en-US" sz="1600" baseline="-25000" dirty="0" smtClean="0"/>
+                <a:t>t=</a:t>
+              </a:r>
+              <a:r>
+                <a:rPr lang="en-US" sz="1600" baseline="-25000" dirty="0" smtClean="0"/>
+                <a:t>1.0</a:t>
+              </a:r>
+              <a:endParaRPr lang="en-US" sz="1600" baseline="-25000" dirty="0"/>
+            </a:p>
+          </p:txBody>
+        </p:sp>
+        <p:cxnSp>
+          <p:nvCxnSpPr>
+            <p:cNvPr id="34" name="Straight Arrow Connector 33"/>
+            <p:cNvCxnSpPr/>
+            <p:nvPr/>
+          </p:nvCxnSpPr>
+          <p:spPr>
+            <a:xfrm>
+              <a:off x="6058431" y="865854"/>
+              <a:ext cx="248" cy="570766"/>
+            </a:xfrm>
+            <a:prstGeom prst="straightConnector1">
+              <a:avLst/>
+            </a:prstGeom>
+            <a:ln w="28575" cmpd="sng">
+              <a:tailEnd type="arrow"/>
+            </a:ln>
+            <a:effectLst/>
+          </p:spPr>
+          <p:style>
+            <a:lnRef idx="2">
+              <a:schemeClr val="dk1"/>
+            </a:lnRef>
+            <a:fillRef idx="0">
+              <a:schemeClr val="dk1"/>
+            </a:fillRef>
+            <a:effectRef idx="1">
+              <a:schemeClr val="dk1"/>
+            </a:effectRef>
+            <a:fontRef idx="minor">
+              <a:schemeClr val="tx1"/>
+            </a:fontRef>
+          </p:style>
+        </p:cxnSp>
+        <p:cxnSp>
+          <p:nvCxnSpPr>
+            <p:cNvPr id="35" name="Straight Arrow Connector 34"/>
+            <p:cNvCxnSpPr>
+              <a:endCxn id="28" idx="2"/>
+            </p:cNvCxnSpPr>
+            <p:nvPr/>
+          </p:nvCxnSpPr>
+          <p:spPr>
+            <a:xfrm>
+              <a:off x="6058431" y="865854"/>
+              <a:ext cx="418203" cy="427629"/>
+            </a:xfrm>
+            <a:prstGeom prst="straightConnector1">
+              <a:avLst/>
+            </a:prstGeom>
+            <a:ln w="28575" cmpd="sng">
+              <a:tailEnd type="arrow"/>
+            </a:ln>
+            <a:effectLst/>
+          </p:spPr>
+          <p:style>
+            <a:lnRef idx="2">
+              <a:schemeClr val="dk1"/>
+            </a:lnRef>
+            <a:fillRef idx="0">
+              <a:schemeClr val="dk1"/>
+            </a:fillRef>
+            <a:effectRef idx="1">
+              <a:schemeClr val="dk1"/>
+            </a:effectRef>
+            <a:fontRef idx="minor">
+              <a:schemeClr val="tx1"/>
+            </a:fontRef>
+          </p:style>
+        </p:cxnSp>
+        <p:sp>
+          <p:nvSpPr>
+            <p:cNvPr id="36" name="TextBox 35"/>
+            <p:cNvSpPr txBox="1"/>
+            <p:nvPr/>
+          </p:nvSpPr>
+          <p:spPr>
+            <a:xfrm>
+              <a:off x="6211119" y="753875"/>
+              <a:ext cx="602694" cy="338554"/>
+            </a:xfrm>
+            <a:prstGeom prst="rect">
+              <a:avLst/>
+            </a:prstGeom>
+            <a:noFill/>
+          </p:spPr>
+          <p:txBody>
+            <a:bodyPr wrap="square" rtlCol="0">
+              <a:spAutoFit/>
+            </a:bodyPr>
+            <a:lstStyle/>
+            <a:p>
+              <a:r>
+                <a:rPr lang="en-US" sz="1600" dirty="0" smtClean="0"/>
+                <a:t>a</a:t>
+              </a:r>
+              <a:r>
+                <a:rPr lang="en-US" sz="1600" baseline="-25000" dirty="0" smtClean="0"/>
+                <a:t>t=</a:t>
+              </a:r>
+              <a:r>
+                <a:rPr lang="en-US" sz="1600" baseline="-25000" dirty="0" smtClean="0"/>
+                <a:t>2.0</a:t>
+              </a:r>
+              <a:endParaRPr lang="en-US" sz="1600" baseline="-25000" dirty="0"/>
+            </a:p>
+          </p:txBody>
+        </p:sp>
+        <p:sp>
+          <p:nvSpPr>
+            <p:cNvPr id="37" name="TextBox 36"/>
+            <p:cNvSpPr txBox="1"/>
+            <p:nvPr/>
+          </p:nvSpPr>
+          <p:spPr>
+            <a:xfrm>
+              <a:off x="5741627" y="295088"/>
+              <a:ext cx="745367" cy="369332"/>
+            </a:xfrm>
+            <a:prstGeom prst="rect">
+              <a:avLst/>
+            </a:prstGeom>
+            <a:noFill/>
+          </p:spPr>
+          <p:txBody>
+            <a:bodyPr wrap="square" rtlCol="0">
+              <a:spAutoFit/>
+            </a:bodyPr>
+            <a:lstStyle/>
+            <a:p>
+              <a:r>
+                <a:rPr lang="en-US" dirty="0" smtClean="0"/>
+                <a:t>Turn:</a:t>
+              </a:r>
+              <a:endParaRPr lang="en-US" dirty="0"/>
+            </a:p>
+          </p:txBody>
+        </p:sp>
+      </p:grpSp>
+      <p:grpSp>
+        <p:nvGrpSpPr>
+          <p:cNvPr id="8" name="Group 7"/>
+          <p:cNvGrpSpPr/>
+          <p:nvPr/>
+        </p:nvGrpSpPr>
+        <p:grpSpPr>
+          <a:xfrm>
+            <a:off x="2204935" y="1965136"/>
+            <a:ext cx="3210635" cy="1407102"/>
+            <a:chOff x="1063660" y="2131781"/>
+            <a:chExt cx="2724728" cy="1194147"/>
+          </a:xfrm>
+        </p:grpSpPr>
+        <p:sp>
+          <p:nvSpPr>
+            <p:cNvPr id="12" name="Freeform 11"/>
+            <p:cNvSpPr/>
+            <p:nvPr/>
+          </p:nvSpPr>
+          <p:spPr>
+            <a:xfrm rot="1049416">
+              <a:off x="1063660" y="2131781"/>
+              <a:ext cx="2724728" cy="1177063"/>
+            </a:xfrm>
+            <a:custGeom>
+              <a:avLst/>
+              <a:gdLst>
+                <a:gd name="connsiteX0" fmla="*/ 0 w 3009516"/>
+                <a:gd name="connsiteY0" fmla="*/ 638849 h 1585576"/>
+                <a:gd name="connsiteX1" fmla="*/ 284788 w 3009516"/>
+                <a:gd name="connsiteY1" fmla="*/ 0 h 1585576"/>
+                <a:gd name="connsiteX2" fmla="*/ 569576 w 3009516"/>
+                <a:gd name="connsiteY2" fmla="*/ 307879 h 1585576"/>
+                <a:gd name="connsiteX3" fmla="*/ 3009516 w 3009516"/>
+                <a:gd name="connsiteY3" fmla="*/ 815879 h 1585576"/>
+                <a:gd name="connsiteX4" fmla="*/ 2709334 w 3009516"/>
+                <a:gd name="connsiteY4" fmla="*/ 1585576 h 1585576"/>
+                <a:gd name="connsiteX5" fmla="*/ 53879 w 3009516"/>
+                <a:gd name="connsiteY5" fmla="*/ 1239212 h 1585576"/>
+                <a:gd name="connsiteX6" fmla="*/ 0 w 3009516"/>
+                <a:gd name="connsiteY6" fmla="*/ 638849 h 1585576"/>
+                <a:gd name="connsiteX0" fmla="*/ 0 w 3009516"/>
+                <a:gd name="connsiteY0" fmla="*/ 638849 h 1585576"/>
+                <a:gd name="connsiteX1" fmla="*/ 284788 w 3009516"/>
+                <a:gd name="connsiteY1" fmla="*/ 0 h 1585576"/>
+                <a:gd name="connsiteX2" fmla="*/ 569576 w 3009516"/>
+                <a:gd name="connsiteY2" fmla="*/ 307879 h 1585576"/>
+                <a:gd name="connsiteX3" fmla="*/ 3009516 w 3009516"/>
+                <a:gd name="connsiteY3" fmla="*/ 815879 h 1585576"/>
+                <a:gd name="connsiteX4" fmla="*/ 2709334 w 3009516"/>
+                <a:gd name="connsiteY4" fmla="*/ 1585576 h 1585576"/>
+                <a:gd name="connsiteX5" fmla="*/ 635975 w 3009516"/>
+                <a:gd name="connsiteY5" fmla="*/ 962217 h 1585576"/>
+                <a:gd name="connsiteX6" fmla="*/ 0 w 3009516"/>
+                <a:gd name="connsiteY6" fmla="*/ 638849 h 1585576"/>
+                <a:gd name="connsiteX0" fmla="*/ 8417 w 2724728"/>
+                <a:gd name="connsiteY0" fmla="*/ 632827 h 1585576"/>
+                <a:gd name="connsiteX1" fmla="*/ 0 w 2724728"/>
+                <a:gd name="connsiteY1" fmla="*/ 0 h 1585576"/>
+                <a:gd name="connsiteX2" fmla="*/ 284788 w 2724728"/>
+                <a:gd name="connsiteY2" fmla="*/ 307879 h 1585576"/>
+                <a:gd name="connsiteX3" fmla="*/ 2724728 w 2724728"/>
+                <a:gd name="connsiteY3" fmla="*/ 815879 h 1585576"/>
+                <a:gd name="connsiteX4" fmla="*/ 2424546 w 2724728"/>
+                <a:gd name="connsiteY4" fmla="*/ 1585576 h 1585576"/>
+                <a:gd name="connsiteX5" fmla="*/ 351187 w 2724728"/>
+                <a:gd name="connsiteY5" fmla="*/ 962217 h 1585576"/>
+                <a:gd name="connsiteX6" fmla="*/ 8417 w 2724728"/>
+                <a:gd name="connsiteY6" fmla="*/ 632827 h 1585576"/>
+                <a:gd name="connsiteX0" fmla="*/ 8417 w 2724728"/>
+                <a:gd name="connsiteY0" fmla="*/ 632827 h 1177063"/>
+                <a:gd name="connsiteX1" fmla="*/ 0 w 2724728"/>
+                <a:gd name="connsiteY1" fmla="*/ 0 h 1177063"/>
+                <a:gd name="connsiteX2" fmla="*/ 284788 w 2724728"/>
+                <a:gd name="connsiteY2" fmla="*/ 307879 h 1177063"/>
+                <a:gd name="connsiteX3" fmla="*/ 2724728 w 2724728"/>
+                <a:gd name="connsiteY3" fmla="*/ 815879 h 1177063"/>
+                <a:gd name="connsiteX4" fmla="*/ 1482487 w 2724728"/>
+                <a:gd name="connsiteY4" fmla="*/ 1177063 h 1177063"/>
+                <a:gd name="connsiteX5" fmla="*/ 351187 w 2724728"/>
+                <a:gd name="connsiteY5" fmla="*/ 962217 h 1177063"/>
+                <a:gd name="connsiteX6" fmla="*/ 8417 w 2724728"/>
+                <a:gd name="connsiteY6" fmla="*/ 632827 h 1177063"/>
+              </a:gdLst>
+              <a:ahLst/>
+              <a:cxnLst>
+                <a:cxn ang="0">
+                  <a:pos x="connsiteX0" y="connsiteY0"/>
+                </a:cxn>
+                <a:cxn ang="0">
+                  <a:pos x="connsiteX1" y="connsiteY1"/>
+                </a:cxn>
+                <a:cxn ang="0">
+                  <a:pos x="connsiteX2" y="connsiteY2"/>
+                </a:cxn>
+                <a:cxn ang="0">
+                  <a:pos x="connsiteX3" y="connsiteY3"/>
+                </a:cxn>
+                <a:cxn ang="0">
+                  <a:pos x="connsiteX4" y="connsiteY4"/>
+                </a:cxn>
+                <a:cxn ang="0">
+                  <a:pos x="connsiteX5" y="connsiteY5"/>
+                </a:cxn>
+                <a:cxn ang="0">
+                  <a:pos x="connsiteX6" y="connsiteY6"/>
+                </a:cxn>
+              </a:cxnLst>
+              <a:rect l="l" t="t" r="r" b="b"/>
+              <a:pathLst>
+                <a:path w="2724728" h="1177063">
+                  <a:moveTo>
+                    <a:pt x="8417" y="632827"/>
+                  </a:moveTo>
+                  <a:lnTo>
+                    <a:pt x="0" y="0"/>
+                  </a:lnTo>
+                  <a:lnTo>
+                    <a:pt x="284788" y="307879"/>
+                  </a:lnTo>
+                  <a:lnTo>
+                    <a:pt x="2724728" y="815879"/>
+                  </a:lnTo>
+                  <a:lnTo>
+                    <a:pt x="1482487" y="1177063"/>
+                  </a:lnTo>
+                  <a:lnTo>
+                    <a:pt x="351187" y="962217"/>
+                  </a:lnTo>
+                  <a:lnTo>
+                    <a:pt x="8417" y="632827"/>
+                  </a:lnTo>
+                  <a:close/>
+                </a:path>
+              </a:pathLst>
+            </a:custGeom>
+          </p:spPr>
+          <p:style>
+            <a:lnRef idx="1">
+              <a:schemeClr val="accent1"/>
+            </a:lnRef>
+            <a:fillRef idx="3">
+              <a:schemeClr val="accent1"/>
+            </a:fillRef>
+            <a:effectRef idx="2">
+              <a:schemeClr val="accent1"/>
+            </a:effectRef>
+            <a:fontRef idx="minor">
+              <a:schemeClr val="lt1"/>
+            </a:fontRef>
+          </p:style>
+          <p:txBody>
+            <a:bodyPr rtlCol="0" anchor="ctr"/>
+            <a:lstStyle/>
+            <a:p>
+              <a:pPr algn="ctr"/>
+              <a:endParaRPr lang="en-US"/>
+            </a:p>
+          </p:txBody>
+        </p:sp>
+        <p:sp>
+          <p:nvSpPr>
+            <p:cNvPr id="21" name="TextBox 20"/>
+            <p:cNvSpPr txBox="1"/>
+            <p:nvPr/>
+          </p:nvSpPr>
+          <p:spPr>
+            <a:xfrm>
+              <a:off x="2407402" y="3048929"/>
+              <a:ext cx="823302" cy="276999"/>
+            </a:xfrm>
+            <a:prstGeom prst="rect">
+              <a:avLst/>
+            </a:prstGeom>
+            <a:noFill/>
+          </p:spPr>
+          <p:txBody>
+            <a:bodyPr wrap="square" rtlCol="0">
+              <a:spAutoFit/>
+            </a:bodyPr>
+            <a:lstStyle/>
+            <a:p>
+              <a:r>
+                <a:rPr lang="en-US" sz="1200" dirty="0" smtClean="0"/>
+                <a:t>workpiece</a:t>
+              </a:r>
+              <a:endParaRPr lang="en-US" sz="1200" baseline="-25000" dirty="0"/>
+            </a:p>
+          </p:txBody>
+        </p:sp>
+        <p:pic>
+          <p:nvPicPr>
+            <p:cNvPr id="39" name="Picture 38" descr="Screen shot 2012-11-30 at 1.21.34 PM.png"/>
+            <p:cNvPicPr>
+              <a:picLocks noChangeAspect="1"/>
+            </p:cNvPicPr>
+            <p:nvPr/>
+          </p:nvPicPr>
+          <p:blipFill>
+            <a:blip r:embed="rId2">
+              <a:extLst>
+                <a:ext uri="{28A0092B-C50C-407E-A947-70E740481C1C}">
+                  <a14:useLocalDpi xmlns:a14="http://schemas.microsoft.com/office/drawing/2010/main" val="0"/>
+                </a:ext>
+              </a:extLst>
+            </a:blip>
+            <a:stretch>
+              <a:fillRect/>
+            </a:stretch>
+          </p:blipFill>
+          <p:spPr>
+            <a:xfrm>
+              <a:off x="2270440" y="2297217"/>
+              <a:ext cx="236059" cy="265906"/>
+            </a:xfrm>
+            <a:prstGeom prst="rect">
+              <a:avLst/>
+            </a:prstGeom>
+          </p:spPr>
+        </p:pic>
+        <p:cxnSp>
+          <p:nvCxnSpPr>
+            <p:cNvPr id="40" name="Straight Arrow Connector 39"/>
+            <p:cNvCxnSpPr/>
+            <p:nvPr/>
+          </p:nvCxnSpPr>
+          <p:spPr>
+            <a:xfrm>
+              <a:off x="2141069" y="2501548"/>
+              <a:ext cx="360684" cy="201481"/>
+            </a:xfrm>
+            <a:prstGeom prst="straightConnector1">
+              <a:avLst/>
+            </a:prstGeom>
+            <a:ln w="19050" cmpd="sng">
+              <a:headEnd type="none"/>
+              <a:tailEnd type="arrow"/>
+            </a:ln>
+            <a:effectLst/>
+          </p:spPr>
+          <p:style>
+            <a:lnRef idx="2">
+              <a:schemeClr val="dk1"/>
+            </a:lnRef>
+            <a:fillRef idx="0">
+              <a:schemeClr val="dk1"/>
+            </a:fillRef>
+            <a:effectRef idx="1">
+              <a:schemeClr val="dk1"/>
+            </a:effectRef>
+            <a:fontRef idx="minor">
+              <a:schemeClr val="tx1"/>
+            </a:fontRef>
+          </p:style>
+        </p:cxnSp>
+        <p:sp>
+          <p:nvSpPr>
+            <p:cNvPr id="15" name="Oval 14"/>
+            <p:cNvSpPr/>
+            <p:nvPr/>
+          </p:nvSpPr>
+          <p:spPr>
+            <a:xfrm>
+              <a:off x="2074143" y="2439972"/>
+              <a:ext cx="123151" cy="123151"/>
+            </a:xfrm>
+            <a:prstGeom prst="ellipse">
+              <a:avLst/>
+            </a:prstGeom>
+          </p:spPr>
+          <p:style>
+            <a:lnRef idx="1">
+              <a:schemeClr val="accent2"/>
+            </a:lnRef>
+            <a:fillRef idx="3">
+              <a:schemeClr val="accent2"/>
+            </a:fillRef>
+            <a:effectRef idx="2">
+              <a:schemeClr val="accent2"/>
+            </a:effectRef>
+            <a:fontRef idx="minor">
+              <a:schemeClr val="lt1"/>
+            </a:fontRef>
+          </p:style>
+          <p:txBody>
+            <a:bodyPr rtlCol="0" anchor="ctr"/>
+            <a:lstStyle/>
+            <a:p>
+              <a:pPr algn="ctr"/>
+              <a:endParaRPr lang="en-US"/>
+            </a:p>
+          </p:txBody>
+        </p:sp>
+      </p:grpSp>
+      <p:grpSp>
+        <p:nvGrpSpPr>
+          <p:cNvPr id="11" name="Group 10"/>
+          <p:cNvGrpSpPr/>
+          <p:nvPr/>
+        </p:nvGrpSpPr>
+        <p:grpSpPr>
+          <a:xfrm>
+            <a:off x="5255002" y="617030"/>
+            <a:ext cx="1544005" cy="1025913"/>
+            <a:chOff x="3175244" y="323060"/>
+            <a:chExt cx="1544005" cy="1025913"/>
+          </a:xfrm>
+        </p:grpSpPr>
+        <p:cxnSp>
+          <p:nvCxnSpPr>
+            <p:cNvPr id="20" name="Straight Arrow Connector 19"/>
+            <p:cNvCxnSpPr/>
+            <p:nvPr/>
+          </p:nvCxnSpPr>
+          <p:spPr>
+            <a:xfrm>
+              <a:off x="3175244" y="366450"/>
+              <a:ext cx="1544005" cy="864732"/>
+            </a:xfrm>
+            <a:prstGeom prst="straightConnector1">
+              <a:avLst/>
+            </a:prstGeom>
+            <a:ln w="28575" cmpd="sng">
+              <a:solidFill>
+                <a:schemeClr val="bg1">
+                  <a:lumMod val="50000"/>
+                </a:schemeClr>
+              </a:solidFill>
+              <a:prstDash val="dash"/>
+              <a:headEnd type="none"/>
+              <a:tailEnd type="none"/>
+            </a:ln>
+            <a:effectLst/>
+          </p:spPr>
+          <p:style>
+            <a:lnRef idx="2">
+              <a:schemeClr val="dk1"/>
+            </a:lnRef>
+            <a:fillRef idx="0">
+              <a:schemeClr val="dk1"/>
+            </a:fillRef>
+            <a:effectRef idx="1">
+              <a:schemeClr val="dk1"/>
+            </a:effectRef>
+            <a:fontRef idx="minor">
+              <a:schemeClr val="tx1"/>
+            </a:fontRef>
+          </p:style>
+        </p:cxnSp>
+        <p:cxnSp>
+          <p:nvCxnSpPr>
+            <p:cNvPr id="30" name="Straight Arrow Connector 29"/>
+            <p:cNvCxnSpPr/>
+            <p:nvPr/>
+          </p:nvCxnSpPr>
+          <p:spPr>
+            <a:xfrm>
+              <a:off x="3610954" y="614401"/>
+              <a:ext cx="0" cy="734571"/>
+            </a:xfrm>
+            <a:prstGeom prst="straightConnector1">
+              <a:avLst/>
+            </a:prstGeom>
+            <a:ln w="28575" cmpd="sng">
+              <a:headEnd type="none"/>
+              <a:tailEnd type="arrow"/>
+            </a:ln>
+            <a:effectLst/>
+          </p:spPr>
+          <p:style>
+            <a:lnRef idx="2">
+              <a:schemeClr val="dk1"/>
+            </a:lnRef>
+            <a:fillRef idx="0">
+              <a:schemeClr val="dk1"/>
+            </a:fillRef>
+            <a:effectRef idx="1">
+              <a:schemeClr val="dk1"/>
+            </a:effectRef>
+            <a:fontRef idx="minor">
+              <a:schemeClr val="tx1"/>
+            </a:fontRef>
+          </p:style>
+        </p:cxnSp>
+        <p:sp>
+          <p:nvSpPr>
+            <p:cNvPr id="31" name="TextBox 30"/>
+            <p:cNvSpPr txBox="1"/>
+            <p:nvPr/>
+          </p:nvSpPr>
+          <p:spPr>
+            <a:xfrm>
+              <a:off x="3349808" y="723356"/>
+              <a:ext cx="399142" cy="369332"/>
+            </a:xfrm>
+            <a:prstGeom prst="rect">
+              <a:avLst/>
+            </a:prstGeom>
+            <a:noFill/>
+          </p:spPr>
+          <p:txBody>
+            <a:bodyPr wrap="square" rtlCol="0">
+              <a:spAutoFit/>
+            </a:bodyPr>
+            <a:lstStyle/>
+            <a:p>
+              <a:r>
+                <a:rPr lang="en-US" dirty="0" smtClean="0"/>
+                <a:t>a</a:t>
+              </a:r>
+              <a:endParaRPr lang="en-US" baseline="-25000" dirty="0"/>
+            </a:p>
+          </p:txBody>
+        </p:sp>
+        <p:cxnSp>
+          <p:nvCxnSpPr>
+            <p:cNvPr id="32" name="Straight Arrow Connector 31"/>
+            <p:cNvCxnSpPr/>
+            <p:nvPr/>
+          </p:nvCxnSpPr>
+          <p:spPr>
+            <a:xfrm flipH="1">
+              <a:off x="3609443" y="815879"/>
+              <a:ext cx="362193" cy="533094"/>
+            </a:xfrm>
+            <a:prstGeom prst="straightConnector1">
+              <a:avLst/>
+            </a:prstGeom>
+            <a:ln w="19050" cmpd="sng">
+              <a:headEnd type="none"/>
+              <a:tailEnd type="arrow"/>
+            </a:ln>
+            <a:effectLst/>
+          </p:spPr>
+          <p:style>
+            <a:lnRef idx="2">
+              <a:schemeClr val="dk1"/>
+            </a:lnRef>
+            <a:fillRef idx="0">
+              <a:schemeClr val="dk1"/>
+            </a:fillRef>
+            <a:effectRef idx="1">
+              <a:schemeClr val="dk1"/>
+            </a:effectRef>
+            <a:fontRef idx="minor">
+              <a:schemeClr val="tx1"/>
+            </a:fontRef>
+          </p:style>
+        </p:cxnSp>
+        <p:sp>
+          <p:nvSpPr>
+            <p:cNvPr id="45" name="TextBox 44"/>
+            <p:cNvSpPr txBox="1"/>
+            <p:nvPr/>
+          </p:nvSpPr>
+          <p:spPr>
+            <a:xfrm>
+              <a:off x="3748975" y="892628"/>
+              <a:ext cx="615207" cy="338554"/>
+            </a:xfrm>
+            <a:prstGeom prst="rect">
+              <a:avLst/>
+            </a:prstGeom>
+            <a:noFill/>
+          </p:spPr>
+          <p:txBody>
+            <a:bodyPr wrap="square" rtlCol="0">
+              <a:spAutoFit/>
+            </a:bodyPr>
+            <a:lstStyle/>
+            <a:p>
+              <a:r>
+                <a:rPr lang="en-US" sz="1600" dirty="0" smtClean="0"/>
+                <a:t>a</a:t>
+              </a:r>
+              <a:r>
+                <a:rPr lang="en-US" sz="1600" baseline="-25000" dirty="0" smtClean="0"/>
+                <a:t>perp</a:t>
+              </a:r>
+              <a:endParaRPr lang="en-US" sz="1600" baseline="-25000" dirty="0"/>
+            </a:p>
+          </p:txBody>
+        </p:sp>
+        <p:sp>
+          <p:nvSpPr>
+            <p:cNvPr id="63" name="Rectangle 62"/>
+            <p:cNvSpPr/>
+            <p:nvPr/>
+          </p:nvSpPr>
+          <p:spPr>
+            <a:xfrm rot="18011192">
+              <a:off x="3833261" y="773564"/>
+              <a:ext cx="112756" cy="112756"/>
+            </a:xfrm>
+            <a:prstGeom prst="rect">
+              <a:avLst/>
+            </a:prstGeom>
+            <a:ln w="12700" cmpd="sng"/>
+          </p:spPr>
+          <p:style>
+            <a:lnRef idx="2">
+              <a:schemeClr val="dk1"/>
+            </a:lnRef>
+            <a:fillRef idx="1">
+              <a:schemeClr val="lt1"/>
+            </a:fillRef>
+            <a:effectRef idx="0">
+              <a:schemeClr val="dk1"/>
+            </a:effectRef>
+            <a:fontRef idx="minor">
+              <a:schemeClr val="dk1"/>
+            </a:fontRef>
+          </p:style>
+          <p:txBody>
+            <a:bodyPr rtlCol="0" anchor="ctr"/>
+            <a:lstStyle/>
+            <a:p>
+              <a:pPr algn="ctr"/>
+              <a:endParaRPr lang="en-US"/>
+            </a:p>
+          </p:txBody>
+        </p:sp>
+        <p:cxnSp>
+          <p:nvCxnSpPr>
+            <p:cNvPr id="38" name="Straight Arrow Connector 37"/>
+            <p:cNvCxnSpPr/>
+            <p:nvPr/>
+          </p:nvCxnSpPr>
+          <p:spPr>
+            <a:xfrm>
+              <a:off x="3610954" y="614401"/>
+              <a:ext cx="360684" cy="201481"/>
+            </a:xfrm>
+            <a:prstGeom prst="straightConnector1">
+              <a:avLst/>
+            </a:prstGeom>
+            <a:ln w="19050" cmpd="sng">
+              <a:headEnd type="none"/>
+              <a:tailEnd type="arrow"/>
+            </a:ln>
+            <a:effectLst/>
+          </p:spPr>
+          <p:style>
+            <a:lnRef idx="2">
+              <a:schemeClr val="dk1"/>
+            </a:lnRef>
+            <a:fillRef idx="0">
+              <a:schemeClr val="dk1"/>
+            </a:fillRef>
+            <a:effectRef idx="1">
+              <a:schemeClr val="dk1"/>
+            </a:effectRef>
+            <a:fontRef idx="minor">
+              <a:schemeClr val="tx1"/>
+            </a:fontRef>
+          </p:style>
+        </p:cxnSp>
+        <p:sp>
+          <p:nvSpPr>
+            <p:cNvPr id="29" name="Oval 28"/>
+            <p:cNvSpPr/>
+            <p:nvPr/>
+          </p:nvSpPr>
+          <p:spPr>
+            <a:xfrm>
+              <a:off x="3549378" y="552825"/>
+              <a:ext cx="123151" cy="123151"/>
+            </a:xfrm>
+            <a:prstGeom prst="ellipse">
+              <a:avLst/>
+            </a:prstGeom>
+          </p:spPr>
+          <p:style>
+            <a:lnRef idx="1">
+              <a:schemeClr val="accent2"/>
+            </a:lnRef>
+            <a:fillRef idx="3">
+              <a:schemeClr val="accent2"/>
+            </a:fillRef>
+            <a:effectRef idx="2">
+              <a:schemeClr val="accent2"/>
+            </a:effectRef>
+            <a:fontRef idx="minor">
+              <a:schemeClr val="lt1"/>
+            </a:fontRef>
+          </p:style>
+          <p:txBody>
+            <a:bodyPr rtlCol="0" anchor="ctr"/>
+            <a:lstStyle/>
+            <a:p>
+              <a:pPr algn="ctr"/>
+              <a:endParaRPr lang="en-US"/>
+            </a:p>
+          </p:txBody>
+        </p:sp>
+        <p:sp>
+          <p:nvSpPr>
+            <p:cNvPr id="42" name="TextBox 41"/>
+            <p:cNvSpPr txBox="1"/>
+            <p:nvPr/>
+          </p:nvSpPr>
+          <p:spPr>
+            <a:xfrm>
+              <a:off x="3672529" y="323060"/>
+              <a:ext cx="853023" cy="338554"/>
+            </a:xfrm>
+            <a:prstGeom prst="rect">
+              <a:avLst/>
+            </a:prstGeom>
+            <a:noFill/>
+          </p:spPr>
+          <p:txBody>
+            <a:bodyPr wrap="square" rtlCol="0">
+              <a:spAutoFit/>
+            </a:bodyPr>
+            <a:lstStyle/>
+            <a:p>
+              <a:r>
+                <a:rPr lang="en-US" sz="1600" dirty="0" smtClean="0"/>
+                <a:t>a</a:t>
+              </a:r>
+              <a:r>
+                <a:rPr lang="en-US" sz="1600" baseline="-25000" dirty="0" smtClean="0"/>
+                <a:t>projected</a:t>
+              </a:r>
+              <a:endParaRPr lang="en-US" sz="1600" baseline="-25000" dirty="0"/>
+            </a:p>
+          </p:txBody>
+        </p:sp>
+      </p:grpSp>
+      <p:cxnSp>
+        <p:nvCxnSpPr>
+          <p:cNvPr id="48" name="Straight Arrow Connector 47"/>
+          <p:cNvCxnSpPr/>
+          <p:nvPr/>
+        </p:nvCxnSpPr>
+        <p:spPr>
+          <a:xfrm>
+            <a:off x="5165960" y="2380503"/>
+            <a:ext cx="1544005" cy="864732"/>
+          </a:xfrm>
+          <a:prstGeom prst="straightConnector1">
+            <a:avLst/>
+          </a:prstGeom>
+          <a:ln w="28575" cmpd="sng">
+            <a:solidFill>
+              <a:schemeClr val="bg1">
+                <a:lumMod val="50000"/>
+              </a:schemeClr>
+            </a:solidFill>
+            <a:prstDash val="dash"/>
+            <a:headEnd type="none"/>
+            <a:tailEnd type="none"/>
+          </a:ln>
+          <a:effectLst/>
+        </p:spPr>
+        <p:style>
+          <a:lnRef idx="2">
+            <a:schemeClr val="dk1"/>
+          </a:lnRef>
+          <a:fillRef idx="0">
+            <a:schemeClr val="dk1"/>
+          </a:fillRef>
+          <a:effectRef idx="1">
+            <a:schemeClr val="dk1"/>
+          </a:effectRef>
+          <a:fontRef idx="minor">
+            <a:schemeClr val="tx1"/>
+          </a:fontRef>
+        </p:style>
+      </p:cxnSp>
+      <p:sp>
+        <p:nvSpPr>
+          <p:cNvPr id="50" name="TextBox 49"/>
+          <p:cNvSpPr txBox="1"/>
+          <p:nvPr/>
+        </p:nvSpPr>
+        <p:spPr>
+          <a:xfrm>
+            <a:off x="5579486" y="2752939"/>
+            <a:ext cx="399142" cy="369332"/>
+          </a:xfrm>
+          <a:prstGeom prst="rect">
+            <a:avLst/>
+          </a:prstGeom>
+          <a:noFill/>
+        </p:spPr>
+        <p:txBody>
+          <a:bodyPr wrap="square" rtlCol="0">
+            <a:spAutoFit/>
+          </a:bodyPr>
+          <a:lstStyle/>
+          <a:p>
+            <a:r>
+              <a:rPr lang="en-US" dirty="0" smtClean="0"/>
+              <a:t>a</a:t>
+            </a:r>
+            <a:endParaRPr lang="en-US" baseline="-25000" dirty="0"/>
+          </a:p>
+        </p:txBody>
+      </p:sp>
+      <p:cxnSp>
+        <p:nvCxnSpPr>
+          <p:cNvPr id="51" name="Straight Arrow Connector 50"/>
+          <p:cNvCxnSpPr/>
+          <p:nvPr/>
+        </p:nvCxnSpPr>
+        <p:spPr>
+          <a:xfrm flipH="1">
+            <a:off x="6117260" y="2984234"/>
+            <a:ext cx="103974" cy="153033"/>
+          </a:xfrm>
+          <a:prstGeom prst="straightConnector1">
+            <a:avLst/>
+          </a:prstGeom>
+          <a:ln w="19050" cmpd="sng">
+            <a:headEnd type="none"/>
+            <a:tailEnd type="none"/>
+          </a:ln>
+          <a:effectLst/>
+        </p:spPr>
+        <p:style>
+          <a:lnRef idx="2">
+            <a:schemeClr val="dk1"/>
+          </a:lnRef>
+          <a:fillRef idx="0">
+            <a:schemeClr val="dk1"/>
+          </a:fillRef>
+          <a:effectRef idx="1">
+            <a:schemeClr val="dk1"/>
+          </a:effectRef>
+          <a:fontRef idx="minor">
+            <a:schemeClr val="tx1"/>
+          </a:fontRef>
+        </p:style>
+      </p:cxnSp>
+      <p:sp>
+        <p:nvSpPr>
+          <p:cNvPr id="52" name="TextBox 51"/>
+          <p:cNvSpPr txBox="1"/>
+          <p:nvPr/>
+        </p:nvSpPr>
+        <p:spPr>
+          <a:xfrm>
+            <a:off x="6078120" y="2971688"/>
+            <a:ext cx="615207" cy="338554"/>
+          </a:xfrm>
+          <a:prstGeom prst="rect">
+            <a:avLst/>
+          </a:prstGeom>
+          <a:noFill/>
+        </p:spPr>
+        <p:txBody>
+          <a:bodyPr wrap="square" rtlCol="0">
+            <a:spAutoFit/>
+          </a:bodyPr>
+          <a:lstStyle/>
+          <a:p>
+            <a:r>
+              <a:rPr lang="en-US" sz="1600" dirty="0" smtClean="0"/>
+              <a:t>a</a:t>
+            </a:r>
+            <a:r>
+              <a:rPr lang="en-US" sz="1600" baseline="-25000" dirty="0" smtClean="0"/>
+              <a:t>perp</a:t>
+            </a:r>
+            <a:endParaRPr lang="en-US" sz="1600" baseline="-25000" dirty="0"/>
+          </a:p>
+        </p:txBody>
+      </p:sp>
+      <p:sp>
+        <p:nvSpPr>
+          <p:cNvPr id="53" name="Rectangle 52"/>
+          <p:cNvSpPr/>
+          <p:nvPr/>
+        </p:nvSpPr>
+        <p:spPr>
+          <a:xfrm rot="18011192">
+            <a:off x="6079285" y="2942470"/>
+            <a:ext cx="112756" cy="112756"/>
+          </a:xfrm>
+          <a:prstGeom prst="rect">
+            <a:avLst/>
+          </a:prstGeom>
+          <a:ln w="12700" cmpd="sng"/>
+        </p:spPr>
+        <p:style>
+          <a:lnRef idx="2">
+            <a:schemeClr val="dk1"/>
+          </a:lnRef>
+          <a:fillRef idx="1">
+            <a:schemeClr val="lt1"/>
+          </a:fillRef>
+          <a:effectRef idx="0">
+            <a:schemeClr val="dk1"/>
+          </a:effectRef>
+          <a:fontRef idx="minor">
+            <a:schemeClr val="dk1"/>
+          </a:fontRef>
+        </p:style>
+        <p:txBody>
+          <a:bodyPr rtlCol="0" anchor="ctr"/>
+          <a:lstStyle/>
+          <a:p>
+            <a:pPr algn="ctr"/>
+            <a:endParaRPr lang="en-US"/>
+          </a:p>
+        </p:txBody>
+      </p:sp>
+      <p:cxnSp>
+        <p:nvCxnSpPr>
+          <p:cNvPr id="55" name="Straight Arrow Connector 54"/>
+          <p:cNvCxnSpPr/>
+          <p:nvPr/>
+        </p:nvCxnSpPr>
+        <p:spPr>
+          <a:xfrm>
+            <a:off x="5601670" y="2628454"/>
+            <a:ext cx="619564" cy="355780"/>
+          </a:xfrm>
+          <a:prstGeom prst="straightConnector1">
+            <a:avLst/>
+          </a:prstGeom>
+          <a:ln w="19050" cmpd="sng">
+            <a:headEnd type="none"/>
+            <a:tailEnd type="arrow"/>
+          </a:ln>
+          <a:effectLst/>
+        </p:spPr>
+        <p:style>
+          <a:lnRef idx="2">
+            <a:schemeClr val="dk1"/>
+          </a:lnRef>
+          <a:fillRef idx="0">
+            <a:schemeClr val="dk1"/>
+          </a:fillRef>
+          <a:effectRef idx="1">
+            <a:schemeClr val="dk1"/>
+          </a:effectRef>
+          <a:fontRef idx="minor">
+            <a:schemeClr val="tx1"/>
+          </a:fontRef>
+        </p:style>
+      </p:cxnSp>
+      <p:sp>
+        <p:nvSpPr>
+          <p:cNvPr id="56" name="Oval 55"/>
+          <p:cNvSpPr/>
+          <p:nvPr/>
+        </p:nvSpPr>
+        <p:spPr>
+          <a:xfrm>
+            <a:off x="5540094" y="2566878"/>
+            <a:ext cx="123151" cy="123151"/>
+          </a:xfrm>
+          <a:prstGeom prst="ellipse">
+            <a:avLst/>
+          </a:prstGeom>
+        </p:spPr>
+        <p:style>
+          <a:lnRef idx="1">
+            <a:schemeClr val="accent2"/>
+          </a:lnRef>
+          <a:fillRef idx="3">
+            <a:schemeClr val="accent2"/>
+          </a:fillRef>
+          <a:effectRef idx="2">
+            <a:schemeClr val="accent2"/>
+          </a:effectRef>
+          <a:fontRef idx="minor">
+            <a:schemeClr val="lt1"/>
+          </a:fontRef>
+        </p:style>
+        <p:txBody>
+          <a:bodyPr rtlCol="0" anchor="ctr"/>
+          <a:lstStyle/>
+          <a:p>
+            <a:pPr algn="ctr"/>
+            <a:endParaRPr lang="en-US"/>
+          </a:p>
+        </p:txBody>
+      </p:sp>
+      <p:sp>
+        <p:nvSpPr>
+          <p:cNvPr id="59" name="TextBox 58"/>
+          <p:cNvSpPr txBox="1"/>
+          <p:nvPr/>
+        </p:nvSpPr>
+        <p:spPr>
+          <a:xfrm>
+            <a:off x="5663245" y="2337113"/>
+            <a:ext cx="853023" cy="338554"/>
+          </a:xfrm>
+          <a:prstGeom prst="rect">
+            <a:avLst/>
+          </a:prstGeom>
+          <a:noFill/>
+        </p:spPr>
+        <p:txBody>
+          <a:bodyPr wrap="square" rtlCol="0">
+            <a:spAutoFit/>
+          </a:bodyPr>
+          <a:lstStyle/>
+          <a:p>
+            <a:r>
+              <a:rPr lang="en-US" sz="1600" dirty="0" smtClean="0"/>
+              <a:t>a</a:t>
+            </a:r>
+            <a:r>
+              <a:rPr lang="en-US" sz="1600" baseline="-25000" dirty="0" smtClean="0"/>
+              <a:t>projected</a:t>
+            </a:r>
+            <a:endParaRPr lang="en-US" sz="1600" baseline="-25000" dirty="0"/>
+          </a:p>
+        </p:txBody>
+      </p:sp>
+      <p:cxnSp>
+        <p:nvCxnSpPr>
+          <p:cNvPr id="60" name="Straight Arrow Connector 59"/>
+          <p:cNvCxnSpPr/>
+          <p:nvPr/>
+        </p:nvCxnSpPr>
+        <p:spPr>
+          <a:xfrm>
+            <a:off x="5594172" y="2636255"/>
+            <a:ext cx="534180" cy="513746"/>
+          </a:xfrm>
+          <a:prstGeom prst="straightConnector1">
+            <a:avLst/>
+          </a:prstGeom>
+          <a:ln w="28575" cmpd="sng">
+            <a:headEnd type="none"/>
+            <a:tailEnd type="arrow"/>
+          </a:ln>
+          <a:effectLst/>
+        </p:spPr>
+        <p:style>
+          <a:lnRef idx="2">
+            <a:schemeClr val="dk1"/>
+          </a:lnRef>
+          <a:fillRef idx="0">
+            <a:schemeClr val="dk1"/>
+          </a:fillRef>
+          <a:effectRef idx="1">
+            <a:schemeClr val="dk1"/>
+          </a:effectRef>
+          <a:fontRef idx="minor">
+            <a:schemeClr val="tx1"/>
+          </a:fontRef>
+        </p:style>
+      </p:cxnSp>
+      <p:sp>
+        <p:nvSpPr>
+          <p:cNvPr id="61" name="TextBox 60"/>
+          <p:cNvSpPr txBox="1"/>
+          <p:nvPr/>
+        </p:nvSpPr>
+        <p:spPr>
+          <a:xfrm>
+            <a:off x="5600995" y="364972"/>
+            <a:ext cx="642423" cy="338554"/>
+          </a:xfrm>
+          <a:prstGeom prst="rect">
+            <a:avLst/>
+          </a:prstGeom>
+          <a:ln w="12700" cmpd="sng"/>
+        </p:spPr>
+        <p:style>
+          <a:lnRef idx="2">
+            <a:schemeClr val="dk1"/>
+          </a:lnRef>
+          <a:fillRef idx="1">
+            <a:schemeClr val="lt1"/>
+          </a:fillRef>
+          <a:effectRef idx="0">
+            <a:schemeClr val="dk1"/>
+          </a:effectRef>
+          <a:fontRef idx="minor">
+            <a:schemeClr val="dk1"/>
+          </a:fontRef>
+        </p:style>
+        <p:txBody>
+          <a:bodyPr wrap="square" rtlCol="0">
+            <a:spAutoFit/>
+          </a:bodyPr>
+          <a:lstStyle/>
+          <a:p>
+            <a:r>
+              <a:rPr lang="en-US" sz="1600" dirty="0" smtClean="0"/>
+              <a:t>t=1.0</a:t>
+            </a:r>
+            <a:endParaRPr lang="en-US" sz="1600" baseline="-25000" dirty="0"/>
+          </a:p>
+        </p:txBody>
+      </p:sp>
+      <p:sp>
+        <p:nvSpPr>
+          <p:cNvPr id="62" name="TextBox 61"/>
+          <p:cNvSpPr txBox="1"/>
+          <p:nvPr/>
+        </p:nvSpPr>
+        <p:spPr>
+          <a:xfrm>
+            <a:off x="5539749" y="2063461"/>
+            <a:ext cx="642423" cy="338554"/>
+          </a:xfrm>
+          <a:prstGeom prst="rect">
+            <a:avLst/>
+          </a:prstGeom>
+          <a:ln w="12700" cmpd="sng"/>
+        </p:spPr>
+        <p:style>
+          <a:lnRef idx="2">
+            <a:schemeClr val="dk1"/>
+          </a:lnRef>
+          <a:fillRef idx="1">
+            <a:schemeClr val="lt1"/>
+          </a:fillRef>
+          <a:effectRef idx="0">
+            <a:schemeClr val="dk1"/>
+          </a:effectRef>
+          <a:fontRef idx="minor">
+            <a:schemeClr val="dk1"/>
+          </a:fontRef>
+        </p:style>
+        <p:txBody>
+          <a:bodyPr wrap="square" rtlCol="0">
+            <a:spAutoFit/>
+          </a:bodyPr>
+          <a:lstStyle/>
+          <a:p>
+            <a:r>
+              <a:rPr lang="en-US" sz="1600" dirty="0" smtClean="0"/>
+              <a:t>t=2.0</a:t>
+            </a:r>
+            <a:endParaRPr lang="en-US" sz="1600" baseline="-25000" dirty="0"/>
+          </a:p>
+        </p:txBody>
+      </p:sp>
+    </p:spTree>
+    <p:extLst>
+      <p:ext uri="{BB962C8B-B14F-4D97-AF65-F5344CB8AC3E}">
+        <p14:creationId xmlns:p14="http://schemas.microsoft.com/office/powerpoint/2010/main" val="1796371837"/>
+      </p:ext>
+    </p:extLst>
+  </p:cSld>
+  <p:clrMapOvr>
+    <a:masterClrMapping/>
+  </p:clrMapOvr>
+</p:sld>
+</file>
+
+<file path=ppt/slides/slide12.xml><?xml version="1.0" encoding="utf-8"?>
 <p:sld xmlns:a="http://schemas.openxmlformats.org/drawingml/2006/main" xmlns:r="http://schemas.openxmlformats.org/officeDocument/2006/relationships" xmlns:p="http://schemas.openxmlformats.org/presentationml/2006/main">
   <p:cSld>
     <p:spTree>
@@ -4966,7 +6377,7 @@
 </p:sld>
 </file>
 
-<file path=ppt/slides/slide12.xml><?xml version="1.0" encoding="utf-8"?>
+<file path=ppt/slides/slide13.xml><?xml version="1.0" encoding="utf-8"?>
 <p:sld xmlns:a="http://schemas.openxmlformats.org/drawingml/2006/main" xmlns:r="http://schemas.openxmlformats.org/officeDocument/2006/relationships" xmlns:p="http://schemas.openxmlformats.org/presentationml/2006/main">
   <p:cSld>
     <p:spTree>
@@ -4997,19 +6408,20 @@
           <a:prstGeom prst="ellipse">
             <a:avLst/>
           </a:prstGeom>
-        </p:spPr>
-        <p:style>
-          <a:lnRef idx="1">
-            <a:schemeClr val="accent1"/>
-          </a:lnRef>
-          <a:fillRef idx="3">
-            <a:schemeClr val="accent1"/>
-          </a:fillRef>
-          <a:effectRef idx="2">
-            <a:schemeClr val="accent1"/>
-          </a:effectRef>
-          <a:fontRef idx="minor">
+          <a:ln w="38100" cmpd="sng"/>
+        </p:spPr>
+        <p:style>
+          <a:lnRef idx="2">
+            <a:schemeClr val="dk1"/>
+          </a:lnRef>
+          <a:fillRef idx="1">
             <a:schemeClr val="lt1"/>
+          </a:fillRef>
+          <a:effectRef idx="0">
+            <a:schemeClr val="dk1"/>
+          </a:effectRef>
+          <a:fontRef idx="minor">
+            <a:schemeClr val="dk1"/>
           </a:fontRef>
         </p:style>
         <p:txBody>
@@ -5103,19 +6515,20 @@
           <a:prstGeom prst="ellipse">
             <a:avLst/>
           </a:prstGeom>
-        </p:spPr>
-        <p:style>
-          <a:lnRef idx="1">
-            <a:schemeClr val="accent1"/>
-          </a:lnRef>
-          <a:fillRef idx="3">
-            <a:schemeClr val="accent1"/>
-          </a:fillRef>
-          <a:effectRef idx="2">
-            <a:schemeClr val="accent1"/>
-          </a:effectRef>
-          <a:fontRef idx="minor">
+          <a:ln w="38100" cmpd="sng"/>
+        </p:spPr>
+        <p:style>
+          <a:lnRef idx="2">
+            <a:schemeClr val="dk1"/>
+          </a:lnRef>
+          <a:fillRef idx="1">
             <a:schemeClr val="lt1"/>
+          </a:fillRef>
+          <a:effectRef idx="0">
+            <a:schemeClr val="dk1"/>
+          </a:effectRef>
+          <a:fontRef idx="minor">
+            <a:schemeClr val="dk1"/>
           </a:fontRef>
         </p:style>
         <p:txBody>
@@ -5520,7 +6933,7 @@
 </p:sld>
 </file>
 
-<file path=ppt/slides/slide13.xml><?xml version="1.0" encoding="utf-8"?>
+<file path=ppt/slides/slide14.xml><?xml version="1.0" encoding="utf-8"?>
 <p:sld xmlns:a="http://schemas.openxmlformats.org/drawingml/2006/main" xmlns:r="http://schemas.openxmlformats.org/officeDocument/2006/relationships" xmlns:p="http://schemas.openxmlformats.org/presentationml/2006/main">
   <p:cSld>
     <p:spTree>
@@ -5539,6 +6952,45 @@
       </p:grpSpPr>
       <p:sp>
         <p:nvSpPr>
+          <p:cNvPr id="40" name="Oval 39"/>
+          <p:cNvSpPr/>
+          <p:nvPr/>
+        </p:nvSpPr>
+        <p:spPr>
+          <a:xfrm>
+            <a:off x="3722129" y="1534377"/>
+            <a:ext cx="1475946" cy="1475946"/>
+          </a:xfrm>
+          <a:prstGeom prst="ellipse">
+            <a:avLst/>
+          </a:prstGeom>
+          <a:ln w="38100" cmpd="sng"/>
+        </p:spPr>
+        <p:style>
+          <a:lnRef idx="2">
+            <a:schemeClr val="dk1"/>
+          </a:lnRef>
+          <a:fillRef idx="1">
+            <a:schemeClr val="lt1"/>
+          </a:fillRef>
+          <a:effectRef idx="0">
+            <a:schemeClr val="dk1"/>
+          </a:effectRef>
+          <a:fontRef idx="minor">
+            <a:schemeClr val="dk1"/>
+          </a:fontRef>
+        </p:style>
+        <p:txBody>
+          <a:bodyPr rtlCol="0" anchor="ctr"/>
+          <a:lstStyle/>
+          <a:p>
+            <a:pPr algn="ctr"/>
+            <a:endParaRPr lang="en-US"/>
+          </a:p>
+        </p:txBody>
+      </p:sp>
+      <p:sp>
+        <p:nvSpPr>
           <p:cNvPr id="2" name="Oval 1"/>
           <p:cNvSpPr/>
           <p:nvPr/>
@@ -5551,20 +7003,27 @@
           <a:prstGeom prst="ellipse">
             <a:avLst/>
           </a:prstGeom>
-          <a:noFill/>
-        </p:spPr>
-        <p:style>
-          <a:lnRef idx="1">
-            <a:schemeClr val="accent1"/>
-          </a:lnRef>
-          <a:fillRef idx="3">
-            <a:schemeClr val="accent1"/>
-          </a:fillRef>
-          <a:effectRef idx="2">
-            <a:schemeClr val="accent1"/>
-          </a:effectRef>
-          <a:fontRef idx="minor">
+          <a:ln>
+            <a:solidFill>
+              <a:schemeClr val="bg1">
+                <a:lumMod val="65000"/>
+              </a:schemeClr>
+            </a:solidFill>
+            <a:prstDash val="dash"/>
+          </a:ln>
+        </p:spPr>
+        <p:style>
+          <a:lnRef idx="2">
+            <a:schemeClr val="dk1"/>
+          </a:lnRef>
+          <a:fillRef idx="1">
             <a:schemeClr val="lt1"/>
+          </a:fillRef>
+          <a:effectRef idx="0">
+            <a:schemeClr val="dk1"/>
+          </a:effectRef>
+          <a:fontRef idx="minor">
+            <a:schemeClr val="dk1"/>
           </a:fontRef>
         </p:style>
         <p:txBody>
@@ -5641,44 +7100,6 @@
               <a:t>end</a:t>
             </a:r>
             <a:endParaRPr lang="en-US" sz="2400" baseline="-25000" dirty="0"/>
-          </a:p>
-        </p:txBody>
-      </p:sp>
-      <p:sp>
-        <p:nvSpPr>
-          <p:cNvPr id="17" name="Oval 16"/>
-          <p:cNvSpPr/>
-          <p:nvPr/>
-        </p:nvSpPr>
-        <p:spPr>
-          <a:xfrm>
-            <a:off x="3722129" y="1530863"/>
-            <a:ext cx="1475946" cy="1475946"/>
-          </a:xfrm>
-          <a:prstGeom prst="ellipse">
-            <a:avLst/>
-          </a:prstGeom>
-        </p:spPr>
-        <p:style>
-          <a:lnRef idx="1">
-            <a:schemeClr val="accent1"/>
-          </a:lnRef>
-          <a:fillRef idx="3">
-            <a:schemeClr val="accent1"/>
-          </a:fillRef>
-          <a:effectRef idx="2">
-            <a:schemeClr val="accent1"/>
-          </a:effectRef>
-          <a:fontRef idx="minor">
-            <a:schemeClr val="lt1"/>
-          </a:fontRef>
-        </p:style>
-        <p:txBody>
-          <a:bodyPr rtlCol="0" anchor="ctr"/>
-          <a:lstStyle/>
-          <a:p>
-            <a:pPr algn="ctr"/>
-            <a:endParaRPr lang="en-US"/>
           </a:p>
         </p:txBody>
       </p:sp>
@@ -6481,7 +7902,7 @@
 </p:sld>
 </file>
 
-<file path=ppt/slides/slide14.xml><?xml version="1.0" encoding="utf-8"?>
+<file path=ppt/slides/slide15.xml><?xml version="1.0" encoding="utf-8"?>
 <p:sld xmlns:a="http://schemas.openxmlformats.org/drawingml/2006/main" xmlns:r="http://schemas.openxmlformats.org/officeDocument/2006/relationships" xmlns:p="http://schemas.openxmlformats.org/presentationml/2006/main">
   <p:cSld>
     <p:spTree>
@@ -6500,14 +7921,106 @@
       </p:grpSpPr>
       <p:sp>
         <p:nvSpPr>
+          <p:cNvPr id="50" name="Oval 49"/>
+          <p:cNvSpPr/>
+          <p:nvPr/>
+        </p:nvSpPr>
+        <p:spPr>
+          <a:xfrm>
+            <a:off x="3723224" y="1536093"/>
+            <a:ext cx="1475946" cy="1475946"/>
+          </a:xfrm>
+          <a:prstGeom prst="ellipse">
+            <a:avLst/>
+          </a:prstGeom>
+          <a:ln>
+            <a:solidFill>
+              <a:schemeClr val="bg1">
+                <a:lumMod val="65000"/>
+              </a:schemeClr>
+            </a:solidFill>
+            <a:prstDash val="dash"/>
+          </a:ln>
+        </p:spPr>
+        <p:style>
+          <a:lnRef idx="2">
+            <a:schemeClr val="dk1"/>
+          </a:lnRef>
+          <a:fillRef idx="1">
+            <a:schemeClr val="lt1"/>
+          </a:fillRef>
+          <a:effectRef idx="0">
+            <a:schemeClr val="dk1"/>
+          </a:effectRef>
+          <a:fontRef idx="minor">
+            <a:schemeClr val="dk1"/>
+          </a:fontRef>
+        </p:style>
+        <p:txBody>
+          <a:bodyPr rtlCol="0" anchor="ctr"/>
+          <a:lstStyle/>
+          <a:p>
+            <a:pPr algn="ctr"/>
+            <a:endParaRPr lang="en-US"/>
+          </a:p>
+        </p:txBody>
+      </p:sp>
+      <p:sp>
+        <p:nvSpPr>
+          <p:cNvPr id="46" name="Oval 45"/>
+          <p:cNvSpPr/>
+          <p:nvPr/>
+        </p:nvSpPr>
+        <p:spPr>
+          <a:xfrm>
+            <a:off x="1739342" y="1530417"/>
+            <a:ext cx="1475946" cy="1475946"/>
+          </a:xfrm>
+          <a:prstGeom prst="ellipse">
+            <a:avLst/>
+          </a:prstGeom>
+          <a:ln>
+            <a:solidFill>
+              <a:schemeClr val="bg1">
+                <a:lumMod val="65000"/>
+              </a:schemeClr>
+            </a:solidFill>
+            <a:prstDash val="dash"/>
+          </a:ln>
+        </p:spPr>
+        <p:style>
+          <a:lnRef idx="2">
+            <a:schemeClr val="dk1"/>
+          </a:lnRef>
+          <a:fillRef idx="1">
+            <a:schemeClr val="lt1"/>
+          </a:fillRef>
+          <a:effectRef idx="0">
+            <a:schemeClr val="dk1"/>
+          </a:effectRef>
+          <a:fontRef idx="minor">
+            <a:schemeClr val="dk1"/>
+          </a:fontRef>
+        </p:style>
+        <p:txBody>
+          <a:bodyPr rtlCol="0" anchor="ctr"/>
+          <a:lstStyle/>
+          <a:p>
+            <a:pPr algn="ctr"/>
+            <a:endParaRPr lang="en-US"/>
+          </a:p>
+        </p:txBody>
+      </p:sp>
+      <p:sp>
+        <p:nvSpPr>
           <p:cNvPr id="4" name="Block Arc 3"/>
           <p:cNvSpPr/>
           <p:nvPr/>
         </p:nvSpPr>
         <p:spPr>
           <a:xfrm>
-            <a:off x="3727743" y="1542363"/>
-            <a:ext cx="1472184" cy="1472184"/>
+            <a:off x="3727019" y="1547185"/>
+            <a:ext cx="1495092" cy="1495092"/>
           </a:xfrm>
           <a:prstGeom prst="blockArc">
             <a:avLst>
@@ -6516,15 +8029,20 @@
               <a:gd name="adj3" fmla="val 47367"/>
             </a:avLst>
           </a:prstGeom>
-        </p:spPr>
-        <p:style>
-          <a:lnRef idx="1">
+          <a:solidFill>
+            <a:srgbClr val="8EB4E3"/>
+          </a:solidFill>
+        </p:spPr>
+        <p:style>
+          <a:lnRef idx="2">
+            <a:schemeClr val="accent1">
+              <a:shade val="50000"/>
+            </a:schemeClr>
+          </a:lnRef>
+          <a:fillRef idx="1">
             <a:schemeClr val="accent1"/>
-          </a:lnRef>
-          <a:fillRef idx="3">
-            <a:schemeClr val="accent1"/>
-          </a:fillRef>
-          <a:effectRef idx="2">
+          </a:fillRef>
+          <a:effectRef idx="0">
             <a:schemeClr val="accent1"/>
           </a:effectRef>
           <a:fontRef idx="minor">
@@ -6552,25 +8070,33 @@
         </p:nvSpPr>
         <p:spPr>
           <a:xfrm rot="12003543">
-            <a:off x="3699862" y="1546320"/>
-            <a:ext cx="1475528" cy="1463026"/>
+            <a:off x="3702064" y="1550508"/>
+            <a:ext cx="1491290" cy="1478654"/>
           </a:xfrm>
           <a:prstGeom prst="blockArc">
             <a:avLst>
-              <a:gd name="adj1" fmla="val 8989175"/>
+              <a:gd name="adj1" fmla="val 8818258"/>
               <a:gd name="adj2" fmla="val 13977700"/>
               <a:gd name="adj3" fmla="val 46345"/>
             </a:avLst>
           </a:prstGeom>
-        </p:spPr>
-        <p:style>
-          <a:lnRef idx="1">
+          <a:solidFill>
+            <a:schemeClr val="tx2">
+              <a:lumMod val="40000"/>
+              <a:lumOff val="60000"/>
+            </a:schemeClr>
+          </a:solidFill>
+        </p:spPr>
+        <p:style>
+          <a:lnRef idx="2">
+            <a:schemeClr val="accent1">
+              <a:shade val="50000"/>
+            </a:schemeClr>
+          </a:lnRef>
+          <a:fillRef idx="1">
             <a:schemeClr val="accent1"/>
-          </a:lnRef>
-          <a:fillRef idx="3">
-            <a:schemeClr val="accent1"/>
-          </a:fillRef>
-          <a:effectRef idx="2">
+          </a:fillRef>
+          <a:effectRef idx="0">
             <a:schemeClr val="accent1"/>
           </a:effectRef>
           <a:fontRef idx="minor">
@@ -6592,45 +8118,6 @@
       </p:sp>
       <p:sp>
         <p:nvSpPr>
-          <p:cNvPr id="2" name="Oval 1"/>
-          <p:cNvSpPr/>
-          <p:nvPr/>
-        </p:nvSpPr>
-        <p:spPr>
-          <a:xfrm>
-            <a:off x="1736810" y="1530863"/>
-            <a:ext cx="1475946" cy="1475946"/>
-          </a:xfrm>
-          <a:prstGeom prst="ellipse">
-            <a:avLst/>
-          </a:prstGeom>
-          <a:noFill/>
-        </p:spPr>
-        <p:style>
-          <a:lnRef idx="1">
-            <a:schemeClr val="accent1"/>
-          </a:lnRef>
-          <a:fillRef idx="3">
-            <a:schemeClr val="accent1"/>
-          </a:fillRef>
-          <a:effectRef idx="2">
-            <a:schemeClr val="accent1"/>
-          </a:effectRef>
-          <a:fontRef idx="minor">
-            <a:schemeClr val="lt1"/>
-          </a:fontRef>
-        </p:style>
-        <p:txBody>
-          <a:bodyPr rtlCol="0" anchor="ctr"/>
-          <a:lstStyle/>
-          <a:p>
-            <a:pPr algn="ctr"/>
-            <a:endParaRPr lang="en-US"/>
-          </a:p>
-        </p:txBody>
-      </p:sp>
-      <p:sp>
-        <p:nvSpPr>
           <p:cNvPr id="12" name="TextBox 11"/>
           <p:cNvSpPr txBox="1"/>
           <p:nvPr/>
@@ -6694,45 +8181,6 @@
               <a:t>end</a:t>
             </a:r>
             <a:endParaRPr lang="en-US" sz="2400" baseline="-25000" dirty="0"/>
-          </a:p>
-        </p:txBody>
-      </p:sp>
-      <p:sp>
-        <p:nvSpPr>
-          <p:cNvPr id="17" name="Oval 16"/>
-          <p:cNvSpPr/>
-          <p:nvPr/>
-        </p:nvSpPr>
-        <p:spPr>
-          <a:xfrm>
-            <a:off x="3722129" y="1530863"/>
-            <a:ext cx="1475946" cy="1475946"/>
-          </a:xfrm>
-          <a:prstGeom prst="ellipse">
-            <a:avLst/>
-          </a:prstGeom>
-          <a:noFill/>
-        </p:spPr>
-        <p:style>
-          <a:lnRef idx="1">
-            <a:schemeClr val="accent1"/>
-          </a:lnRef>
-          <a:fillRef idx="3">
-            <a:schemeClr val="accent1"/>
-          </a:fillRef>
-          <a:effectRef idx="2">
-            <a:schemeClr val="accent1"/>
-          </a:effectRef>
-          <a:fontRef idx="minor">
-            <a:schemeClr val="lt1"/>
-          </a:fontRef>
-        </p:style>
-        <p:txBody>
-          <a:bodyPr rtlCol="0" anchor="ctr"/>
-          <a:lstStyle/>
-          <a:p>
-            <a:pPr algn="ctr"/>
-            <a:endParaRPr lang="en-US"/>
           </a:p>
         </p:txBody>
       </p:sp>
@@ -7992,7 +9440,7 @@
 </p:sld>
 </file>
 
-<file path=ppt/slides/slide15.xml><?xml version="1.0" encoding="utf-8"?>
+<file path=ppt/slides/slide16.xml><?xml version="1.0" encoding="utf-8"?>
 <p:sld xmlns:a="http://schemas.openxmlformats.org/drawingml/2006/main" xmlns:r="http://schemas.openxmlformats.org/officeDocument/2006/relationships" xmlns:p="http://schemas.openxmlformats.org/presentationml/2006/main">
   <p:cSld>
     <p:spTree>
@@ -9143,7 +10591,7 @@
 </p:sld>
 </file>
 
-<file path=ppt/slides/slide16.xml><?xml version="1.0" encoding="utf-8"?>
+<file path=ppt/slides/slide17.xml><?xml version="1.0" encoding="utf-8"?>
 <p:sld xmlns:a="http://schemas.openxmlformats.org/drawingml/2006/main" xmlns:r="http://schemas.openxmlformats.org/officeDocument/2006/relationships" xmlns:p="http://schemas.openxmlformats.org/presentationml/2006/main">
   <p:cSld>
     <p:spTree>
@@ -11289,7 +12737,7 @@
 </p:sld>
 </file>
 
-<file path=ppt/slides/slide17.xml><?xml version="1.0" encoding="utf-8"?>
+<file path=ppt/slides/slide18.xml><?xml version="1.0" encoding="utf-8"?>
 <p:sld xmlns:a="http://schemas.openxmlformats.org/drawingml/2006/main" xmlns:r="http://schemas.openxmlformats.org/officeDocument/2006/relationships" xmlns:p="http://schemas.openxmlformats.org/presentationml/2006/main">
   <p:cSld>
     <p:spTree>
@@ -12723,7 +14171,7 @@
 </p:sld>
 </file>
 
-<file path=ppt/slides/slide18.xml><?xml version="1.0" encoding="utf-8"?>
+<file path=ppt/slides/slide19.xml><?xml version="1.0" encoding="utf-8"?>
 <p:sld xmlns:a="http://schemas.openxmlformats.org/drawingml/2006/main" xmlns:r="http://schemas.openxmlformats.org/officeDocument/2006/relationships" xmlns:p="http://schemas.openxmlformats.org/presentationml/2006/main">
   <p:cSld>
     <p:spTree>
@@ -14044,7 +15492,731 @@
 </p:sld>
 </file>
 
-<file path=ppt/slides/slide19.xml><?xml version="1.0" encoding="utf-8"?>
+<file path=ppt/slides/slide2.xml><?xml version="1.0" encoding="utf-8"?>
+<p:sld xmlns:a="http://schemas.openxmlformats.org/drawingml/2006/main" xmlns:r="http://schemas.openxmlformats.org/officeDocument/2006/relationships" xmlns:p="http://schemas.openxmlformats.org/presentationml/2006/main">
+  <p:cSld>
+    <p:spTree>
+      <p:nvGrpSpPr>
+        <p:cNvPr id="1" name=""/>
+        <p:cNvGrpSpPr/>
+        <p:nvPr/>
+      </p:nvGrpSpPr>
+      <p:grpSpPr>
+        <a:xfrm>
+          <a:off x="0" y="0"/>
+          <a:ext cx="0" cy="0"/>
+          <a:chOff x="0" y="0"/>
+          <a:chExt cx="0" cy="0"/>
+        </a:xfrm>
+      </p:grpSpPr>
+      <p:grpSp>
+        <p:nvGrpSpPr>
+          <p:cNvPr id="14" name="Group 13"/>
+          <p:cNvGrpSpPr/>
+          <p:nvPr/>
+        </p:nvGrpSpPr>
+        <p:grpSpPr>
+          <a:xfrm>
+            <a:off x="1366762" y="2116667"/>
+            <a:ext cx="520096" cy="520096"/>
+            <a:chOff x="2467428" y="1596571"/>
+            <a:chExt cx="520096" cy="520096"/>
+          </a:xfrm>
+        </p:grpSpPr>
+        <p:cxnSp>
+          <p:nvCxnSpPr>
+            <p:cNvPr id="10" name="Straight Arrow Connector 9"/>
+            <p:cNvCxnSpPr/>
+            <p:nvPr/>
+          </p:nvCxnSpPr>
+          <p:spPr>
+            <a:xfrm flipV="1">
+              <a:off x="2467428" y="1596571"/>
+              <a:ext cx="0" cy="520096"/>
+            </a:xfrm>
+            <a:prstGeom prst="straightConnector1">
+              <a:avLst/>
+            </a:prstGeom>
+            <a:ln>
+              <a:solidFill>
+                <a:schemeClr val="bg1">
+                  <a:lumMod val="50000"/>
+                </a:schemeClr>
+              </a:solidFill>
+              <a:tailEnd type="arrow"/>
+            </a:ln>
+            <a:effectLst/>
+          </p:spPr>
+          <p:style>
+            <a:lnRef idx="2">
+              <a:schemeClr val="dk1"/>
+            </a:lnRef>
+            <a:fillRef idx="0">
+              <a:schemeClr val="dk1"/>
+            </a:fillRef>
+            <a:effectRef idx="1">
+              <a:schemeClr val="dk1"/>
+            </a:effectRef>
+            <a:fontRef idx="minor">
+              <a:schemeClr val="tx1"/>
+            </a:fontRef>
+          </p:style>
+        </p:cxnSp>
+        <p:cxnSp>
+          <p:nvCxnSpPr>
+            <p:cNvPr id="11" name="Straight Arrow Connector 10"/>
+            <p:cNvCxnSpPr/>
+            <p:nvPr/>
+          </p:nvCxnSpPr>
+          <p:spPr>
+            <a:xfrm rot="5400000" flipV="1">
+              <a:off x="2727476" y="1845733"/>
+              <a:ext cx="0" cy="520096"/>
+            </a:xfrm>
+            <a:prstGeom prst="straightConnector1">
+              <a:avLst/>
+            </a:prstGeom>
+            <a:ln>
+              <a:solidFill>
+                <a:schemeClr val="bg1">
+                  <a:lumMod val="50000"/>
+                </a:schemeClr>
+              </a:solidFill>
+              <a:tailEnd type="arrow"/>
+            </a:ln>
+            <a:effectLst/>
+          </p:spPr>
+          <p:style>
+            <a:lnRef idx="2">
+              <a:schemeClr val="dk1"/>
+            </a:lnRef>
+            <a:fillRef idx="0">
+              <a:schemeClr val="dk1"/>
+            </a:fillRef>
+            <a:effectRef idx="1">
+              <a:schemeClr val="dk1"/>
+            </a:effectRef>
+            <a:fontRef idx="minor">
+              <a:schemeClr val="tx1"/>
+            </a:fontRef>
+          </p:style>
+        </p:cxnSp>
+      </p:grpSp>
+      <p:grpSp>
+        <p:nvGrpSpPr>
+          <p:cNvPr id="15" name="Group 14"/>
+          <p:cNvGrpSpPr/>
+          <p:nvPr/>
+        </p:nvGrpSpPr>
+        <p:grpSpPr>
+          <a:xfrm>
+            <a:off x="1366762" y="4361543"/>
+            <a:ext cx="520096" cy="520096"/>
+            <a:chOff x="2467428" y="1596571"/>
+            <a:chExt cx="520096" cy="520096"/>
+          </a:xfrm>
+        </p:grpSpPr>
+        <p:cxnSp>
+          <p:nvCxnSpPr>
+            <p:cNvPr id="16" name="Straight Arrow Connector 15"/>
+            <p:cNvCxnSpPr/>
+            <p:nvPr/>
+          </p:nvCxnSpPr>
+          <p:spPr>
+            <a:xfrm flipV="1">
+              <a:off x="2467428" y="1596571"/>
+              <a:ext cx="0" cy="520096"/>
+            </a:xfrm>
+            <a:prstGeom prst="straightConnector1">
+              <a:avLst/>
+            </a:prstGeom>
+            <a:ln>
+              <a:tailEnd type="arrow"/>
+            </a:ln>
+            <a:effectLst/>
+          </p:spPr>
+          <p:style>
+            <a:lnRef idx="2">
+              <a:schemeClr val="dk1"/>
+            </a:lnRef>
+            <a:fillRef idx="0">
+              <a:schemeClr val="dk1"/>
+            </a:fillRef>
+            <a:effectRef idx="1">
+              <a:schemeClr val="dk1"/>
+            </a:effectRef>
+            <a:fontRef idx="minor">
+              <a:schemeClr val="tx1"/>
+            </a:fontRef>
+          </p:style>
+        </p:cxnSp>
+        <p:cxnSp>
+          <p:nvCxnSpPr>
+            <p:cNvPr id="17" name="Straight Arrow Connector 16"/>
+            <p:cNvCxnSpPr/>
+            <p:nvPr/>
+          </p:nvCxnSpPr>
+          <p:spPr>
+            <a:xfrm rot="5400000" flipV="1">
+              <a:off x="2727476" y="1845733"/>
+              <a:ext cx="0" cy="520096"/>
+            </a:xfrm>
+            <a:prstGeom prst="straightConnector1">
+              <a:avLst/>
+            </a:prstGeom>
+            <a:ln>
+              <a:tailEnd type="arrow"/>
+            </a:ln>
+            <a:effectLst/>
+          </p:spPr>
+          <p:style>
+            <a:lnRef idx="2">
+              <a:schemeClr val="dk1"/>
+            </a:lnRef>
+            <a:fillRef idx="0">
+              <a:schemeClr val="dk1"/>
+            </a:fillRef>
+            <a:effectRef idx="1">
+              <a:schemeClr val="dk1"/>
+            </a:effectRef>
+            <a:fontRef idx="minor">
+              <a:schemeClr val="tx1"/>
+            </a:fontRef>
+          </p:style>
+        </p:cxnSp>
+      </p:grpSp>
+      <p:cxnSp>
+        <p:nvCxnSpPr>
+          <p:cNvPr id="20" name="Straight Arrow Connector 19"/>
+          <p:cNvCxnSpPr/>
+          <p:nvPr/>
+        </p:nvCxnSpPr>
+        <p:spPr>
+          <a:xfrm flipV="1">
+            <a:off x="1366762" y="1672167"/>
+            <a:ext cx="929821" cy="964597"/>
+          </a:xfrm>
+          <a:prstGeom prst="straightConnector1">
+            <a:avLst/>
+          </a:prstGeom>
+          <a:ln w="28575" cmpd="sng">
+            <a:tailEnd type="arrow"/>
+          </a:ln>
+          <a:effectLst/>
+        </p:spPr>
+        <p:style>
+          <a:lnRef idx="2">
+            <a:schemeClr val="dk1"/>
+          </a:lnRef>
+          <a:fillRef idx="0">
+            <a:schemeClr val="dk1"/>
+          </a:fillRef>
+          <a:effectRef idx="1">
+            <a:schemeClr val="dk1"/>
+          </a:effectRef>
+          <a:fontRef idx="minor">
+            <a:schemeClr val="tx1"/>
+          </a:fontRef>
+        </p:style>
+      </p:cxnSp>
+      <p:sp>
+        <p:nvSpPr>
+          <p:cNvPr id="24" name="TextBox 23"/>
+          <p:cNvSpPr txBox="1"/>
+          <p:nvPr/>
+        </p:nvSpPr>
+        <p:spPr>
+          <a:xfrm>
+            <a:off x="1602621" y="1696148"/>
+            <a:ext cx="399142" cy="369332"/>
+          </a:xfrm>
+          <a:prstGeom prst="rect">
+            <a:avLst/>
+          </a:prstGeom>
+          <a:noFill/>
+        </p:spPr>
+        <p:txBody>
+          <a:bodyPr wrap="square" rtlCol="0">
+            <a:spAutoFit/>
+          </a:bodyPr>
+          <a:lstStyle/>
+          <a:p>
+            <a:r>
+              <a:rPr lang="en-US" dirty="0" smtClean="0"/>
+              <a:t>X</a:t>
+            </a:r>
+            <a:r>
+              <a:rPr lang="en-US" baseline="-25000" dirty="0" smtClean="0"/>
+              <a:t>0</a:t>
+            </a:r>
+            <a:endParaRPr lang="en-US" baseline="-25000" dirty="0"/>
+          </a:p>
+        </p:txBody>
+      </p:sp>
+      <p:cxnSp>
+        <p:nvCxnSpPr>
+          <p:cNvPr id="25" name="Straight Arrow Connector 24"/>
+          <p:cNvCxnSpPr/>
+          <p:nvPr/>
+        </p:nvCxnSpPr>
+        <p:spPr>
+          <a:xfrm flipV="1">
+            <a:off x="2296583" y="1354667"/>
+            <a:ext cx="751417" cy="317502"/>
+          </a:xfrm>
+          <a:prstGeom prst="straightConnector1">
+            <a:avLst/>
+          </a:prstGeom>
+          <a:ln w="28575" cmpd="sng">
+            <a:tailEnd type="arrow"/>
+          </a:ln>
+          <a:effectLst/>
+        </p:spPr>
+        <p:style>
+          <a:lnRef idx="2">
+            <a:schemeClr val="dk1"/>
+          </a:lnRef>
+          <a:fillRef idx="0">
+            <a:schemeClr val="dk1"/>
+          </a:fillRef>
+          <a:effectRef idx="1">
+            <a:schemeClr val="dk1"/>
+          </a:effectRef>
+          <a:fontRef idx="minor">
+            <a:schemeClr val="tx1"/>
+          </a:fontRef>
+        </p:style>
+      </p:cxnSp>
+      <p:sp>
+        <p:nvSpPr>
+          <p:cNvPr id="28" name="TextBox 27"/>
+          <p:cNvSpPr txBox="1"/>
+          <p:nvPr/>
+        </p:nvSpPr>
+        <p:spPr>
+          <a:xfrm>
+            <a:off x="2587574" y="1426047"/>
+            <a:ext cx="399142" cy="369332"/>
+          </a:xfrm>
+          <a:prstGeom prst="rect">
+            <a:avLst/>
+          </a:prstGeom>
+          <a:noFill/>
+        </p:spPr>
+        <p:txBody>
+          <a:bodyPr wrap="square" rtlCol="0">
+            <a:spAutoFit/>
+          </a:bodyPr>
+          <a:lstStyle/>
+          <a:p>
+            <a:r>
+              <a:rPr lang="en-US" dirty="0" smtClean="0"/>
+              <a:t>v</a:t>
+            </a:r>
+            <a:r>
+              <a:rPr lang="en-US" baseline="-25000" dirty="0" smtClean="0"/>
+              <a:t>0</a:t>
+            </a:r>
+            <a:endParaRPr lang="en-US" baseline="-25000" dirty="0"/>
+          </a:p>
+        </p:txBody>
+      </p:sp>
+      <p:cxnSp>
+        <p:nvCxnSpPr>
+          <p:cNvPr id="34" name="Straight Arrow Connector 33"/>
+          <p:cNvCxnSpPr/>
+          <p:nvPr/>
+        </p:nvCxnSpPr>
+        <p:spPr>
+          <a:xfrm>
+            <a:off x="2296583" y="1676711"/>
+            <a:ext cx="1511" cy="546098"/>
+          </a:xfrm>
+          <a:prstGeom prst="straightConnector1">
+            <a:avLst/>
+          </a:prstGeom>
+          <a:ln w="28575" cmpd="sng">
+            <a:tailEnd type="arrow"/>
+          </a:ln>
+          <a:effectLst/>
+        </p:spPr>
+        <p:style>
+          <a:lnRef idx="2">
+            <a:schemeClr val="dk1"/>
+          </a:lnRef>
+          <a:fillRef idx="0">
+            <a:schemeClr val="dk1"/>
+          </a:fillRef>
+          <a:effectRef idx="1">
+            <a:schemeClr val="dk1"/>
+          </a:effectRef>
+          <a:fontRef idx="minor">
+            <a:schemeClr val="tx1"/>
+          </a:fontRef>
+        </p:style>
+      </p:cxnSp>
+      <p:sp>
+        <p:nvSpPr>
+          <p:cNvPr id="36" name="TextBox 35"/>
+          <p:cNvSpPr txBox="1"/>
+          <p:nvPr/>
+        </p:nvSpPr>
+        <p:spPr>
+          <a:xfrm>
+            <a:off x="2329242" y="1763675"/>
+            <a:ext cx="399142" cy="369332"/>
+          </a:xfrm>
+          <a:prstGeom prst="rect">
+            <a:avLst/>
+          </a:prstGeom>
+          <a:noFill/>
+        </p:spPr>
+        <p:txBody>
+          <a:bodyPr wrap="square" rtlCol="0">
+            <a:spAutoFit/>
+          </a:bodyPr>
+          <a:lstStyle/>
+          <a:p>
+            <a:r>
+              <a:rPr lang="en-US" dirty="0" smtClean="0"/>
+              <a:t>a</a:t>
+            </a:r>
+            <a:endParaRPr lang="en-US" baseline="-25000" dirty="0"/>
+          </a:p>
+        </p:txBody>
+      </p:sp>
+      <p:grpSp>
+        <p:nvGrpSpPr>
+          <p:cNvPr id="37" name="Group 36"/>
+          <p:cNvGrpSpPr/>
+          <p:nvPr/>
+        </p:nvGrpSpPr>
+        <p:grpSpPr>
+          <a:xfrm>
+            <a:off x="4864496" y="2117574"/>
+            <a:ext cx="520096" cy="520096"/>
+            <a:chOff x="2467428" y="1596571"/>
+            <a:chExt cx="520096" cy="520096"/>
+          </a:xfrm>
+        </p:grpSpPr>
+        <p:cxnSp>
+          <p:nvCxnSpPr>
+            <p:cNvPr id="38" name="Straight Arrow Connector 37"/>
+            <p:cNvCxnSpPr/>
+            <p:nvPr/>
+          </p:nvCxnSpPr>
+          <p:spPr>
+            <a:xfrm flipV="1">
+              <a:off x="2467428" y="1596571"/>
+              <a:ext cx="0" cy="520096"/>
+            </a:xfrm>
+            <a:prstGeom prst="straightConnector1">
+              <a:avLst/>
+            </a:prstGeom>
+            <a:ln>
+              <a:solidFill>
+                <a:schemeClr val="bg1">
+                  <a:lumMod val="50000"/>
+                </a:schemeClr>
+              </a:solidFill>
+              <a:tailEnd type="arrow"/>
+            </a:ln>
+            <a:effectLst/>
+          </p:spPr>
+          <p:style>
+            <a:lnRef idx="2">
+              <a:schemeClr val="dk1"/>
+            </a:lnRef>
+            <a:fillRef idx="0">
+              <a:schemeClr val="dk1"/>
+            </a:fillRef>
+            <a:effectRef idx="1">
+              <a:schemeClr val="dk1"/>
+            </a:effectRef>
+            <a:fontRef idx="minor">
+              <a:schemeClr val="tx1"/>
+            </a:fontRef>
+          </p:style>
+        </p:cxnSp>
+        <p:cxnSp>
+          <p:nvCxnSpPr>
+            <p:cNvPr id="39" name="Straight Arrow Connector 38"/>
+            <p:cNvCxnSpPr/>
+            <p:nvPr/>
+          </p:nvCxnSpPr>
+          <p:spPr>
+            <a:xfrm rot="5400000" flipV="1">
+              <a:off x="2727476" y="1845733"/>
+              <a:ext cx="0" cy="520096"/>
+            </a:xfrm>
+            <a:prstGeom prst="straightConnector1">
+              <a:avLst/>
+            </a:prstGeom>
+            <a:ln>
+              <a:solidFill>
+                <a:schemeClr val="bg1">
+                  <a:lumMod val="50000"/>
+                </a:schemeClr>
+              </a:solidFill>
+              <a:tailEnd type="arrow"/>
+            </a:ln>
+            <a:effectLst/>
+          </p:spPr>
+          <p:style>
+            <a:lnRef idx="2">
+              <a:schemeClr val="dk1"/>
+            </a:lnRef>
+            <a:fillRef idx="0">
+              <a:schemeClr val="dk1"/>
+            </a:fillRef>
+            <a:effectRef idx="1">
+              <a:schemeClr val="dk1"/>
+            </a:effectRef>
+            <a:fontRef idx="minor">
+              <a:schemeClr val="tx1"/>
+            </a:fontRef>
+          </p:style>
+        </p:cxnSp>
+      </p:grpSp>
+      <p:sp>
+        <p:nvSpPr>
+          <p:cNvPr id="46" name="Right Arrow 45"/>
+          <p:cNvSpPr/>
+          <p:nvPr/>
+        </p:nvSpPr>
+        <p:spPr>
+          <a:xfrm>
+            <a:off x="3226741" y="1553323"/>
+            <a:ext cx="1476963" cy="1024314"/>
+          </a:xfrm>
+          <a:prstGeom prst="rightArrow">
+            <a:avLst/>
+          </a:prstGeom>
+        </p:spPr>
+        <p:style>
+          <a:lnRef idx="1">
+            <a:schemeClr val="dk1"/>
+          </a:lnRef>
+          <a:fillRef idx="3">
+            <a:schemeClr val="dk1"/>
+          </a:fillRef>
+          <a:effectRef idx="2">
+            <a:schemeClr val="dk1"/>
+          </a:effectRef>
+          <a:fontRef idx="minor">
+            <a:schemeClr val="lt1"/>
+          </a:fontRef>
+        </p:style>
+        <p:txBody>
+          <a:bodyPr rtlCol="0" anchor="ctr"/>
+          <a:lstStyle/>
+          <a:p>
+            <a:pPr algn="ctr"/>
+            <a:r>
+              <a:rPr lang="en-US" dirty="0" smtClean="0"/>
+              <a:t>Integration</a:t>
+            </a:r>
+            <a:endParaRPr lang="en-US" dirty="0"/>
+          </a:p>
+        </p:txBody>
+      </p:sp>
+      <p:sp>
+        <p:nvSpPr>
+          <p:cNvPr id="47" name="Oval 46"/>
+          <p:cNvSpPr/>
+          <p:nvPr/>
+        </p:nvSpPr>
+        <p:spPr>
+          <a:xfrm>
+            <a:off x="5743911" y="1602947"/>
+            <a:ext cx="100811" cy="100811"/>
+          </a:xfrm>
+          <a:prstGeom prst="ellipse">
+            <a:avLst/>
+          </a:prstGeom>
+          <a:solidFill>
+            <a:schemeClr val="tx1"/>
+          </a:solidFill>
+          <a:effectLst/>
+        </p:spPr>
+        <p:style>
+          <a:lnRef idx="1">
+            <a:schemeClr val="dk1"/>
+          </a:lnRef>
+          <a:fillRef idx="3">
+            <a:schemeClr val="dk1"/>
+          </a:fillRef>
+          <a:effectRef idx="2">
+            <a:schemeClr val="dk1"/>
+          </a:effectRef>
+          <a:fontRef idx="minor">
+            <a:schemeClr val="lt1"/>
+          </a:fontRef>
+        </p:style>
+        <p:txBody>
+          <a:bodyPr rtlCol="0" anchor="ctr"/>
+          <a:lstStyle/>
+          <a:p>
+            <a:pPr algn="ctr"/>
+            <a:endParaRPr lang="en-US"/>
+          </a:p>
+        </p:txBody>
+      </p:sp>
+      <p:sp>
+        <p:nvSpPr>
+          <p:cNvPr id="62" name="Freeform 61"/>
+          <p:cNvSpPr/>
+          <p:nvPr/>
+        </p:nvSpPr>
+        <p:spPr>
+          <a:xfrm>
+            <a:off x="5766741" y="1365193"/>
+            <a:ext cx="1815629" cy="854955"/>
+          </a:xfrm>
+          <a:custGeom>
+            <a:avLst/>
+            <a:gdLst>
+              <a:gd name="connsiteX0" fmla="*/ 0 w 1815629"/>
+              <a:gd name="connsiteY0" fmla="*/ 281103 h 854955"/>
+              <a:gd name="connsiteX1" fmla="*/ 1044222 w 1815629"/>
+              <a:gd name="connsiteY1" fmla="*/ 27103 h 854955"/>
+              <a:gd name="connsiteX2" fmla="*/ 1815629 w 1815629"/>
+              <a:gd name="connsiteY2" fmla="*/ 854955 h 854955"/>
+            </a:gdLst>
+            <a:ahLst/>
+            <a:cxnLst>
+              <a:cxn ang="0">
+                <a:pos x="connsiteX0" y="connsiteY0"/>
+              </a:cxn>
+              <a:cxn ang="0">
+                <a:pos x="connsiteX1" y="connsiteY1"/>
+              </a:cxn>
+              <a:cxn ang="0">
+                <a:pos x="connsiteX2" y="connsiteY2"/>
+              </a:cxn>
+            </a:cxnLst>
+            <a:rect l="l" t="t" r="r" b="b"/>
+            <a:pathLst>
+              <a:path w="1815629" h="854955">
+                <a:moveTo>
+                  <a:pt x="0" y="281103"/>
+                </a:moveTo>
+                <a:cubicBezTo>
+                  <a:pt x="370808" y="106282"/>
+                  <a:pt x="741617" y="-68539"/>
+                  <a:pt x="1044222" y="27103"/>
+                </a:cubicBezTo>
+                <a:cubicBezTo>
+                  <a:pt x="1346827" y="122745"/>
+                  <a:pt x="1767024" y="536671"/>
+                  <a:pt x="1815629" y="854955"/>
+                </a:cubicBezTo>
+              </a:path>
+            </a:pathLst>
+          </a:custGeom>
+          <a:ln>
+            <a:prstDash val="dash"/>
+            <a:headEnd type="none"/>
+            <a:tailEnd type="arrow"/>
+          </a:ln>
+        </p:spPr>
+        <p:style>
+          <a:lnRef idx="2">
+            <a:schemeClr val="dk1"/>
+          </a:lnRef>
+          <a:fillRef idx="0">
+            <a:schemeClr val="dk1"/>
+          </a:fillRef>
+          <a:effectRef idx="1">
+            <a:schemeClr val="dk1"/>
+          </a:effectRef>
+          <a:fontRef idx="minor">
+            <a:schemeClr val="tx1"/>
+          </a:fontRef>
+        </p:style>
+        <p:txBody>
+          <a:bodyPr rtlCol="0" anchor="ctr"/>
+          <a:lstStyle/>
+          <a:p>
+            <a:pPr algn="ctr"/>
+            <a:endParaRPr lang="en-US"/>
+          </a:p>
+        </p:txBody>
+      </p:sp>
+      <p:sp>
+        <p:nvSpPr>
+          <p:cNvPr id="63" name="TextBox 62"/>
+          <p:cNvSpPr txBox="1"/>
+          <p:nvPr/>
+        </p:nvSpPr>
+        <p:spPr>
+          <a:xfrm>
+            <a:off x="5445580" y="1237097"/>
+            <a:ext cx="518716" cy="369332"/>
+          </a:xfrm>
+          <a:prstGeom prst="rect">
+            <a:avLst/>
+          </a:prstGeom>
+          <a:noFill/>
+        </p:spPr>
+        <p:txBody>
+          <a:bodyPr wrap="square" rtlCol="0">
+            <a:spAutoFit/>
+          </a:bodyPr>
+          <a:lstStyle/>
+          <a:p>
+            <a:r>
+              <a:rPr lang="en-US" dirty="0" smtClean="0"/>
+              <a:t>t=0</a:t>
+            </a:r>
+            <a:endParaRPr lang="en-US" baseline="-25000" dirty="0"/>
+          </a:p>
+        </p:txBody>
+      </p:sp>
+      <p:sp>
+        <p:nvSpPr>
+          <p:cNvPr id="64" name="TextBox 63"/>
+          <p:cNvSpPr txBox="1"/>
+          <p:nvPr/>
+        </p:nvSpPr>
+        <p:spPr>
+          <a:xfrm>
+            <a:off x="7582370" y="1633225"/>
+            <a:ext cx="518716" cy="369332"/>
+          </a:xfrm>
+          <a:prstGeom prst="rect">
+            <a:avLst/>
+          </a:prstGeom>
+          <a:noFill/>
+        </p:spPr>
+        <p:txBody>
+          <a:bodyPr wrap="square" rtlCol="0">
+            <a:spAutoFit/>
+          </a:bodyPr>
+          <a:lstStyle/>
+          <a:p>
+            <a:r>
+              <a:rPr lang="en-US" dirty="0" smtClean="0"/>
+              <a:t>t&gt;0</a:t>
+            </a:r>
+            <a:endParaRPr lang="en-US" baseline="-25000" dirty="0"/>
+          </a:p>
+        </p:txBody>
+      </p:sp>
+    </p:spTree>
+    <p:extLst>
+      <p:ext uri="{BB962C8B-B14F-4D97-AF65-F5344CB8AC3E}">
+        <p14:creationId xmlns:p14="http://schemas.microsoft.com/office/powerpoint/2010/main" val="3291362728"/>
+      </p:ext>
+    </p:extLst>
+  </p:cSld>
+  <p:clrMapOvr>
+    <a:masterClrMapping/>
+  </p:clrMapOvr>
+</p:sld>
+</file>
+
+<file path=ppt/slides/slide20.xml><?xml version="1.0" encoding="utf-8"?>
 <p:sld xmlns:a="http://schemas.openxmlformats.org/drawingml/2006/main" xmlns:r="http://schemas.openxmlformats.org/officeDocument/2006/relationships" xmlns:p="http://schemas.openxmlformats.org/presentationml/2006/main">
   <p:cSld>
     <p:spTree>
@@ -15419,731 +17591,7 @@
 </p:sld>
 </file>
 
-<file path=ppt/slides/slide2.xml><?xml version="1.0" encoding="utf-8"?>
-<p:sld xmlns:a="http://schemas.openxmlformats.org/drawingml/2006/main" xmlns:r="http://schemas.openxmlformats.org/officeDocument/2006/relationships" xmlns:p="http://schemas.openxmlformats.org/presentationml/2006/main">
-  <p:cSld>
-    <p:spTree>
-      <p:nvGrpSpPr>
-        <p:cNvPr id="1" name=""/>
-        <p:cNvGrpSpPr/>
-        <p:nvPr/>
-      </p:nvGrpSpPr>
-      <p:grpSpPr>
-        <a:xfrm>
-          <a:off x="0" y="0"/>
-          <a:ext cx="0" cy="0"/>
-          <a:chOff x="0" y="0"/>
-          <a:chExt cx="0" cy="0"/>
-        </a:xfrm>
-      </p:grpSpPr>
-      <p:grpSp>
-        <p:nvGrpSpPr>
-          <p:cNvPr id="14" name="Group 13"/>
-          <p:cNvGrpSpPr/>
-          <p:nvPr/>
-        </p:nvGrpSpPr>
-        <p:grpSpPr>
-          <a:xfrm>
-            <a:off x="1366762" y="2116667"/>
-            <a:ext cx="520096" cy="520096"/>
-            <a:chOff x="2467428" y="1596571"/>
-            <a:chExt cx="520096" cy="520096"/>
-          </a:xfrm>
-        </p:grpSpPr>
-        <p:cxnSp>
-          <p:nvCxnSpPr>
-            <p:cNvPr id="10" name="Straight Arrow Connector 9"/>
-            <p:cNvCxnSpPr/>
-            <p:nvPr/>
-          </p:nvCxnSpPr>
-          <p:spPr>
-            <a:xfrm flipV="1">
-              <a:off x="2467428" y="1596571"/>
-              <a:ext cx="0" cy="520096"/>
-            </a:xfrm>
-            <a:prstGeom prst="straightConnector1">
-              <a:avLst/>
-            </a:prstGeom>
-            <a:ln>
-              <a:solidFill>
-                <a:schemeClr val="bg1">
-                  <a:lumMod val="50000"/>
-                </a:schemeClr>
-              </a:solidFill>
-              <a:tailEnd type="arrow"/>
-            </a:ln>
-            <a:effectLst/>
-          </p:spPr>
-          <p:style>
-            <a:lnRef idx="2">
-              <a:schemeClr val="dk1"/>
-            </a:lnRef>
-            <a:fillRef idx="0">
-              <a:schemeClr val="dk1"/>
-            </a:fillRef>
-            <a:effectRef idx="1">
-              <a:schemeClr val="dk1"/>
-            </a:effectRef>
-            <a:fontRef idx="minor">
-              <a:schemeClr val="tx1"/>
-            </a:fontRef>
-          </p:style>
-        </p:cxnSp>
-        <p:cxnSp>
-          <p:nvCxnSpPr>
-            <p:cNvPr id="11" name="Straight Arrow Connector 10"/>
-            <p:cNvCxnSpPr/>
-            <p:nvPr/>
-          </p:nvCxnSpPr>
-          <p:spPr>
-            <a:xfrm rot="5400000" flipV="1">
-              <a:off x="2727476" y="1845733"/>
-              <a:ext cx="0" cy="520096"/>
-            </a:xfrm>
-            <a:prstGeom prst="straightConnector1">
-              <a:avLst/>
-            </a:prstGeom>
-            <a:ln>
-              <a:solidFill>
-                <a:schemeClr val="bg1">
-                  <a:lumMod val="50000"/>
-                </a:schemeClr>
-              </a:solidFill>
-              <a:tailEnd type="arrow"/>
-            </a:ln>
-            <a:effectLst/>
-          </p:spPr>
-          <p:style>
-            <a:lnRef idx="2">
-              <a:schemeClr val="dk1"/>
-            </a:lnRef>
-            <a:fillRef idx="0">
-              <a:schemeClr val="dk1"/>
-            </a:fillRef>
-            <a:effectRef idx="1">
-              <a:schemeClr val="dk1"/>
-            </a:effectRef>
-            <a:fontRef idx="minor">
-              <a:schemeClr val="tx1"/>
-            </a:fontRef>
-          </p:style>
-        </p:cxnSp>
-      </p:grpSp>
-      <p:grpSp>
-        <p:nvGrpSpPr>
-          <p:cNvPr id="15" name="Group 14"/>
-          <p:cNvGrpSpPr/>
-          <p:nvPr/>
-        </p:nvGrpSpPr>
-        <p:grpSpPr>
-          <a:xfrm>
-            <a:off x="1366762" y="4361543"/>
-            <a:ext cx="520096" cy="520096"/>
-            <a:chOff x="2467428" y="1596571"/>
-            <a:chExt cx="520096" cy="520096"/>
-          </a:xfrm>
-        </p:grpSpPr>
-        <p:cxnSp>
-          <p:nvCxnSpPr>
-            <p:cNvPr id="16" name="Straight Arrow Connector 15"/>
-            <p:cNvCxnSpPr/>
-            <p:nvPr/>
-          </p:nvCxnSpPr>
-          <p:spPr>
-            <a:xfrm flipV="1">
-              <a:off x="2467428" y="1596571"/>
-              <a:ext cx="0" cy="520096"/>
-            </a:xfrm>
-            <a:prstGeom prst="straightConnector1">
-              <a:avLst/>
-            </a:prstGeom>
-            <a:ln>
-              <a:tailEnd type="arrow"/>
-            </a:ln>
-            <a:effectLst/>
-          </p:spPr>
-          <p:style>
-            <a:lnRef idx="2">
-              <a:schemeClr val="dk1"/>
-            </a:lnRef>
-            <a:fillRef idx="0">
-              <a:schemeClr val="dk1"/>
-            </a:fillRef>
-            <a:effectRef idx="1">
-              <a:schemeClr val="dk1"/>
-            </a:effectRef>
-            <a:fontRef idx="minor">
-              <a:schemeClr val="tx1"/>
-            </a:fontRef>
-          </p:style>
-        </p:cxnSp>
-        <p:cxnSp>
-          <p:nvCxnSpPr>
-            <p:cNvPr id="17" name="Straight Arrow Connector 16"/>
-            <p:cNvCxnSpPr/>
-            <p:nvPr/>
-          </p:nvCxnSpPr>
-          <p:spPr>
-            <a:xfrm rot="5400000" flipV="1">
-              <a:off x="2727476" y="1845733"/>
-              <a:ext cx="0" cy="520096"/>
-            </a:xfrm>
-            <a:prstGeom prst="straightConnector1">
-              <a:avLst/>
-            </a:prstGeom>
-            <a:ln>
-              <a:tailEnd type="arrow"/>
-            </a:ln>
-            <a:effectLst/>
-          </p:spPr>
-          <p:style>
-            <a:lnRef idx="2">
-              <a:schemeClr val="dk1"/>
-            </a:lnRef>
-            <a:fillRef idx="0">
-              <a:schemeClr val="dk1"/>
-            </a:fillRef>
-            <a:effectRef idx="1">
-              <a:schemeClr val="dk1"/>
-            </a:effectRef>
-            <a:fontRef idx="minor">
-              <a:schemeClr val="tx1"/>
-            </a:fontRef>
-          </p:style>
-        </p:cxnSp>
-      </p:grpSp>
-      <p:cxnSp>
-        <p:nvCxnSpPr>
-          <p:cNvPr id="20" name="Straight Arrow Connector 19"/>
-          <p:cNvCxnSpPr/>
-          <p:nvPr/>
-        </p:nvCxnSpPr>
-        <p:spPr>
-          <a:xfrm flipV="1">
-            <a:off x="1366762" y="1672167"/>
-            <a:ext cx="929821" cy="964597"/>
-          </a:xfrm>
-          <a:prstGeom prst="straightConnector1">
-            <a:avLst/>
-          </a:prstGeom>
-          <a:ln w="28575" cmpd="sng">
-            <a:tailEnd type="arrow"/>
-          </a:ln>
-          <a:effectLst/>
-        </p:spPr>
-        <p:style>
-          <a:lnRef idx="2">
-            <a:schemeClr val="dk1"/>
-          </a:lnRef>
-          <a:fillRef idx="0">
-            <a:schemeClr val="dk1"/>
-          </a:fillRef>
-          <a:effectRef idx="1">
-            <a:schemeClr val="dk1"/>
-          </a:effectRef>
-          <a:fontRef idx="minor">
-            <a:schemeClr val="tx1"/>
-          </a:fontRef>
-        </p:style>
-      </p:cxnSp>
-      <p:sp>
-        <p:nvSpPr>
-          <p:cNvPr id="24" name="TextBox 23"/>
-          <p:cNvSpPr txBox="1"/>
-          <p:nvPr/>
-        </p:nvSpPr>
-        <p:spPr>
-          <a:xfrm>
-            <a:off x="1602621" y="1696148"/>
-            <a:ext cx="399142" cy="369332"/>
-          </a:xfrm>
-          <a:prstGeom prst="rect">
-            <a:avLst/>
-          </a:prstGeom>
-          <a:noFill/>
-        </p:spPr>
-        <p:txBody>
-          <a:bodyPr wrap="square" rtlCol="0">
-            <a:spAutoFit/>
-          </a:bodyPr>
-          <a:lstStyle/>
-          <a:p>
-            <a:r>
-              <a:rPr lang="en-US" dirty="0" smtClean="0"/>
-              <a:t>X</a:t>
-            </a:r>
-            <a:r>
-              <a:rPr lang="en-US" baseline="-25000" dirty="0" smtClean="0"/>
-              <a:t>0</a:t>
-            </a:r>
-            <a:endParaRPr lang="en-US" baseline="-25000" dirty="0"/>
-          </a:p>
-        </p:txBody>
-      </p:sp>
-      <p:cxnSp>
-        <p:nvCxnSpPr>
-          <p:cNvPr id="25" name="Straight Arrow Connector 24"/>
-          <p:cNvCxnSpPr/>
-          <p:nvPr/>
-        </p:nvCxnSpPr>
-        <p:spPr>
-          <a:xfrm flipV="1">
-            <a:off x="2296583" y="1354667"/>
-            <a:ext cx="751417" cy="317502"/>
-          </a:xfrm>
-          <a:prstGeom prst="straightConnector1">
-            <a:avLst/>
-          </a:prstGeom>
-          <a:ln w="28575" cmpd="sng">
-            <a:tailEnd type="arrow"/>
-          </a:ln>
-          <a:effectLst/>
-        </p:spPr>
-        <p:style>
-          <a:lnRef idx="2">
-            <a:schemeClr val="dk1"/>
-          </a:lnRef>
-          <a:fillRef idx="0">
-            <a:schemeClr val="dk1"/>
-          </a:fillRef>
-          <a:effectRef idx="1">
-            <a:schemeClr val="dk1"/>
-          </a:effectRef>
-          <a:fontRef idx="minor">
-            <a:schemeClr val="tx1"/>
-          </a:fontRef>
-        </p:style>
-      </p:cxnSp>
-      <p:sp>
-        <p:nvSpPr>
-          <p:cNvPr id="28" name="TextBox 27"/>
-          <p:cNvSpPr txBox="1"/>
-          <p:nvPr/>
-        </p:nvSpPr>
-        <p:spPr>
-          <a:xfrm>
-            <a:off x="2587574" y="1426047"/>
-            <a:ext cx="399142" cy="369332"/>
-          </a:xfrm>
-          <a:prstGeom prst="rect">
-            <a:avLst/>
-          </a:prstGeom>
-          <a:noFill/>
-        </p:spPr>
-        <p:txBody>
-          <a:bodyPr wrap="square" rtlCol="0">
-            <a:spAutoFit/>
-          </a:bodyPr>
-          <a:lstStyle/>
-          <a:p>
-            <a:r>
-              <a:rPr lang="en-US" dirty="0" smtClean="0"/>
-              <a:t>v</a:t>
-            </a:r>
-            <a:r>
-              <a:rPr lang="en-US" baseline="-25000" dirty="0" smtClean="0"/>
-              <a:t>0</a:t>
-            </a:r>
-            <a:endParaRPr lang="en-US" baseline="-25000" dirty="0"/>
-          </a:p>
-        </p:txBody>
-      </p:sp>
-      <p:cxnSp>
-        <p:nvCxnSpPr>
-          <p:cNvPr id="34" name="Straight Arrow Connector 33"/>
-          <p:cNvCxnSpPr/>
-          <p:nvPr/>
-        </p:nvCxnSpPr>
-        <p:spPr>
-          <a:xfrm>
-            <a:off x="2296583" y="1676711"/>
-            <a:ext cx="1511" cy="546098"/>
-          </a:xfrm>
-          <a:prstGeom prst="straightConnector1">
-            <a:avLst/>
-          </a:prstGeom>
-          <a:ln w="28575" cmpd="sng">
-            <a:tailEnd type="arrow"/>
-          </a:ln>
-          <a:effectLst/>
-        </p:spPr>
-        <p:style>
-          <a:lnRef idx="2">
-            <a:schemeClr val="dk1"/>
-          </a:lnRef>
-          <a:fillRef idx="0">
-            <a:schemeClr val="dk1"/>
-          </a:fillRef>
-          <a:effectRef idx="1">
-            <a:schemeClr val="dk1"/>
-          </a:effectRef>
-          <a:fontRef idx="minor">
-            <a:schemeClr val="tx1"/>
-          </a:fontRef>
-        </p:style>
-      </p:cxnSp>
-      <p:sp>
-        <p:nvSpPr>
-          <p:cNvPr id="36" name="TextBox 35"/>
-          <p:cNvSpPr txBox="1"/>
-          <p:nvPr/>
-        </p:nvSpPr>
-        <p:spPr>
-          <a:xfrm>
-            <a:off x="2329242" y="1763675"/>
-            <a:ext cx="399142" cy="369332"/>
-          </a:xfrm>
-          <a:prstGeom prst="rect">
-            <a:avLst/>
-          </a:prstGeom>
-          <a:noFill/>
-        </p:spPr>
-        <p:txBody>
-          <a:bodyPr wrap="square" rtlCol="0">
-            <a:spAutoFit/>
-          </a:bodyPr>
-          <a:lstStyle/>
-          <a:p>
-            <a:r>
-              <a:rPr lang="en-US" dirty="0" smtClean="0"/>
-              <a:t>a</a:t>
-            </a:r>
-            <a:endParaRPr lang="en-US" baseline="-25000" dirty="0"/>
-          </a:p>
-        </p:txBody>
-      </p:sp>
-      <p:grpSp>
-        <p:nvGrpSpPr>
-          <p:cNvPr id="37" name="Group 36"/>
-          <p:cNvGrpSpPr/>
-          <p:nvPr/>
-        </p:nvGrpSpPr>
-        <p:grpSpPr>
-          <a:xfrm>
-            <a:off x="4864496" y="2117574"/>
-            <a:ext cx="520096" cy="520096"/>
-            <a:chOff x="2467428" y="1596571"/>
-            <a:chExt cx="520096" cy="520096"/>
-          </a:xfrm>
-        </p:grpSpPr>
-        <p:cxnSp>
-          <p:nvCxnSpPr>
-            <p:cNvPr id="38" name="Straight Arrow Connector 37"/>
-            <p:cNvCxnSpPr/>
-            <p:nvPr/>
-          </p:nvCxnSpPr>
-          <p:spPr>
-            <a:xfrm flipV="1">
-              <a:off x="2467428" y="1596571"/>
-              <a:ext cx="0" cy="520096"/>
-            </a:xfrm>
-            <a:prstGeom prst="straightConnector1">
-              <a:avLst/>
-            </a:prstGeom>
-            <a:ln>
-              <a:solidFill>
-                <a:schemeClr val="bg1">
-                  <a:lumMod val="50000"/>
-                </a:schemeClr>
-              </a:solidFill>
-              <a:tailEnd type="arrow"/>
-            </a:ln>
-            <a:effectLst/>
-          </p:spPr>
-          <p:style>
-            <a:lnRef idx="2">
-              <a:schemeClr val="dk1"/>
-            </a:lnRef>
-            <a:fillRef idx="0">
-              <a:schemeClr val="dk1"/>
-            </a:fillRef>
-            <a:effectRef idx="1">
-              <a:schemeClr val="dk1"/>
-            </a:effectRef>
-            <a:fontRef idx="minor">
-              <a:schemeClr val="tx1"/>
-            </a:fontRef>
-          </p:style>
-        </p:cxnSp>
-        <p:cxnSp>
-          <p:nvCxnSpPr>
-            <p:cNvPr id="39" name="Straight Arrow Connector 38"/>
-            <p:cNvCxnSpPr/>
-            <p:nvPr/>
-          </p:nvCxnSpPr>
-          <p:spPr>
-            <a:xfrm rot="5400000" flipV="1">
-              <a:off x="2727476" y="1845733"/>
-              <a:ext cx="0" cy="520096"/>
-            </a:xfrm>
-            <a:prstGeom prst="straightConnector1">
-              <a:avLst/>
-            </a:prstGeom>
-            <a:ln>
-              <a:solidFill>
-                <a:schemeClr val="bg1">
-                  <a:lumMod val="50000"/>
-                </a:schemeClr>
-              </a:solidFill>
-              <a:tailEnd type="arrow"/>
-            </a:ln>
-            <a:effectLst/>
-          </p:spPr>
-          <p:style>
-            <a:lnRef idx="2">
-              <a:schemeClr val="dk1"/>
-            </a:lnRef>
-            <a:fillRef idx="0">
-              <a:schemeClr val="dk1"/>
-            </a:fillRef>
-            <a:effectRef idx="1">
-              <a:schemeClr val="dk1"/>
-            </a:effectRef>
-            <a:fontRef idx="minor">
-              <a:schemeClr val="tx1"/>
-            </a:fontRef>
-          </p:style>
-        </p:cxnSp>
-      </p:grpSp>
-      <p:sp>
-        <p:nvSpPr>
-          <p:cNvPr id="46" name="Right Arrow 45"/>
-          <p:cNvSpPr/>
-          <p:nvPr/>
-        </p:nvSpPr>
-        <p:spPr>
-          <a:xfrm>
-            <a:off x="3226741" y="1553323"/>
-            <a:ext cx="1476963" cy="1024314"/>
-          </a:xfrm>
-          <a:prstGeom prst="rightArrow">
-            <a:avLst/>
-          </a:prstGeom>
-        </p:spPr>
-        <p:style>
-          <a:lnRef idx="1">
-            <a:schemeClr val="dk1"/>
-          </a:lnRef>
-          <a:fillRef idx="3">
-            <a:schemeClr val="dk1"/>
-          </a:fillRef>
-          <a:effectRef idx="2">
-            <a:schemeClr val="dk1"/>
-          </a:effectRef>
-          <a:fontRef idx="minor">
-            <a:schemeClr val="lt1"/>
-          </a:fontRef>
-        </p:style>
-        <p:txBody>
-          <a:bodyPr rtlCol="0" anchor="ctr"/>
-          <a:lstStyle/>
-          <a:p>
-            <a:pPr algn="ctr"/>
-            <a:r>
-              <a:rPr lang="en-US" dirty="0" smtClean="0"/>
-              <a:t>Integration</a:t>
-            </a:r>
-            <a:endParaRPr lang="en-US" dirty="0"/>
-          </a:p>
-        </p:txBody>
-      </p:sp>
-      <p:sp>
-        <p:nvSpPr>
-          <p:cNvPr id="47" name="Oval 46"/>
-          <p:cNvSpPr/>
-          <p:nvPr/>
-        </p:nvSpPr>
-        <p:spPr>
-          <a:xfrm>
-            <a:off x="5743911" y="1602947"/>
-            <a:ext cx="100811" cy="100811"/>
-          </a:xfrm>
-          <a:prstGeom prst="ellipse">
-            <a:avLst/>
-          </a:prstGeom>
-          <a:solidFill>
-            <a:schemeClr val="tx1"/>
-          </a:solidFill>
-          <a:effectLst/>
-        </p:spPr>
-        <p:style>
-          <a:lnRef idx="1">
-            <a:schemeClr val="dk1"/>
-          </a:lnRef>
-          <a:fillRef idx="3">
-            <a:schemeClr val="dk1"/>
-          </a:fillRef>
-          <a:effectRef idx="2">
-            <a:schemeClr val="dk1"/>
-          </a:effectRef>
-          <a:fontRef idx="minor">
-            <a:schemeClr val="lt1"/>
-          </a:fontRef>
-        </p:style>
-        <p:txBody>
-          <a:bodyPr rtlCol="0" anchor="ctr"/>
-          <a:lstStyle/>
-          <a:p>
-            <a:pPr algn="ctr"/>
-            <a:endParaRPr lang="en-US"/>
-          </a:p>
-        </p:txBody>
-      </p:sp>
-      <p:sp>
-        <p:nvSpPr>
-          <p:cNvPr id="62" name="Freeform 61"/>
-          <p:cNvSpPr/>
-          <p:nvPr/>
-        </p:nvSpPr>
-        <p:spPr>
-          <a:xfrm>
-            <a:off x="5766741" y="1365193"/>
-            <a:ext cx="1815629" cy="854955"/>
-          </a:xfrm>
-          <a:custGeom>
-            <a:avLst/>
-            <a:gdLst>
-              <a:gd name="connsiteX0" fmla="*/ 0 w 1815629"/>
-              <a:gd name="connsiteY0" fmla="*/ 281103 h 854955"/>
-              <a:gd name="connsiteX1" fmla="*/ 1044222 w 1815629"/>
-              <a:gd name="connsiteY1" fmla="*/ 27103 h 854955"/>
-              <a:gd name="connsiteX2" fmla="*/ 1815629 w 1815629"/>
-              <a:gd name="connsiteY2" fmla="*/ 854955 h 854955"/>
-            </a:gdLst>
-            <a:ahLst/>
-            <a:cxnLst>
-              <a:cxn ang="0">
-                <a:pos x="connsiteX0" y="connsiteY0"/>
-              </a:cxn>
-              <a:cxn ang="0">
-                <a:pos x="connsiteX1" y="connsiteY1"/>
-              </a:cxn>
-              <a:cxn ang="0">
-                <a:pos x="connsiteX2" y="connsiteY2"/>
-              </a:cxn>
-            </a:cxnLst>
-            <a:rect l="l" t="t" r="r" b="b"/>
-            <a:pathLst>
-              <a:path w="1815629" h="854955">
-                <a:moveTo>
-                  <a:pt x="0" y="281103"/>
-                </a:moveTo>
-                <a:cubicBezTo>
-                  <a:pt x="370808" y="106282"/>
-                  <a:pt x="741617" y="-68539"/>
-                  <a:pt x="1044222" y="27103"/>
-                </a:cubicBezTo>
-                <a:cubicBezTo>
-                  <a:pt x="1346827" y="122745"/>
-                  <a:pt x="1767024" y="536671"/>
-                  <a:pt x="1815629" y="854955"/>
-                </a:cubicBezTo>
-              </a:path>
-            </a:pathLst>
-          </a:custGeom>
-          <a:ln>
-            <a:prstDash val="dash"/>
-            <a:headEnd type="none"/>
-            <a:tailEnd type="arrow"/>
-          </a:ln>
-        </p:spPr>
-        <p:style>
-          <a:lnRef idx="2">
-            <a:schemeClr val="dk1"/>
-          </a:lnRef>
-          <a:fillRef idx="0">
-            <a:schemeClr val="dk1"/>
-          </a:fillRef>
-          <a:effectRef idx="1">
-            <a:schemeClr val="dk1"/>
-          </a:effectRef>
-          <a:fontRef idx="minor">
-            <a:schemeClr val="tx1"/>
-          </a:fontRef>
-        </p:style>
-        <p:txBody>
-          <a:bodyPr rtlCol="0" anchor="ctr"/>
-          <a:lstStyle/>
-          <a:p>
-            <a:pPr algn="ctr"/>
-            <a:endParaRPr lang="en-US"/>
-          </a:p>
-        </p:txBody>
-      </p:sp>
-      <p:sp>
-        <p:nvSpPr>
-          <p:cNvPr id="63" name="TextBox 62"/>
-          <p:cNvSpPr txBox="1"/>
-          <p:nvPr/>
-        </p:nvSpPr>
-        <p:spPr>
-          <a:xfrm>
-            <a:off x="5445580" y="1237097"/>
-            <a:ext cx="518716" cy="369332"/>
-          </a:xfrm>
-          <a:prstGeom prst="rect">
-            <a:avLst/>
-          </a:prstGeom>
-          <a:noFill/>
-        </p:spPr>
-        <p:txBody>
-          <a:bodyPr wrap="square" rtlCol="0">
-            <a:spAutoFit/>
-          </a:bodyPr>
-          <a:lstStyle/>
-          <a:p>
-            <a:r>
-              <a:rPr lang="en-US" dirty="0" smtClean="0"/>
-              <a:t>t=0</a:t>
-            </a:r>
-            <a:endParaRPr lang="en-US" baseline="-25000" dirty="0"/>
-          </a:p>
-        </p:txBody>
-      </p:sp>
-      <p:sp>
-        <p:nvSpPr>
-          <p:cNvPr id="64" name="TextBox 63"/>
-          <p:cNvSpPr txBox="1"/>
-          <p:nvPr/>
-        </p:nvSpPr>
-        <p:spPr>
-          <a:xfrm>
-            <a:off x="7582370" y="1633225"/>
-            <a:ext cx="518716" cy="369332"/>
-          </a:xfrm>
-          <a:prstGeom prst="rect">
-            <a:avLst/>
-          </a:prstGeom>
-          <a:noFill/>
-        </p:spPr>
-        <p:txBody>
-          <a:bodyPr wrap="square" rtlCol="0">
-            <a:spAutoFit/>
-          </a:bodyPr>
-          <a:lstStyle/>
-          <a:p>
-            <a:r>
-              <a:rPr lang="en-US" dirty="0" smtClean="0"/>
-              <a:t>t&gt;0</a:t>
-            </a:r>
-            <a:endParaRPr lang="en-US" baseline="-25000" dirty="0"/>
-          </a:p>
-        </p:txBody>
-      </p:sp>
-    </p:spTree>
-    <p:extLst>
-      <p:ext uri="{BB962C8B-B14F-4D97-AF65-F5344CB8AC3E}">
-        <p14:creationId xmlns:p14="http://schemas.microsoft.com/office/powerpoint/2010/main" val="3291362728"/>
-      </p:ext>
-    </p:extLst>
-  </p:cSld>
-  <p:clrMapOvr>
-    <a:masterClrMapping/>
-  </p:clrMapOvr>
-</p:sld>
-</file>
-
-<file path=ppt/slides/slide20.xml><?xml version="1.0" encoding="utf-8"?>
+<file path=ppt/slides/slide21.xml><?xml version="1.0" encoding="utf-8"?>
 <p:sld xmlns:a="http://schemas.openxmlformats.org/drawingml/2006/main" xmlns:r="http://schemas.openxmlformats.org/officeDocument/2006/relationships" xmlns:p="http://schemas.openxmlformats.org/presentationml/2006/main">
   <p:cSld>
     <p:spTree>
@@ -20604,8 +22052,8 @@
         </p:nvCxnSpPr>
         <p:spPr>
           <a:xfrm flipH="1" flipV="1">
-            <a:off x="1227063" y="3202154"/>
-            <a:ext cx="2644712" cy="757504"/>
+            <a:off x="1292223" y="3220817"/>
+            <a:ext cx="2579552" cy="738841"/>
           </a:xfrm>
           <a:prstGeom prst="straightConnector1">
             <a:avLst/>
@@ -20981,7 +22429,7 @@
         </p:nvSpPr>
         <p:spPr>
           <a:xfrm>
-            <a:off x="1515446" y="2974749"/>
+            <a:off x="1065143" y="3438725"/>
             <a:ext cx="399142" cy="369332"/>
           </a:xfrm>
           <a:prstGeom prst="rect">
@@ -21003,6 +22451,40 @@
           </a:p>
         </p:txBody>
       </p:sp>
+      <p:cxnSp>
+        <p:nvCxnSpPr>
+          <p:cNvPr id="77" name="Straight Arrow Connector 76"/>
+          <p:cNvCxnSpPr/>
+          <p:nvPr/>
+        </p:nvCxnSpPr>
+        <p:spPr>
+          <a:xfrm flipV="1">
+            <a:off x="725106" y="3310282"/>
+            <a:ext cx="877515" cy="1336508"/>
+          </a:xfrm>
+          <a:prstGeom prst="straightConnector1">
+            <a:avLst/>
+          </a:prstGeom>
+          <a:ln w="28575" cmpd="sng">
+            <a:tailEnd type="arrow"/>
+          </a:ln>
+          <a:effectLst/>
+        </p:spPr>
+        <p:style>
+          <a:lnRef idx="2">
+            <a:schemeClr val="dk1"/>
+          </a:lnRef>
+          <a:fillRef idx="0">
+            <a:schemeClr val="dk1"/>
+          </a:fillRef>
+          <a:effectRef idx="1">
+            <a:schemeClr val="dk1"/>
+          </a:effectRef>
+          <a:fontRef idx="minor">
+            <a:schemeClr val="tx1"/>
+          </a:fontRef>
+        </p:style>
+      </p:cxnSp>
     </p:spTree>
     <p:extLst>
       <p:ext uri="{BB962C8B-B14F-4D97-AF65-F5344CB8AC3E}">
@@ -21790,13 +23272,13 @@
       </p:grpSpPr>
       <p:sp>
         <p:nvSpPr>
-          <p:cNvPr id="64" name="Freeform 63"/>
+          <p:cNvPr id="12" name="Freeform 11"/>
           <p:cNvSpPr/>
           <p:nvPr/>
         </p:nvSpPr>
         <p:spPr>
           <a:xfrm rot="1049416">
-            <a:off x="5434802" y="1826749"/>
+            <a:off x="1063660" y="2131781"/>
             <a:ext cx="2724728" cy="1177063"/>
           </a:xfrm>
           <a:custGeom>
@@ -21935,153 +23417,6 @@
           </a:p>
         </p:txBody>
       </p:sp>
-      <p:sp>
-        <p:nvSpPr>
-          <p:cNvPr id="12" name="Freeform 11"/>
-          <p:cNvSpPr/>
-          <p:nvPr/>
-        </p:nvSpPr>
-        <p:spPr>
-          <a:xfrm rot="1049416">
-            <a:off x="1063660" y="1826751"/>
-            <a:ext cx="2724728" cy="1177063"/>
-          </a:xfrm>
-          <a:custGeom>
-            <a:avLst/>
-            <a:gdLst>
-              <a:gd name="connsiteX0" fmla="*/ 0 w 3009516"/>
-              <a:gd name="connsiteY0" fmla="*/ 638849 h 1585576"/>
-              <a:gd name="connsiteX1" fmla="*/ 284788 w 3009516"/>
-              <a:gd name="connsiteY1" fmla="*/ 0 h 1585576"/>
-              <a:gd name="connsiteX2" fmla="*/ 569576 w 3009516"/>
-              <a:gd name="connsiteY2" fmla="*/ 307879 h 1585576"/>
-              <a:gd name="connsiteX3" fmla="*/ 3009516 w 3009516"/>
-              <a:gd name="connsiteY3" fmla="*/ 815879 h 1585576"/>
-              <a:gd name="connsiteX4" fmla="*/ 2709334 w 3009516"/>
-              <a:gd name="connsiteY4" fmla="*/ 1585576 h 1585576"/>
-              <a:gd name="connsiteX5" fmla="*/ 53879 w 3009516"/>
-              <a:gd name="connsiteY5" fmla="*/ 1239212 h 1585576"/>
-              <a:gd name="connsiteX6" fmla="*/ 0 w 3009516"/>
-              <a:gd name="connsiteY6" fmla="*/ 638849 h 1585576"/>
-              <a:gd name="connsiteX0" fmla="*/ 0 w 3009516"/>
-              <a:gd name="connsiteY0" fmla="*/ 638849 h 1585576"/>
-              <a:gd name="connsiteX1" fmla="*/ 284788 w 3009516"/>
-              <a:gd name="connsiteY1" fmla="*/ 0 h 1585576"/>
-              <a:gd name="connsiteX2" fmla="*/ 569576 w 3009516"/>
-              <a:gd name="connsiteY2" fmla="*/ 307879 h 1585576"/>
-              <a:gd name="connsiteX3" fmla="*/ 3009516 w 3009516"/>
-              <a:gd name="connsiteY3" fmla="*/ 815879 h 1585576"/>
-              <a:gd name="connsiteX4" fmla="*/ 2709334 w 3009516"/>
-              <a:gd name="connsiteY4" fmla="*/ 1585576 h 1585576"/>
-              <a:gd name="connsiteX5" fmla="*/ 635975 w 3009516"/>
-              <a:gd name="connsiteY5" fmla="*/ 962217 h 1585576"/>
-              <a:gd name="connsiteX6" fmla="*/ 0 w 3009516"/>
-              <a:gd name="connsiteY6" fmla="*/ 638849 h 1585576"/>
-              <a:gd name="connsiteX0" fmla="*/ 8417 w 2724728"/>
-              <a:gd name="connsiteY0" fmla="*/ 632827 h 1585576"/>
-              <a:gd name="connsiteX1" fmla="*/ 0 w 2724728"/>
-              <a:gd name="connsiteY1" fmla="*/ 0 h 1585576"/>
-              <a:gd name="connsiteX2" fmla="*/ 284788 w 2724728"/>
-              <a:gd name="connsiteY2" fmla="*/ 307879 h 1585576"/>
-              <a:gd name="connsiteX3" fmla="*/ 2724728 w 2724728"/>
-              <a:gd name="connsiteY3" fmla="*/ 815879 h 1585576"/>
-              <a:gd name="connsiteX4" fmla="*/ 2424546 w 2724728"/>
-              <a:gd name="connsiteY4" fmla="*/ 1585576 h 1585576"/>
-              <a:gd name="connsiteX5" fmla="*/ 351187 w 2724728"/>
-              <a:gd name="connsiteY5" fmla="*/ 962217 h 1585576"/>
-              <a:gd name="connsiteX6" fmla="*/ 8417 w 2724728"/>
-              <a:gd name="connsiteY6" fmla="*/ 632827 h 1585576"/>
-              <a:gd name="connsiteX0" fmla="*/ 8417 w 2724728"/>
-              <a:gd name="connsiteY0" fmla="*/ 632827 h 1177063"/>
-              <a:gd name="connsiteX1" fmla="*/ 0 w 2724728"/>
-              <a:gd name="connsiteY1" fmla="*/ 0 h 1177063"/>
-              <a:gd name="connsiteX2" fmla="*/ 284788 w 2724728"/>
-              <a:gd name="connsiteY2" fmla="*/ 307879 h 1177063"/>
-              <a:gd name="connsiteX3" fmla="*/ 2724728 w 2724728"/>
-              <a:gd name="connsiteY3" fmla="*/ 815879 h 1177063"/>
-              <a:gd name="connsiteX4" fmla="*/ 1482487 w 2724728"/>
-              <a:gd name="connsiteY4" fmla="*/ 1177063 h 1177063"/>
-              <a:gd name="connsiteX5" fmla="*/ 351187 w 2724728"/>
-              <a:gd name="connsiteY5" fmla="*/ 962217 h 1177063"/>
-              <a:gd name="connsiteX6" fmla="*/ 8417 w 2724728"/>
-              <a:gd name="connsiteY6" fmla="*/ 632827 h 1177063"/>
-            </a:gdLst>
-            <a:ahLst/>
-            <a:cxnLst>
-              <a:cxn ang="0">
-                <a:pos x="connsiteX0" y="connsiteY0"/>
-              </a:cxn>
-              <a:cxn ang="0">
-                <a:pos x="connsiteX1" y="connsiteY1"/>
-              </a:cxn>
-              <a:cxn ang="0">
-                <a:pos x="connsiteX2" y="connsiteY2"/>
-              </a:cxn>
-              <a:cxn ang="0">
-                <a:pos x="connsiteX3" y="connsiteY3"/>
-              </a:cxn>
-              <a:cxn ang="0">
-                <a:pos x="connsiteX4" y="connsiteY4"/>
-              </a:cxn>
-              <a:cxn ang="0">
-                <a:pos x="connsiteX5" y="connsiteY5"/>
-              </a:cxn>
-              <a:cxn ang="0">
-                <a:pos x="connsiteX6" y="connsiteY6"/>
-              </a:cxn>
-            </a:cxnLst>
-            <a:rect l="l" t="t" r="r" b="b"/>
-            <a:pathLst>
-              <a:path w="2724728" h="1177063">
-                <a:moveTo>
-                  <a:pt x="8417" y="632827"/>
-                </a:moveTo>
-                <a:lnTo>
-                  <a:pt x="0" y="0"/>
-                </a:lnTo>
-                <a:lnTo>
-                  <a:pt x="284788" y="307879"/>
-                </a:lnTo>
-                <a:lnTo>
-                  <a:pt x="2724728" y="815879"/>
-                </a:lnTo>
-                <a:lnTo>
-                  <a:pt x="1482487" y="1177063"/>
-                </a:lnTo>
-                <a:lnTo>
-                  <a:pt x="351187" y="962217"/>
-                </a:lnTo>
-                <a:lnTo>
-                  <a:pt x="8417" y="632827"/>
-                </a:lnTo>
-                <a:close/>
-              </a:path>
-            </a:pathLst>
-          </a:custGeom>
-        </p:spPr>
-        <p:style>
-          <a:lnRef idx="1">
-            <a:schemeClr val="accent1"/>
-          </a:lnRef>
-          <a:fillRef idx="3">
-            <a:schemeClr val="accent1"/>
-          </a:fillRef>
-          <a:effectRef idx="2">
-            <a:schemeClr val="accent1"/>
-          </a:effectRef>
-          <a:fontRef idx="minor">
-            <a:schemeClr val="lt1"/>
-          </a:fontRef>
-        </p:style>
-        <p:txBody>
-          <a:bodyPr rtlCol="0" anchor="ctr"/>
-          <a:lstStyle/>
-          <a:p>
-            <a:pPr algn="ctr"/>
-            <a:endParaRPr lang="en-US"/>
-          </a:p>
-        </p:txBody>
-      </p:sp>
       <p:cxnSp>
         <p:nvCxnSpPr>
           <p:cNvPr id="9" name="Straight Arrow Connector 8"/>
@@ -22090,7 +23425,7 @@
         </p:nvCxnSpPr>
         <p:spPr>
           <a:xfrm>
-            <a:off x="2134207" y="2184324"/>
+            <a:off x="2134207" y="2489354"/>
             <a:ext cx="1511" cy="648161"/>
           </a:xfrm>
           <a:prstGeom prst="straightConnector1">
@@ -22124,7 +23459,7 @@
         </p:nvSpPr>
         <p:spPr>
           <a:xfrm>
-            <a:off x="1874572" y="2206869"/>
+            <a:off x="1874572" y="2511899"/>
             <a:ext cx="399142" cy="369332"/>
           </a:xfrm>
           <a:prstGeom prst="rect">
@@ -22154,7 +23489,7 @@
         </p:nvSpPr>
         <p:spPr>
           <a:xfrm>
-            <a:off x="3380680" y="1553323"/>
+            <a:off x="3242286" y="1836068"/>
             <a:ext cx="1476963" cy="1024314"/>
           </a:xfrm>
           <a:prstGeom prst="rightArrow">
@@ -22470,51 +23805,93 @@
           </a:p>
         </p:txBody>
       </p:sp>
-      <p:cxnSp>
-        <p:nvCxnSpPr>
-          <p:cNvPr id="57" name="Straight Arrow Connector 56"/>
-          <p:cNvCxnSpPr/>
-          <p:nvPr/>
-        </p:nvCxnSpPr>
-        <p:spPr>
-          <a:xfrm>
-            <a:off x="6436483" y="2166683"/>
-            <a:ext cx="360684" cy="201481"/>
-          </a:xfrm>
-          <a:prstGeom prst="straightConnector1">
-            <a:avLst/>
-          </a:prstGeom>
-          <a:ln w="19050" cmpd="sng">
-            <a:headEnd type="none"/>
-            <a:tailEnd type="arrow"/>
-          </a:ln>
-          <a:effectLst/>
+      <p:sp>
+        <p:nvSpPr>
+          <p:cNvPr id="15" name="Oval 14"/>
+          <p:cNvSpPr/>
+          <p:nvPr/>
+        </p:nvSpPr>
+        <p:spPr>
+          <a:xfrm>
+            <a:off x="2074143" y="2404688"/>
+            <a:ext cx="123151" cy="123151"/>
+          </a:xfrm>
+          <a:prstGeom prst="ellipse">
+            <a:avLst/>
+          </a:prstGeom>
+        </p:spPr>
+        <p:style>
+          <a:lnRef idx="1">
+            <a:schemeClr val="accent2"/>
+          </a:lnRef>
+          <a:fillRef idx="3">
+            <a:schemeClr val="accent2"/>
+          </a:fillRef>
+          <a:effectRef idx="2">
+            <a:schemeClr val="accent2"/>
+          </a:effectRef>
+          <a:fontRef idx="minor">
+            <a:schemeClr val="lt1"/>
+          </a:fontRef>
+        </p:style>
+        <p:txBody>
+          <a:bodyPr rtlCol="0" anchor="ctr"/>
+          <a:lstStyle/>
+          <a:p>
+            <a:pPr algn="ctr"/>
+            <a:endParaRPr lang="en-US"/>
+          </a:p>
+        </p:txBody>
+      </p:sp>
+      <p:sp>
+        <p:nvSpPr>
+          <p:cNvPr id="63" name="Rectangle 62"/>
+          <p:cNvSpPr/>
+          <p:nvPr/>
+        </p:nvSpPr>
+        <p:spPr>
+          <a:xfrm rot="18011192">
+            <a:off x="3833261" y="773564"/>
+            <a:ext cx="112756" cy="112756"/>
+          </a:xfrm>
+          <a:prstGeom prst="rect">
+            <a:avLst/>
+          </a:prstGeom>
+          <a:ln w="12700" cmpd="sng"/>
         </p:spPr>
         <p:style>
           <a:lnRef idx="2">
             <a:schemeClr val="dk1"/>
           </a:lnRef>
-          <a:fillRef idx="0">
-            <a:schemeClr val="dk1"/>
-          </a:fillRef>
-          <a:effectRef idx="1">
-            <a:schemeClr val="dk1"/>
-          </a:effectRef>
-          <a:fontRef idx="minor">
-            <a:schemeClr val="tx1"/>
-          </a:fontRef>
-        </p:style>
-      </p:cxnSp>
-      <p:sp>
-        <p:nvSpPr>
-          <p:cNvPr id="58" name="TextBox 57"/>
+          <a:fillRef idx="1">
+            <a:schemeClr val="lt1"/>
+          </a:fillRef>
+          <a:effectRef idx="0">
+            <a:schemeClr val="dk1"/>
+          </a:effectRef>
+          <a:fontRef idx="minor">
+            <a:schemeClr val="dk1"/>
+          </a:fontRef>
+        </p:style>
+        <p:txBody>
+          <a:bodyPr rtlCol="0" anchor="ctr"/>
+          <a:lstStyle/>
+          <a:p>
+            <a:pPr algn="ctr"/>
+            <a:endParaRPr lang="en-US"/>
+          </a:p>
+        </p:txBody>
+      </p:sp>
+      <p:sp>
+        <p:nvSpPr>
+          <p:cNvPr id="21" name="TextBox 20"/>
           <p:cNvSpPr txBox="1"/>
           <p:nvPr/>
         </p:nvSpPr>
         <p:spPr>
           <a:xfrm>
-            <a:off x="6499570" y="1915043"/>
-            <a:ext cx="823302" cy="338554"/>
+            <a:off x="2407402" y="3048929"/>
+            <a:ext cx="823302" cy="276999"/>
           </a:xfrm>
           <a:prstGeom prst="rect">
             <a:avLst/>
@@ -22528,132 +23905,402 @@
           <a:lstStyle/>
           <a:p>
             <a:r>
-              <a:rPr lang="en-US" sz="1600" dirty="0" smtClean="0"/>
-              <a:t>a</a:t>
-            </a:r>
-            <a:r>
-              <a:rPr lang="en-US" sz="1600" baseline="-25000" dirty="0" smtClean="0"/>
-              <a:t>projected</a:t>
-            </a:r>
-            <a:endParaRPr lang="en-US" sz="1600" baseline="-25000" dirty="0"/>
-          </a:p>
-        </p:txBody>
-      </p:sp>
-      <p:sp>
-        <p:nvSpPr>
-          <p:cNvPr id="54" name="Oval 53"/>
-          <p:cNvSpPr/>
-          <p:nvPr/>
-        </p:nvSpPr>
-        <p:spPr>
-          <a:xfrm>
-            <a:off x="6368722" y="2082017"/>
-            <a:ext cx="123151" cy="123151"/>
-          </a:xfrm>
-          <a:prstGeom prst="ellipse">
-            <a:avLst/>
-          </a:prstGeom>
-        </p:spPr>
-        <p:style>
-          <a:lnRef idx="1">
-            <a:schemeClr val="accent2"/>
-          </a:lnRef>
-          <a:fillRef idx="3">
-            <a:schemeClr val="accent2"/>
-          </a:fillRef>
-          <a:effectRef idx="2">
-            <a:schemeClr val="accent2"/>
-          </a:effectRef>
-          <a:fontRef idx="minor">
-            <a:schemeClr val="lt1"/>
-          </a:fontRef>
-        </p:style>
-        <p:txBody>
-          <a:bodyPr rtlCol="0" anchor="ctr"/>
-          <a:lstStyle/>
-          <a:p>
-            <a:pPr algn="ctr"/>
-            <a:endParaRPr lang="en-US"/>
-          </a:p>
-        </p:txBody>
-      </p:sp>
-      <p:sp>
-        <p:nvSpPr>
-          <p:cNvPr id="15" name="Oval 14"/>
-          <p:cNvSpPr/>
-          <p:nvPr/>
-        </p:nvSpPr>
-        <p:spPr>
-          <a:xfrm>
-            <a:off x="2074143" y="2099658"/>
-            <a:ext cx="123151" cy="123151"/>
-          </a:xfrm>
-          <a:prstGeom prst="ellipse">
-            <a:avLst/>
-          </a:prstGeom>
-        </p:spPr>
-        <p:style>
-          <a:lnRef idx="1">
-            <a:schemeClr val="accent2"/>
-          </a:lnRef>
-          <a:fillRef idx="3">
-            <a:schemeClr val="accent2"/>
-          </a:fillRef>
-          <a:effectRef idx="2">
-            <a:schemeClr val="accent2"/>
-          </a:effectRef>
-          <a:fontRef idx="minor">
-            <a:schemeClr val="lt1"/>
-          </a:fontRef>
-        </p:style>
-        <p:txBody>
-          <a:bodyPr rtlCol="0" anchor="ctr"/>
-          <a:lstStyle/>
-          <a:p>
-            <a:pPr algn="ctr"/>
-            <a:endParaRPr lang="en-US"/>
-          </a:p>
-        </p:txBody>
-      </p:sp>
-      <p:sp>
-        <p:nvSpPr>
-          <p:cNvPr id="63" name="Rectangle 62"/>
-          <p:cNvSpPr/>
-          <p:nvPr/>
-        </p:nvSpPr>
-        <p:spPr>
-          <a:xfrm rot="18011192">
-            <a:off x="3833261" y="773564"/>
-            <a:ext cx="112756" cy="112756"/>
-          </a:xfrm>
-          <a:prstGeom prst="rect">
-            <a:avLst/>
-          </a:prstGeom>
-          <a:ln w="12700" cmpd="sng"/>
-        </p:spPr>
-        <p:style>
-          <a:lnRef idx="2">
-            <a:schemeClr val="dk1"/>
-          </a:lnRef>
-          <a:fillRef idx="1">
-            <a:schemeClr val="lt1"/>
-          </a:fillRef>
-          <a:effectRef idx="0">
-            <a:schemeClr val="dk1"/>
-          </a:effectRef>
-          <a:fontRef idx="minor">
-            <a:schemeClr val="dk1"/>
-          </a:fontRef>
-        </p:style>
-        <p:txBody>
-          <a:bodyPr rtlCol="0" anchor="ctr"/>
-          <a:lstStyle/>
-          <a:p>
-            <a:pPr algn="ctr"/>
-            <a:endParaRPr lang="en-US"/>
-          </a:p>
-        </p:txBody>
-      </p:sp>
+              <a:rPr lang="en-US" sz="1200" dirty="0" smtClean="0"/>
+              <a:t>workpiece</a:t>
+            </a:r>
+            <a:endParaRPr lang="en-US" sz="1200" baseline="-25000" dirty="0"/>
+          </a:p>
+        </p:txBody>
+      </p:sp>
+      <p:grpSp>
+        <p:nvGrpSpPr>
+          <p:cNvPr id="14" name="Group 13"/>
+          <p:cNvGrpSpPr/>
+          <p:nvPr/>
+        </p:nvGrpSpPr>
+        <p:grpSpPr>
+          <a:xfrm>
+            <a:off x="4753173" y="2024195"/>
+            <a:ext cx="2973769" cy="1284647"/>
+            <a:chOff x="5002214" y="2131779"/>
+            <a:chExt cx="2724728" cy="1177063"/>
+          </a:xfrm>
+        </p:grpSpPr>
+        <p:sp>
+          <p:nvSpPr>
+            <p:cNvPr id="64" name="Freeform 63"/>
+            <p:cNvSpPr/>
+            <p:nvPr/>
+          </p:nvSpPr>
+          <p:spPr>
+            <a:xfrm rot="1049416">
+              <a:off x="5002214" y="2131779"/>
+              <a:ext cx="2724728" cy="1177063"/>
+            </a:xfrm>
+            <a:custGeom>
+              <a:avLst/>
+              <a:gdLst>
+                <a:gd name="connsiteX0" fmla="*/ 0 w 3009516"/>
+                <a:gd name="connsiteY0" fmla="*/ 638849 h 1585576"/>
+                <a:gd name="connsiteX1" fmla="*/ 284788 w 3009516"/>
+                <a:gd name="connsiteY1" fmla="*/ 0 h 1585576"/>
+                <a:gd name="connsiteX2" fmla="*/ 569576 w 3009516"/>
+                <a:gd name="connsiteY2" fmla="*/ 307879 h 1585576"/>
+                <a:gd name="connsiteX3" fmla="*/ 3009516 w 3009516"/>
+                <a:gd name="connsiteY3" fmla="*/ 815879 h 1585576"/>
+                <a:gd name="connsiteX4" fmla="*/ 2709334 w 3009516"/>
+                <a:gd name="connsiteY4" fmla="*/ 1585576 h 1585576"/>
+                <a:gd name="connsiteX5" fmla="*/ 53879 w 3009516"/>
+                <a:gd name="connsiteY5" fmla="*/ 1239212 h 1585576"/>
+                <a:gd name="connsiteX6" fmla="*/ 0 w 3009516"/>
+                <a:gd name="connsiteY6" fmla="*/ 638849 h 1585576"/>
+                <a:gd name="connsiteX0" fmla="*/ 0 w 3009516"/>
+                <a:gd name="connsiteY0" fmla="*/ 638849 h 1585576"/>
+                <a:gd name="connsiteX1" fmla="*/ 284788 w 3009516"/>
+                <a:gd name="connsiteY1" fmla="*/ 0 h 1585576"/>
+                <a:gd name="connsiteX2" fmla="*/ 569576 w 3009516"/>
+                <a:gd name="connsiteY2" fmla="*/ 307879 h 1585576"/>
+                <a:gd name="connsiteX3" fmla="*/ 3009516 w 3009516"/>
+                <a:gd name="connsiteY3" fmla="*/ 815879 h 1585576"/>
+                <a:gd name="connsiteX4" fmla="*/ 2709334 w 3009516"/>
+                <a:gd name="connsiteY4" fmla="*/ 1585576 h 1585576"/>
+                <a:gd name="connsiteX5" fmla="*/ 635975 w 3009516"/>
+                <a:gd name="connsiteY5" fmla="*/ 962217 h 1585576"/>
+                <a:gd name="connsiteX6" fmla="*/ 0 w 3009516"/>
+                <a:gd name="connsiteY6" fmla="*/ 638849 h 1585576"/>
+                <a:gd name="connsiteX0" fmla="*/ 8417 w 2724728"/>
+                <a:gd name="connsiteY0" fmla="*/ 632827 h 1585576"/>
+                <a:gd name="connsiteX1" fmla="*/ 0 w 2724728"/>
+                <a:gd name="connsiteY1" fmla="*/ 0 h 1585576"/>
+                <a:gd name="connsiteX2" fmla="*/ 284788 w 2724728"/>
+                <a:gd name="connsiteY2" fmla="*/ 307879 h 1585576"/>
+                <a:gd name="connsiteX3" fmla="*/ 2724728 w 2724728"/>
+                <a:gd name="connsiteY3" fmla="*/ 815879 h 1585576"/>
+                <a:gd name="connsiteX4" fmla="*/ 2424546 w 2724728"/>
+                <a:gd name="connsiteY4" fmla="*/ 1585576 h 1585576"/>
+                <a:gd name="connsiteX5" fmla="*/ 351187 w 2724728"/>
+                <a:gd name="connsiteY5" fmla="*/ 962217 h 1585576"/>
+                <a:gd name="connsiteX6" fmla="*/ 8417 w 2724728"/>
+                <a:gd name="connsiteY6" fmla="*/ 632827 h 1585576"/>
+                <a:gd name="connsiteX0" fmla="*/ 8417 w 2724728"/>
+                <a:gd name="connsiteY0" fmla="*/ 632827 h 1177063"/>
+                <a:gd name="connsiteX1" fmla="*/ 0 w 2724728"/>
+                <a:gd name="connsiteY1" fmla="*/ 0 h 1177063"/>
+                <a:gd name="connsiteX2" fmla="*/ 284788 w 2724728"/>
+                <a:gd name="connsiteY2" fmla="*/ 307879 h 1177063"/>
+                <a:gd name="connsiteX3" fmla="*/ 2724728 w 2724728"/>
+                <a:gd name="connsiteY3" fmla="*/ 815879 h 1177063"/>
+                <a:gd name="connsiteX4" fmla="*/ 1482487 w 2724728"/>
+                <a:gd name="connsiteY4" fmla="*/ 1177063 h 1177063"/>
+                <a:gd name="connsiteX5" fmla="*/ 351187 w 2724728"/>
+                <a:gd name="connsiteY5" fmla="*/ 962217 h 1177063"/>
+                <a:gd name="connsiteX6" fmla="*/ 8417 w 2724728"/>
+                <a:gd name="connsiteY6" fmla="*/ 632827 h 1177063"/>
+              </a:gdLst>
+              <a:ahLst/>
+              <a:cxnLst>
+                <a:cxn ang="0">
+                  <a:pos x="connsiteX0" y="connsiteY0"/>
+                </a:cxn>
+                <a:cxn ang="0">
+                  <a:pos x="connsiteX1" y="connsiteY1"/>
+                </a:cxn>
+                <a:cxn ang="0">
+                  <a:pos x="connsiteX2" y="connsiteY2"/>
+                </a:cxn>
+                <a:cxn ang="0">
+                  <a:pos x="connsiteX3" y="connsiteY3"/>
+                </a:cxn>
+                <a:cxn ang="0">
+                  <a:pos x="connsiteX4" y="connsiteY4"/>
+                </a:cxn>
+                <a:cxn ang="0">
+                  <a:pos x="connsiteX5" y="connsiteY5"/>
+                </a:cxn>
+                <a:cxn ang="0">
+                  <a:pos x="connsiteX6" y="connsiteY6"/>
+                </a:cxn>
+              </a:cxnLst>
+              <a:rect l="l" t="t" r="r" b="b"/>
+              <a:pathLst>
+                <a:path w="2724728" h="1177063">
+                  <a:moveTo>
+                    <a:pt x="8417" y="632827"/>
+                  </a:moveTo>
+                  <a:lnTo>
+                    <a:pt x="0" y="0"/>
+                  </a:lnTo>
+                  <a:lnTo>
+                    <a:pt x="284788" y="307879"/>
+                  </a:lnTo>
+                  <a:lnTo>
+                    <a:pt x="2724728" y="815879"/>
+                  </a:lnTo>
+                  <a:lnTo>
+                    <a:pt x="1482487" y="1177063"/>
+                  </a:lnTo>
+                  <a:lnTo>
+                    <a:pt x="351187" y="962217"/>
+                  </a:lnTo>
+                  <a:lnTo>
+                    <a:pt x="8417" y="632827"/>
+                  </a:lnTo>
+                  <a:close/>
+                </a:path>
+              </a:pathLst>
+            </a:custGeom>
+          </p:spPr>
+          <p:style>
+            <a:lnRef idx="1">
+              <a:schemeClr val="accent1"/>
+            </a:lnRef>
+            <a:fillRef idx="3">
+              <a:schemeClr val="accent1"/>
+            </a:fillRef>
+            <a:effectRef idx="2">
+              <a:schemeClr val="accent1"/>
+            </a:effectRef>
+            <a:fontRef idx="minor">
+              <a:schemeClr val="lt1"/>
+            </a:fontRef>
+          </p:style>
+          <p:txBody>
+            <a:bodyPr rtlCol="0" anchor="ctr"/>
+            <a:lstStyle/>
+            <a:p>
+              <a:pPr algn="ctr"/>
+              <a:endParaRPr lang="en-US"/>
+            </a:p>
+          </p:txBody>
+        </p:sp>
+        <p:sp>
+          <p:nvSpPr>
+            <p:cNvPr id="58" name="TextBox 57"/>
+            <p:cNvSpPr txBox="1"/>
+            <p:nvPr/>
+          </p:nvSpPr>
+          <p:spPr>
+            <a:xfrm>
+              <a:off x="6066982" y="2194665"/>
+              <a:ext cx="823302" cy="338554"/>
+            </a:xfrm>
+            <a:prstGeom prst="rect">
+              <a:avLst/>
+            </a:prstGeom>
+            <a:noFill/>
+          </p:spPr>
+          <p:txBody>
+            <a:bodyPr wrap="square" rtlCol="0">
+              <a:spAutoFit/>
+            </a:bodyPr>
+            <a:lstStyle/>
+            <a:p>
+              <a:r>
+                <a:rPr lang="en-US" sz="1600" dirty="0" smtClean="0"/>
+                <a:t>a</a:t>
+              </a:r>
+              <a:r>
+                <a:rPr lang="en-US" sz="1600" baseline="-25000" dirty="0" smtClean="0"/>
+                <a:t>projected</a:t>
+              </a:r>
+              <a:endParaRPr lang="en-US" sz="1600" baseline="-25000" dirty="0"/>
+            </a:p>
+          </p:txBody>
+        </p:sp>
+        <p:sp>
+          <p:nvSpPr>
+            <p:cNvPr id="54" name="Oval 53"/>
+            <p:cNvSpPr/>
+            <p:nvPr/>
+          </p:nvSpPr>
+          <p:spPr>
+            <a:xfrm>
+              <a:off x="5936134" y="2387047"/>
+              <a:ext cx="123151" cy="123151"/>
+            </a:xfrm>
+            <a:prstGeom prst="ellipse">
+              <a:avLst/>
+            </a:prstGeom>
+          </p:spPr>
+          <p:style>
+            <a:lnRef idx="1">
+              <a:schemeClr val="accent2"/>
+            </a:lnRef>
+            <a:fillRef idx="3">
+              <a:schemeClr val="accent2"/>
+            </a:fillRef>
+            <a:effectRef idx="2">
+              <a:schemeClr val="accent2"/>
+            </a:effectRef>
+            <a:fontRef idx="minor">
+              <a:schemeClr val="lt1"/>
+            </a:fontRef>
+          </p:style>
+          <p:txBody>
+            <a:bodyPr rtlCol="0" anchor="ctr"/>
+            <a:lstStyle/>
+            <a:p>
+              <a:pPr algn="ctr"/>
+              <a:endParaRPr lang="en-US"/>
+            </a:p>
+          </p:txBody>
+        </p:sp>
+        <p:cxnSp>
+          <p:nvCxnSpPr>
+            <p:cNvPr id="23" name="Straight Arrow Connector 22"/>
+            <p:cNvCxnSpPr/>
+            <p:nvPr/>
+          </p:nvCxnSpPr>
+          <p:spPr>
+            <a:xfrm flipH="1">
+              <a:off x="5995804" y="2630655"/>
+              <a:ext cx="315568" cy="464467"/>
+            </a:xfrm>
+            <a:prstGeom prst="straightConnector1">
+              <a:avLst/>
+            </a:prstGeom>
+            <a:ln w="19050" cmpd="sng">
+              <a:solidFill>
+                <a:schemeClr val="bg1">
+                  <a:lumMod val="95000"/>
+                </a:schemeClr>
+              </a:solidFill>
+              <a:prstDash val="dash"/>
+              <a:headEnd type="none"/>
+              <a:tailEnd type="none"/>
+            </a:ln>
+            <a:effectLst/>
+          </p:spPr>
+          <p:style>
+            <a:lnRef idx="2">
+              <a:schemeClr val="dk1"/>
+            </a:lnRef>
+            <a:fillRef idx="0">
+              <a:schemeClr val="dk1"/>
+            </a:fillRef>
+            <a:effectRef idx="1">
+              <a:schemeClr val="dk1"/>
+            </a:effectRef>
+            <a:fontRef idx="minor">
+              <a:schemeClr val="tx1"/>
+            </a:fontRef>
+          </p:style>
+        </p:cxnSp>
+        <p:sp>
+          <p:nvSpPr>
+            <p:cNvPr id="24" name="Rectangle 23"/>
+            <p:cNvSpPr/>
+            <p:nvPr/>
+          </p:nvSpPr>
+          <p:spPr>
+            <a:xfrm rot="18011192">
+              <a:off x="6177914" y="2594579"/>
+              <a:ext cx="112756" cy="112756"/>
+            </a:xfrm>
+            <a:prstGeom prst="rect">
+              <a:avLst/>
+            </a:prstGeom>
+            <a:ln w="12700" cmpd="sng"/>
+          </p:spPr>
+          <p:style>
+            <a:lnRef idx="2">
+              <a:schemeClr val="dk1"/>
+            </a:lnRef>
+            <a:fillRef idx="1">
+              <a:schemeClr val="lt1"/>
+            </a:fillRef>
+            <a:effectRef idx="0">
+              <a:schemeClr val="dk1"/>
+            </a:effectRef>
+            <a:fontRef idx="minor">
+              <a:schemeClr val="dk1"/>
+            </a:fontRef>
+          </p:style>
+          <p:txBody>
+            <a:bodyPr rtlCol="0" anchor="ctr"/>
+            <a:lstStyle/>
+            <a:p>
+              <a:pPr algn="ctr"/>
+              <a:endParaRPr lang="en-US"/>
+            </a:p>
+          </p:txBody>
+        </p:sp>
+        <p:cxnSp>
+          <p:nvCxnSpPr>
+            <p:cNvPr id="27" name="Straight Arrow Connector 26"/>
+            <p:cNvCxnSpPr/>
+            <p:nvPr/>
+          </p:nvCxnSpPr>
+          <p:spPr>
+            <a:xfrm>
+              <a:off x="5994293" y="2443983"/>
+              <a:ext cx="1511" cy="648161"/>
+            </a:xfrm>
+            <a:prstGeom prst="straightConnector1">
+              <a:avLst/>
+            </a:prstGeom>
+            <a:ln w="19050" cmpd="sng">
+              <a:solidFill>
+                <a:schemeClr val="bg1">
+                  <a:lumMod val="95000"/>
+                </a:schemeClr>
+              </a:solidFill>
+              <a:prstDash val="dash"/>
+              <a:tailEnd type="arrow"/>
+            </a:ln>
+            <a:effectLst/>
+          </p:spPr>
+          <p:style>
+            <a:lnRef idx="2">
+              <a:schemeClr val="dk1"/>
+            </a:lnRef>
+            <a:fillRef idx="0">
+              <a:schemeClr val="dk1"/>
+            </a:fillRef>
+            <a:effectRef idx="1">
+              <a:schemeClr val="dk1"/>
+            </a:effectRef>
+            <a:fontRef idx="minor">
+              <a:schemeClr val="tx1"/>
+            </a:fontRef>
+          </p:style>
+        </p:cxnSp>
+        <p:cxnSp>
+          <p:nvCxnSpPr>
+            <p:cNvPr id="57" name="Straight Arrow Connector 56"/>
+            <p:cNvCxnSpPr/>
+            <p:nvPr/>
+          </p:nvCxnSpPr>
+          <p:spPr>
+            <a:xfrm>
+              <a:off x="5987909" y="2453806"/>
+              <a:ext cx="318382" cy="171768"/>
+            </a:xfrm>
+            <a:prstGeom prst="straightConnector1">
+              <a:avLst/>
+            </a:prstGeom>
+            <a:ln w="28575" cmpd="sng">
+              <a:headEnd type="none"/>
+              <a:tailEnd type="arrow"/>
+            </a:ln>
+            <a:effectLst/>
+          </p:spPr>
+          <p:style>
+            <a:lnRef idx="2">
+              <a:schemeClr val="dk1"/>
+            </a:lnRef>
+            <a:fillRef idx="0">
+              <a:schemeClr val="dk1"/>
+            </a:fillRef>
+            <a:effectRef idx="1">
+              <a:schemeClr val="dk1"/>
+            </a:effectRef>
+            <a:fontRef idx="minor">
+              <a:schemeClr val="tx1"/>
+            </a:fontRef>
+          </p:style>
+        </p:cxnSp>
+      </p:grpSp>
     </p:spTree>
     <p:extLst>
       <p:ext uri="{BB962C8B-B14F-4D97-AF65-F5344CB8AC3E}">

</xml_diff>

<commit_message>
done with major runthrough
</commit_message>
<xml_diff>
--- a/figures/figures.pptx
+++ b/figures/figures.pptx
@@ -26,6 +26,7 @@
     <p:sldId id="272" r:id="rId20"/>
     <p:sldId id="273" r:id="rId21"/>
     <p:sldId id="274" r:id="rId22"/>
+    <p:sldId id="277" r:id="rId23"/>
   </p:sldIdLst>
   <p:sldSz cx="9144000" cy="6858000" type="screen4x3"/>
   <p:notesSz cx="6858000" cy="9144000"/>
@@ -7748,7 +7749,7 @@
         <p:spPr>
           <a:xfrm flipH="1">
             <a:off x="6013622" y="2385634"/>
-            <a:ext cx="442769" cy="209285"/>
+            <a:ext cx="442770" cy="234961"/>
           </a:xfrm>
           <a:prstGeom prst="straightConnector1">
             <a:avLst/>
@@ -7859,6 +7860,86 @@
           <a:xfrm>
             <a:off x="2412026" y="2260335"/>
             <a:ext cx="65289" cy="65289"/>
+          </a:xfrm>
+          <a:prstGeom prst="ellipse">
+            <a:avLst/>
+          </a:prstGeom>
+        </p:spPr>
+        <p:style>
+          <a:lnRef idx="2">
+            <a:schemeClr val="dk1">
+              <a:shade val="50000"/>
+            </a:schemeClr>
+          </a:lnRef>
+          <a:fillRef idx="1">
+            <a:schemeClr val="dk1"/>
+          </a:fillRef>
+          <a:effectRef idx="0">
+            <a:schemeClr val="dk1"/>
+          </a:effectRef>
+          <a:fontRef idx="minor">
+            <a:schemeClr val="lt1"/>
+          </a:fontRef>
+        </p:style>
+        <p:txBody>
+          <a:bodyPr rtlCol="0" anchor="ctr"/>
+          <a:lstStyle/>
+          <a:p>
+            <a:pPr algn="ctr"/>
+            <a:endParaRPr lang="en-US"/>
+          </a:p>
+        </p:txBody>
+      </p:sp>
+      <p:sp>
+        <p:nvSpPr>
+          <p:cNvPr id="41" name="Oval 40"/>
+          <p:cNvSpPr/>
+          <p:nvPr/>
+        </p:nvSpPr>
+        <p:spPr>
+          <a:xfrm>
+            <a:off x="2642070" y="2967335"/>
+            <a:ext cx="45719" cy="45719"/>
+          </a:xfrm>
+          <a:prstGeom prst="ellipse">
+            <a:avLst/>
+          </a:prstGeom>
+        </p:spPr>
+        <p:style>
+          <a:lnRef idx="2">
+            <a:schemeClr val="dk1">
+              <a:shade val="50000"/>
+            </a:schemeClr>
+          </a:lnRef>
+          <a:fillRef idx="1">
+            <a:schemeClr val="dk1"/>
+          </a:fillRef>
+          <a:effectRef idx="0">
+            <a:schemeClr val="dk1"/>
+          </a:effectRef>
+          <a:fontRef idx="minor">
+            <a:schemeClr val="lt1"/>
+          </a:fontRef>
+        </p:style>
+        <p:txBody>
+          <a:bodyPr rtlCol="0" anchor="ctr"/>
+          <a:lstStyle/>
+          <a:p>
+            <a:pPr algn="ctr"/>
+            <a:endParaRPr lang="en-US"/>
+          </a:p>
+        </p:txBody>
+      </p:sp>
+      <p:sp>
+        <p:nvSpPr>
+          <p:cNvPr id="42" name="Oval 41"/>
+          <p:cNvSpPr/>
+          <p:nvPr/>
+        </p:nvSpPr>
+        <p:spPr>
+          <a:xfrm>
+            <a:off x="1801736" y="2620595"/>
+            <a:ext cx="45719" cy="45719"/>
           </a:xfrm>
           <a:prstGeom prst="ellipse">
             <a:avLst/>
@@ -8032,6 +8113,11 @@
           <a:solidFill>
             <a:srgbClr val="8EB4E3"/>
           </a:solidFill>
+          <a:ln>
+            <a:solidFill>
+              <a:schemeClr val="tx1"/>
+            </a:solidFill>
+          </a:ln>
         </p:spPr>
         <p:style>
           <a:lnRef idx="2">
@@ -8086,6 +8172,11 @@
               <a:lumOff val="60000"/>
             </a:schemeClr>
           </a:solidFill>
+          <a:ln>
+            <a:solidFill>
+              <a:srgbClr val="000000"/>
+            </a:solidFill>
+          </a:ln>
         </p:spPr>
         <p:style>
           <a:lnRef idx="2">
@@ -8829,7 +8920,7 @@
         <p:spPr>
           <a:xfrm flipH="1">
             <a:off x="6013622" y="2385634"/>
-            <a:ext cx="442769" cy="209285"/>
+            <a:ext cx="442770" cy="234961"/>
           </a:xfrm>
           <a:prstGeom prst="straightConnector1">
             <a:avLst/>
@@ -9090,52 +9181,6 @@
           </a:p>
         </p:txBody>
       </p:sp>
-      <p:sp>
-        <p:nvSpPr>
-          <p:cNvPr id="43" name="Block Arc 42"/>
-          <p:cNvSpPr/>
-          <p:nvPr/>
-        </p:nvSpPr>
-        <p:spPr>
-          <a:xfrm>
-            <a:off x="6338061" y="4367595"/>
-            <a:ext cx="1472184" cy="1472184"/>
-          </a:xfrm>
-          <a:prstGeom prst="blockArc">
-            <a:avLst>
-              <a:gd name="adj1" fmla="val 10800000"/>
-              <a:gd name="adj2" fmla="val 19857277"/>
-              <a:gd name="adj3" fmla="val 42584"/>
-            </a:avLst>
-          </a:prstGeom>
-        </p:spPr>
-        <p:style>
-          <a:lnRef idx="1">
-            <a:schemeClr val="accent1"/>
-          </a:lnRef>
-          <a:fillRef idx="3">
-            <a:schemeClr val="accent1"/>
-          </a:fillRef>
-          <a:effectRef idx="2">
-            <a:schemeClr val="accent1"/>
-          </a:effectRef>
-          <a:fontRef idx="minor">
-            <a:schemeClr val="lt1"/>
-          </a:fontRef>
-        </p:style>
-        <p:txBody>
-          <a:bodyPr rtlCol="0" anchor="ctr"/>
-          <a:lstStyle/>
-          <a:p>
-            <a:pPr algn="ctr"/>
-            <a:endParaRPr lang="en-US">
-              <a:solidFill>
-                <a:schemeClr val="tx1"/>
-              </a:solidFill>
-            </a:endParaRPr>
-          </a:p>
-        </p:txBody>
-      </p:sp>
       <p:cxnSp>
         <p:nvCxnSpPr>
           <p:cNvPr id="44" name="Straight Arrow Connector 43"/>
@@ -9424,6 +9469,86 @@
               <a:rPr lang="en-US" baseline="-25000" dirty="0"/>
               <a:t>2</a:t>
             </a:r>
+          </a:p>
+        </p:txBody>
+      </p:sp>
+      <p:sp>
+        <p:nvSpPr>
+          <p:cNvPr id="55" name="Oval 54"/>
+          <p:cNvSpPr/>
+          <p:nvPr/>
+        </p:nvSpPr>
+        <p:spPr>
+          <a:xfrm>
+            <a:off x="2642070" y="2967335"/>
+            <a:ext cx="45719" cy="45719"/>
+          </a:xfrm>
+          <a:prstGeom prst="ellipse">
+            <a:avLst/>
+          </a:prstGeom>
+        </p:spPr>
+        <p:style>
+          <a:lnRef idx="2">
+            <a:schemeClr val="dk1">
+              <a:shade val="50000"/>
+            </a:schemeClr>
+          </a:lnRef>
+          <a:fillRef idx="1">
+            <a:schemeClr val="dk1"/>
+          </a:fillRef>
+          <a:effectRef idx="0">
+            <a:schemeClr val="dk1"/>
+          </a:effectRef>
+          <a:fontRef idx="minor">
+            <a:schemeClr val="lt1"/>
+          </a:fontRef>
+        </p:style>
+        <p:txBody>
+          <a:bodyPr rtlCol="0" anchor="ctr"/>
+          <a:lstStyle/>
+          <a:p>
+            <a:pPr algn="ctr"/>
+            <a:endParaRPr lang="en-US"/>
+          </a:p>
+        </p:txBody>
+      </p:sp>
+      <p:sp>
+        <p:nvSpPr>
+          <p:cNvPr id="56" name="Oval 55"/>
+          <p:cNvSpPr/>
+          <p:nvPr/>
+        </p:nvSpPr>
+        <p:spPr>
+          <a:xfrm>
+            <a:off x="1801736" y="2620595"/>
+            <a:ext cx="45719" cy="45719"/>
+          </a:xfrm>
+          <a:prstGeom prst="ellipse">
+            <a:avLst/>
+          </a:prstGeom>
+        </p:spPr>
+        <p:style>
+          <a:lnRef idx="2">
+            <a:schemeClr val="dk1">
+              <a:shade val="50000"/>
+            </a:schemeClr>
+          </a:lnRef>
+          <a:fillRef idx="1">
+            <a:schemeClr val="dk1"/>
+          </a:fillRef>
+          <a:effectRef idx="0">
+            <a:schemeClr val="dk1"/>
+          </a:effectRef>
+          <a:fontRef idx="minor">
+            <a:schemeClr val="lt1"/>
+          </a:fontRef>
+        </p:style>
+        <p:txBody>
+          <a:bodyPr rtlCol="0" anchor="ctr"/>
+          <a:lstStyle/>
+          <a:p>
+            <a:pPr algn="ctr"/>
+            <a:endParaRPr lang="en-US"/>
           </a:p>
         </p:txBody>
       </p:sp>
@@ -10610,6 +10735,190 @@
       </p:grpSpPr>
       <p:sp>
         <p:nvSpPr>
+          <p:cNvPr id="93" name="Oval 92"/>
+          <p:cNvSpPr/>
+          <p:nvPr/>
+        </p:nvSpPr>
+        <p:spPr>
+          <a:xfrm>
+            <a:off x="1736810" y="3613185"/>
+            <a:ext cx="1475946" cy="1475946"/>
+          </a:xfrm>
+          <a:prstGeom prst="ellipse">
+            <a:avLst/>
+          </a:prstGeom>
+          <a:ln>
+            <a:solidFill>
+              <a:schemeClr val="bg1">
+                <a:lumMod val="65000"/>
+              </a:schemeClr>
+            </a:solidFill>
+            <a:prstDash val="dash"/>
+          </a:ln>
+        </p:spPr>
+        <p:style>
+          <a:lnRef idx="2">
+            <a:schemeClr val="dk1"/>
+          </a:lnRef>
+          <a:fillRef idx="1">
+            <a:schemeClr val="lt1"/>
+          </a:fillRef>
+          <a:effectRef idx="0">
+            <a:schemeClr val="dk1"/>
+          </a:effectRef>
+          <a:fontRef idx="minor">
+            <a:schemeClr val="dk1"/>
+          </a:fontRef>
+        </p:style>
+        <p:txBody>
+          <a:bodyPr rtlCol="0" anchor="ctr"/>
+          <a:lstStyle/>
+          <a:p>
+            <a:pPr algn="ctr"/>
+            <a:endParaRPr lang="en-US"/>
+          </a:p>
+        </p:txBody>
+      </p:sp>
+      <p:sp>
+        <p:nvSpPr>
+          <p:cNvPr id="92" name="Oval 91"/>
+          <p:cNvSpPr/>
+          <p:nvPr/>
+        </p:nvSpPr>
+        <p:spPr>
+          <a:xfrm>
+            <a:off x="3728039" y="3613185"/>
+            <a:ext cx="1475946" cy="1475946"/>
+          </a:xfrm>
+          <a:prstGeom prst="ellipse">
+            <a:avLst/>
+          </a:prstGeom>
+          <a:ln>
+            <a:solidFill>
+              <a:schemeClr val="bg1">
+                <a:lumMod val="65000"/>
+              </a:schemeClr>
+            </a:solidFill>
+            <a:prstDash val="dash"/>
+          </a:ln>
+        </p:spPr>
+        <p:style>
+          <a:lnRef idx="2">
+            <a:schemeClr val="dk1"/>
+          </a:lnRef>
+          <a:fillRef idx="1">
+            <a:schemeClr val="lt1"/>
+          </a:fillRef>
+          <a:effectRef idx="0">
+            <a:schemeClr val="dk1"/>
+          </a:effectRef>
+          <a:fontRef idx="minor">
+            <a:schemeClr val="dk1"/>
+          </a:fontRef>
+        </p:style>
+        <p:txBody>
+          <a:bodyPr rtlCol="0" anchor="ctr"/>
+          <a:lstStyle/>
+          <a:p>
+            <a:pPr algn="ctr"/>
+            <a:endParaRPr lang="en-US"/>
+          </a:p>
+        </p:txBody>
+      </p:sp>
+      <p:sp>
+        <p:nvSpPr>
+          <p:cNvPr id="90" name="Oval 89"/>
+          <p:cNvSpPr/>
+          <p:nvPr/>
+        </p:nvSpPr>
+        <p:spPr>
+          <a:xfrm>
+            <a:off x="3723981" y="1534489"/>
+            <a:ext cx="1475946" cy="1475946"/>
+          </a:xfrm>
+          <a:prstGeom prst="ellipse">
+            <a:avLst/>
+          </a:prstGeom>
+          <a:ln>
+            <a:solidFill>
+              <a:schemeClr val="bg1">
+                <a:lumMod val="65000"/>
+              </a:schemeClr>
+            </a:solidFill>
+            <a:prstDash val="dash"/>
+          </a:ln>
+        </p:spPr>
+        <p:style>
+          <a:lnRef idx="2">
+            <a:schemeClr val="dk1"/>
+          </a:lnRef>
+          <a:fillRef idx="1">
+            <a:schemeClr val="lt1"/>
+          </a:fillRef>
+          <a:effectRef idx="0">
+            <a:schemeClr val="dk1"/>
+          </a:effectRef>
+          <a:fontRef idx="minor">
+            <a:schemeClr val="dk1"/>
+          </a:fontRef>
+        </p:style>
+        <p:txBody>
+          <a:bodyPr rtlCol="0" anchor="ctr"/>
+          <a:lstStyle/>
+          <a:p>
+            <a:pPr algn="ctr"/>
+            <a:endParaRPr lang="en-US"/>
+          </a:p>
+        </p:txBody>
+      </p:sp>
+      <p:sp>
+        <p:nvSpPr>
+          <p:cNvPr id="89" name="Oval 88"/>
+          <p:cNvSpPr/>
+          <p:nvPr/>
+        </p:nvSpPr>
+        <p:spPr>
+          <a:xfrm>
+            <a:off x="1736810" y="1532430"/>
+            <a:ext cx="1475946" cy="1475946"/>
+          </a:xfrm>
+          <a:prstGeom prst="ellipse">
+            <a:avLst/>
+          </a:prstGeom>
+          <a:ln>
+            <a:solidFill>
+              <a:schemeClr val="bg1">
+                <a:lumMod val="65000"/>
+              </a:schemeClr>
+            </a:solidFill>
+            <a:prstDash val="dash"/>
+          </a:ln>
+        </p:spPr>
+        <p:style>
+          <a:lnRef idx="2">
+            <a:schemeClr val="dk1"/>
+          </a:lnRef>
+          <a:fillRef idx="1">
+            <a:schemeClr val="lt1"/>
+          </a:fillRef>
+          <a:effectRef idx="0">
+            <a:schemeClr val="dk1"/>
+          </a:effectRef>
+          <a:fontRef idx="minor">
+            <a:schemeClr val="dk1"/>
+          </a:fontRef>
+        </p:style>
+        <p:txBody>
+          <a:bodyPr rtlCol="0" anchor="ctr"/>
+          <a:lstStyle/>
+          <a:p>
+            <a:pPr algn="ctr"/>
+            <a:endParaRPr lang="en-US"/>
+          </a:p>
+        </p:txBody>
+      </p:sp>
+      <p:sp>
+        <p:nvSpPr>
           <p:cNvPr id="88" name="TextBox 87"/>
           <p:cNvSpPr txBox="1"/>
           <p:nvPr/>
@@ -10650,25 +10959,35 @@
         </p:nvSpPr>
         <p:spPr>
           <a:xfrm>
-            <a:off x="3727743" y="1542363"/>
+            <a:off x="3740769" y="1548876"/>
             <a:ext cx="1472184" cy="1472184"/>
           </a:xfrm>
           <a:prstGeom prst="blockArc">
             <a:avLst>
-              <a:gd name="adj1" fmla="val 8808739"/>
-              <a:gd name="adj2" fmla="val 14204526"/>
-              <a:gd name="adj3" fmla="val 47367"/>
+              <a:gd name="adj1" fmla="val 8807809"/>
+              <a:gd name="adj2" fmla="val 14244482"/>
+              <a:gd name="adj3" fmla="val 48962"/>
             </a:avLst>
           </a:prstGeom>
-        </p:spPr>
-        <p:style>
-          <a:lnRef idx="1">
+          <a:solidFill>
+            <a:srgbClr val="8EB4E3"/>
+          </a:solidFill>
+          <a:ln>
+            <a:solidFill>
+              <a:srgbClr val="000000"/>
+            </a:solidFill>
+          </a:ln>
+        </p:spPr>
+        <p:style>
+          <a:lnRef idx="2">
+            <a:schemeClr val="accent1">
+              <a:shade val="50000"/>
+            </a:schemeClr>
+          </a:lnRef>
+          <a:fillRef idx="1">
             <a:schemeClr val="accent1"/>
-          </a:lnRef>
-          <a:fillRef idx="3">
-            <a:schemeClr val="accent1"/>
-          </a:fillRef>
-          <a:effectRef idx="2">
+          </a:fillRef>
+          <a:effectRef idx="0">
             <a:schemeClr val="accent1"/>
           </a:effectRef>
           <a:fontRef idx="minor">
@@ -10706,15 +11025,25 @@
               <a:gd name="adj3" fmla="val 46345"/>
             </a:avLst>
           </a:prstGeom>
-        </p:spPr>
-        <p:style>
-          <a:lnRef idx="1">
+          <a:solidFill>
+            <a:srgbClr val="8EB4E3"/>
+          </a:solidFill>
+          <a:ln>
+            <a:solidFill>
+              <a:srgbClr val="000000"/>
+            </a:solidFill>
+          </a:ln>
+        </p:spPr>
+        <p:style>
+          <a:lnRef idx="2">
+            <a:schemeClr val="accent1">
+              <a:shade val="50000"/>
+            </a:schemeClr>
+          </a:lnRef>
+          <a:fillRef idx="1">
             <a:schemeClr val="accent1"/>
-          </a:lnRef>
-          <a:fillRef idx="3">
-            <a:schemeClr val="accent1"/>
-          </a:fillRef>
-          <a:effectRef idx="2">
+          </a:fillRef>
+          <a:effectRef idx="0">
             <a:schemeClr val="accent1"/>
           </a:effectRef>
           <a:fontRef idx="minor">
@@ -10736,45 +11065,6 @@
       </p:sp>
       <p:sp>
         <p:nvSpPr>
-          <p:cNvPr id="2" name="Oval 1"/>
-          <p:cNvSpPr/>
-          <p:nvPr/>
-        </p:nvSpPr>
-        <p:spPr>
-          <a:xfrm>
-            <a:off x="1736810" y="1530863"/>
-            <a:ext cx="1475946" cy="1475946"/>
-          </a:xfrm>
-          <a:prstGeom prst="ellipse">
-            <a:avLst/>
-          </a:prstGeom>
-          <a:noFill/>
-        </p:spPr>
-        <p:style>
-          <a:lnRef idx="1">
-            <a:schemeClr val="accent1"/>
-          </a:lnRef>
-          <a:fillRef idx="3">
-            <a:schemeClr val="accent1"/>
-          </a:fillRef>
-          <a:effectRef idx="2">
-            <a:schemeClr val="accent1"/>
-          </a:effectRef>
-          <a:fontRef idx="minor">
-            <a:schemeClr val="lt1"/>
-          </a:fontRef>
-        </p:style>
-        <p:txBody>
-          <a:bodyPr rtlCol="0" anchor="ctr"/>
-          <a:lstStyle/>
-          <a:p>
-            <a:pPr algn="ctr"/>
-            <a:endParaRPr lang="en-US"/>
-          </a:p>
-        </p:txBody>
-      </p:sp>
-      <p:sp>
-        <p:nvSpPr>
           <p:cNvPr id="12" name="TextBox 11"/>
           <p:cNvSpPr txBox="1"/>
           <p:nvPr/>
@@ -10838,45 +11128,6 @@
               <a:t>end</a:t>
             </a:r>
             <a:endParaRPr lang="en-US" sz="2400" baseline="-25000" dirty="0"/>
-          </a:p>
-        </p:txBody>
-      </p:sp>
-      <p:sp>
-        <p:nvSpPr>
-          <p:cNvPr id="17" name="Oval 16"/>
-          <p:cNvSpPr/>
-          <p:nvPr/>
-        </p:nvSpPr>
-        <p:spPr>
-          <a:xfrm>
-            <a:off x="3722129" y="1530863"/>
-            <a:ext cx="1475946" cy="1475946"/>
-          </a:xfrm>
-          <a:prstGeom prst="ellipse">
-            <a:avLst/>
-          </a:prstGeom>
-          <a:noFill/>
-        </p:spPr>
-        <p:style>
-          <a:lnRef idx="1">
-            <a:schemeClr val="accent1"/>
-          </a:lnRef>
-          <a:fillRef idx="3">
-            <a:schemeClr val="accent1"/>
-          </a:fillRef>
-          <a:effectRef idx="2">
-            <a:schemeClr val="accent1"/>
-          </a:effectRef>
-          <a:fontRef idx="minor">
-            <a:schemeClr val="lt1"/>
-          </a:fontRef>
-        </p:style>
-        <p:txBody>
-          <a:bodyPr rtlCol="0" anchor="ctr"/>
-          <a:lstStyle/>
-          <a:p>
-            <a:pPr algn="ctr"/>
-            <a:endParaRPr lang="en-US"/>
           </a:p>
         </p:txBody>
       </p:sp>
@@ -12172,45 +12423,6 @@
           </a:fontRef>
         </p:style>
       </p:cxnSp>
-      <p:sp>
-        <p:nvSpPr>
-          <p:cNvPr id="55" name="Oval 54"/>
-          <p:cNvSpPr/>
-          <p:nvPr/>
-        </p:nvSpPr>
-        <p:spPr>
-          <a:xfrm rot="19527167">
-            <a:off x="1738239" y="3617041"/>
-            <a:ext cx="1475946" cy="1475946"/>
-          </a:xfrm>
-          <a:prstGeom prst="ellipse">
-            <a:avLst/>
-          </a:prstGeom>
-          <a:noFill/>
-        </p:spPr>
-        <p:style>
-          <a:lnRef idx="1">
-            <a:schemeClr val="accent1"/>
-          </a:lnRef>
-          <a:fillRef idx="3">
-            <a:schemeClr val="accent1"/>
-          </a:fillRef>
-          <a:effectRef idx="2">
-            <a:schemeClr val="accent1"/>
-          </a:effectRef>
-          <a:fontRef idx="minor">
-            <a:schemeClr val="lt1"/>
-          </a:fontRef>
-        </p:style>
-        <p:txBody>
-          <a:bodyPr rtlCol="0" anchor="ctr"/>
-          <a:lstStyle/>
-          <a:p>
-            <a:pPr algn="ctr"/>
-            <a:endParaRPr lang="en-US"/>
-          </a:p>
-        </p:txBody>
-      </p:sp>
       <p:cxnSp>
         <p:nvCxnSpPr>
           <p:cNvPr id="68" name="Straight Arrow Connector 67"/>
@@ -12319,343 +12531,294 @@
           </a:p>
         </p:txBody>
       </p:sp>
-      <p:grpSp>
-        <p:nvGrpSpPr>
-          <p:cNvPr id="9" name="Group 8"/>
-          <p:cNvGrpSpPr/>
-          <p:nvPr/>
-        </p:nvGrpSpPr>
-        <p:grpSpPr>
+      <p:sp>
+        <p:nvSpPr>
+          <p:cNvPr id="50" name="Block Arc 49"/>
+          <p:cNvSpPr/>
+          <p:nvPr/>
+        </p:nvSpPr>
+        <p:spPr>
+          <a:xfrm rot="9743336">
+            <a:off x="3726521" y="3651954"/>
+            <a:ext cx="1475528" cy="1463026"/>
+          </a:xfrm>
+          <a:prstGeom prst="blockArc">
+            <a:avLst>
+              <a:gd name="adj1" fmla="val 8738022"/>
+              <a:gd name="adj2" fmla="val 13977700"/>
+              <a:gd name="adj3" fmla="val 46345"/>
+            </a:avLst>
+          </a:prstGeom>
+          <a:solidFill>
+            <a:srgbClr val="8EB4E3"/>
+          </a:solidFill>
+          <a:ln>
+            <a:solidFill>
+              <a:srgbClr val="000000"/>
+            </a:solidFill>
+          </a:ln>
+        </p:spPr>
+        <p:style>
+          <a:lnRef idx="2">
+            <a:schemeClr val="accent1">
+              <a:shade val="50000"/>
+            </a:schemeClr>
+          </a:lnRef>
+          <a:fillRef idx="1">
+            <a:schemeClr val="accent1"/>
+          </a:fillRef>
+          <a:effectRef idx="0">
+            <a:schemeClr val="accent1"/>
+          </a:effectRef>
+          <a:fontRef idx="minor">
+            <a:schemeClr val="lt1"/>
+          </a:fontRef>
+        </p:style>
+        <p:txBody>
+          <a:bodyPr rtlCol="0" anchor="ctr"/>
+          <a:lstStyle/>
+          <a:p>
+            <a:pPr algn="ctr"/>
+            <a:endParaRPr lang="en-US">
+              <a:solidFill>
+                <a:schemeClr val="tx1"/>
+              </a:solidFill>
+            </a:endParaRPr>
+          </a:p>
+        </p:txBody>
+      </p:sp>
+      <p:sp>
+        <p:nvSpPr>
+          <p:cNvPr id="46" name="Block Arc 45"/>
+          <p:cNvSpPr/>
+          <p:nvPr/>
+        </p:nvSpPr>
+        <p:spPr>
           <a:xfrm rot="19339793">
-            <a:off x="3701291" y="3617041"/>
-            <a:ext cx="1500065" cy="1483684"/>
-            <a:chOff x="3701291" y="3617041"/>
-            <a:chExt cx="1500065" cy="1483684"/>
-          </a:xfrm>
-        </p:grpSpPr>
-        <p:sp>
-          <p:nvSpPr>
-            <p:cNvPr id="50" name="Block Arc 49"/>
-            <p:cNvSpPr/>
-            <p:nvPr/>
-          </p:nvSpPr>
-          <p:spPr>
-            <a:xfrm rot="12003543">
-              <a:off x="3701291" y="3632498"/>
-              <a:ext cx="1475528" cy="1463026"/>
-            </a:xfrm>
-            <a:prstGeom prst="blockArc">
-              <a:avLst>
-                <a:gd name="adj1" fmla="val 8989175"/>
-                <a:gd name="adj2" fmla="val 13977700"/>
-                <a:gd name="adj3" fmla="val 46345"/>
-              </a:avLst>
-            </a:prstGeom>
-          </p:spPr>
-          <p:style>
-            <a:lnRef idx="1">
-              <a:schemeClr val="accent1"/>
-            </a:lnRef>
-            <a:fillRef idx="3">
-              <a:schemeClr val="accent1"/>
-            </a:fillRef>
-            <a:effectRef idx="2">
-              <a:schemeClr val="accent1"/>
-            </a:effectRef>
-            <a:fontRef idx="minor">
-              <a:schemeClr val="lt1"/>
-            </a:fontRef>
-          </p:style>
-          <p:txBody>
-            <a:bodyPr rtlCol="0" anchor="ctr"/>
-            <a:lstStyle/>
-            <a:p>
-              <a:pPr algn="ctr"/>
-              <a:endParaRPr lang="en-US">
-                <a:solidFill>
-                  <a:schemeClr val="tx1"/>
-                </a:solidFill>
-              </a:endParaRPr>
-            </a:p>
-          </p:txBody>
-        </p:sp>
-        <p:grpSp>
-          <p:nvGrpSpPr>
-            <p:cNvPr id="8" name="Group 7"/>
-            <p:cNvGrpSpPr/>
-            <p:nvPr/>
-          </p:nvGrpSpPr>
-          <p:grpSpPr>
-            <a:xfrm>
-              <a:off x="3723558" y="3617041"/>
-              <a:ext cx="1477798" cy="1483684"/>
-              <a:chOff x="3723558" y="3617041"/>
-              <a:chExt cx="1477798" cy="1483684"/>
-            </a:xfrm>
-          </p:grpSpPr>
-          <p:sp>
-            <p:nvSpPr>
-              <p:cNvPr id="46" name="Block Arc 45"/>
-              <p:cNvSpPr/>
-              <p:nvPr/>
-            </p:nvSpPr>
-            <p:spPr>
-              <a:xfrm>
-                <a:off x="3729172" y="3628541"/>
-                <a:ext cx="1472184" cy="1472184"/>
-              </a:xfrm>
-              <a:prstGeom prst="blockArc">
-                <a:avLst>
-                  <a:gd name="adj1" fmla="val 8808739"/>
-                  <a:gd name="adj2" fmla="val 14204526"/>
-                  <a:gd name="adj3" fmla="val 47367"/>
-                </a:avLst>
-              </a:prstGeom>
-            </p:spPr>
-            <p:style>
-              <a:lnRef idx="1">
-                <a:schemeClr val="accent1"/>
-              </a:lnRef>
-              <a:fillRef idx="3">
-                <a:schemeClr val="accent1"/>
-              </a:fillRef>
-              <a:effectRef idx="2">
-                <a:schemeClr val="accent1"/>
-              </a:effectRef>
-              <a:fontRef idx="minor">
-                <a:schemeClr val="lt1"/>
-              </a:fontRef>
-            </p:style>
-            <p:txBody>
-              <a:bodyPr rtlCol="0" anchor="ctr"/>
-              <a:lstStyle/>
-              <a:p>
-                <a:pPr algn="ctr"/>
-                <a:endParaRPr lang="en-US">
-                  <a:solidFill>
-                    <a:schemeClr val="tx1"/>
-                  </a:solidFill>
-                </a:endParaRPr>
-              </a:p>
-            </p:txBody>
-          </p:sp>
-          <p:sp>
-            <p:nvSpPr>
-              <p:cNvPr id="58" name="Oval 57"/>
-              <p:cNvSpPr/>
-              <p:nvPr/>
-            </p:nvSpPr>
-            <p:spPr>
-              <a:xfrm>
-                <a:off x="3723558" y="3617041"/>
-                <a:ext cx="1475946" cy="1475946"/>
-              </a:xfrm>
-              <a:prstGeom prst="ellipse">
-                <a:avLst/>
-              </a:prstGeom>
-              <a:noFill/>
-            </p:spPr>
-            <p:style>
-              <a:lnRef idx="1">
-                <a:schemeClr val="accent1"/>
-              </a:lnRef>
-              <a:fillRef idx="3">
-                <a:schemeClr val="accent1"/>
-              </a:fillRef>
-              <a:effectRef idx="2">
-                <a:schemeClr val="accent1"/>
-              </a:effectRef>
-              <a:fontRef idx="minor">
-                <a:schemeClr val="lt1"/>
-              </a:fontRef>
-            </p:style>
-            <p:txBody>
-              <a:bodyPr rtlCol="0" anchor="ctr"/>
-              <a:lstStyle/>
-              <a:p>
-                <a:pPr algn="ctr"/>
-                <a:endParaRPr lang="en-US"/>
-              </a:p>
-            </p:txBody>
-          </p:sp>
-          <p:cxnSp>
-            <p:nvCxnSpPr>
-              <p:cNvPr id="76" name="Straight Arrow Connector 75"/>
-              <p:cNvCxnSpPr/>
-              <p:nvPr/>
-            </p:nvCxnSpPr>
-            <p:spPr>
-              <a:xfrm flipH="1" flipV="1">
-                <a:off x="4071165" y="3739796"/>
-                <a:ext cx="396276" cy="655031"/>
-              </a:xfrm>
-              <a:prstGeom prst="straightConnector1">
-                <a:avLst/>
-              </a:prstGeom>
-              <a:ln w="28575" cmpd="sng">
-                <a:tailEnd type="arrow"/>
-              </a:ln>
-              <a:effectLst/>
-            </p:spPr>
-            <p:style>
-              <a:lnRef idx="2">
-                <a:schemeClr val="dk1"/>
-              </a:lnRef>
-              <a:fillRef idx="0">
-                <a:schemeClr val="dk1"/>
-              </a:fillRef>
-              <a:effectRef idx="1">
-                <a:schemeClr val="dk1"/>
-              </a:effectRef>
-              <a:fontRef idx="minor">
+            <a:off x="3729780" y="3618823"/>
+            <a:ext cx="1472184" cy="1472184"/>
+          </a:xfrm>
+          <a:prstGeom prst="blockArc">
+            <a:avLst>
+              <a:gd name="adj1" fmla="val 8808739"/>
+              <a:gd name="adj2" fmla="val 14204526"/>
+              <a:gd name="adj3" fmla="val 47367"/>
+            </a:avLst>
+          </a:prstGeom>
+          <a:solidFill>
+            <a:srgbClr val="8EB4E3"/>
+          </a:solidFill>
+          <a:ln>
+            <a:solidFill>
+              <a:srgbClr val="000000"/>
+            </a:solidFill>
+          </a:ln>
+        </p:spPr>
+        <p:style>
+          <a:lnRef idx="2">
+            <a:schemeClr val="accent1">
+              <a:shade val="50000"/>
+            </a:schemeClr>
+          </a:lnRef>
+          <a:fillRef idx="1">
+            <a:schemeClr val="accent1"/>
+          </a:fillRef>
+          <a:effectRef idx="0">
+            <a:schemeClr val="accent1"/>
+          </a:effectRef>
+          <a:fontRef idx="minor">
+            <a:schemeClr val="lt1"/>
+          </a:fontRef>
+        </p:style>
+        <p:txBody>
+          <a:bodyPr rtlCol="0" anchor="ctr"/>
+          <a:lstStyle/>
+          <a:p>
+            <a:pPr algn="ctr"/>
+            <a:endParaRPr lang="en-US">
+              <a:solidFill>
                 <a:schemeClr val="tx1"/>
-              </a:fontRef>
-            </p:style>
-          </p:cxnSp>
-          <p:cxnSp>
-            <p:nvCxnSpPr>
-              <p:cNvPr id="77" name="Straight Arrow Connector 76"/>
-              <p:cNvCxnSpPr/>
-              <p:nvPr/>
-            </p:nvCxnSpPr>
-            <p:spPr>
-              <a:xfrm flipV="1">
-                <a:off x="4451534" y="4208902"/>
-                <a:ext cx="747970" cy="181793"/>
-              </a:xfrm>
-              <a:prstGeom prst="straightConnector1">
-                <a:avLst/>
-              </a:prstGeom>
-              <a:ln w="28575" cmpd="sng">
-                <a:tailEnd type="arrow"/>
-              </a:ln>
-              <a:effectLst/>
-            </p:spPr>
-            <p:style>
-              <a:lnRef idx="2">
-                <a:schemeClr val="dk1"/>
-              </a:lnRef>
-              <a:fillRef idx="0">
-                <a:schemeClr val="dk1"/>
-              </a:fillRef>
-              <a:effectRef idx="1">
-                <a:schemeClr val="dk1"/>
-              </a:effectRef>
-              <a:fontRef idx="minor">
-                <a:schemeClr val="tx1"/>
-              </a:fontRef>
-            </p:style>
-          </p:cxnSp>
-          <p:cxnSp>
-            <p:nvCxnSpPr>
-              <p:cNvPr id="78" name="Straight Arrow Connector 77"/>
-              <p:cNvCxnSpPr/>
-              <p:nvPr/>
-            </p:nvCxnSpPr>
-            <p:spPr>
-              <a:xfrm>
-                <a:off x="4460576" y="4385914"/>
-                <a:ext cx="215981" cy="707073"/>
-              </a:xfrm>
-              <a:prstGeom prst="straightConnector1">
-                <a:avLst/>
-              </a:prstGeom>
-              <a:ln w="28575" cmpd="sng">
-                <a:tailEnd type="arrow"/>
-              </a:ln>
-              <a:effectLst/>
-            </p:spPr>
-            <p:style>
-              <a:lnRef idx="2">
-                <a:schemeClr val="dk1"/>
-              </a:lnRef>
-              <a:fillRef idx="0">
-                <a:schemeClr val="dk1"/>
-              </a:fillRef>
-              <a:effectRef idx="1">
-                <a:schemeClr val="dk1"/>
-              </a:effectRef>
-              <a:fontRef idx="minor">
-                <a:schemeClr val="tx1"/>
-              </a:fontRef>
-            </p:style>
-          </p:cxnSp>
-          <p:cxnSp>
-            <p:nvCxnSpPr>
-              <p:cNvPr id="79" name="Straight Arrow Connector 78"/>
-              <p:cNvCxnSpPr/>
-              <p:nvPr/>
-            </p:nvCxnSpPr>
-            <p:spPr>
-              <a:xfrm flipH="1">
-                <a:off x="3836008" y="4395255"/>
-                <a:ext cx="631433" cy="375772"/>
-              </a:xfrm>
-              <a:prstGeom prst="straightConnector1">
-                <a:avLst/>
-              </a:prstGeom>
-              <a:ln w="28575" cmpd="sng">
-                <a:tailEnd type="arrow"/>
-              </a:ln>
-              <a:effectLst/>
-            </p:spPr>
-            <p:style>
-              <a:lnRef idx="2">
-                <a:schemeClr val="dk1"/>
-              </a:lnRef>
-              <a:fillRef idx="0">
-                <a:schemeClr val="dk1"/>
-              </a:fillRef>
-              <a:effectRef idx="1">
-                <a:schemeClr val="dk1"/>
-              </a:effectRef>
-              <a:fontRef idx="minor">
-                <a:schemeClr val="tx1"/>
-              </a:fontRef>
-            </p:style>
-          </p:cxnSp>
-          <p:sp>
-            <p:nvSpPr>
-              <p:cNvPr id="81" name="Oval 80"/>
-              <p:cNvSpPr/>
-              <p:nvPr/>
-            </p:nvSpPr>
-            <p:spPr>
-              <a:xfrm>
-                <a:off x="4426270" y="4354748"/>
-                <a:ext cx="65289" cy="65289"/>
-              </a:xfrm>
-              <a:prstGeom prst="ellipse">
-                <a:avLst/>
-              </a:prstGeom>
-            </p:spPr>
-            <p:style>
-              <a:lnRef idx="2">
-                <a:schemeClr val="dk1">
-                  <a:shade val="50000"/>
-                </a:schemeClr>
-              </a:lnRef>
-              <a:fillRef idx="1">
-                <a:schemeClr val="dk1"/>
-              </a:fillRef>
-              <a:effectRef idx="0">
-                <a:schemeClr val="dk1"/>
-              </a:effectRef>
-              <a:fontRef idx="minor">
-                <a:schemeClr val="lt1"/>
-              </a:fontRef>
-            </p:style>
-            <p:txBody>
-              <a:bodyPr rtlCol="0" anchor="ctr"/>
-              <a:lstStyle/>
-              <a:p>
-                <a:pPr algn="ctr"/>
-                <a:endParaRPr lang="en-US"/>
-              </a:p>
-            </p:txBody>
-          </p:sp>
-        </p:grpSp>
-      </p:grpSp>
+              </a:solidFill>
+            </a:endParaRPr>
+          </a:p>
+        </p:txBody>
+      </p:sp>
+      <p:cxnSp>
+        <p:nvCxnSpPr>
+          <p:cNvPr id="76" name="Straight Arrow Connector 75"/>
+          <p:cNvCxnSpPr/>
+          <p:nvPr/>
+        </p:nvCxnSpPr>
+        <p:spPr>
+          <a:xfrm rot="19339793" flipH="1" flipV="1">
+            <a:off x="3930925" y="3911811"/>
+            <a:ext cx="396276" cy="655031"/>
+          </a:xfrm>
+          <a:prstGeom prst="straightConnector1">
+            <a:avLst/>
+          </a:prstGeom>
+          <a:ln w="28575" cmpd="sng">
+            <a:tailEnd type="arrow"/>
+          </a:ln>
+          <a:effectLst/>
+        </p:spPr>
+        <p:style>
+          <a:lnRef idx="2">
+            <a:schemeClr val="dk1"/>
+          </a:lnRef>
+          <a:fillRef idx="0">
+            <a:schemeClr val="dk1"/>
+          </a:fillRef>
+          <a:effectRef idx="1">
+            <a:schemeClr val="dk1"/>
+          </a:effectRef>
+          <a:fontRef idx="minor">
+            <a:schemeClr val="tx1"/>
+          </a:fontRef>
+        </p:style>
+      </p:cxnSp>
+      <p:cxnSp>
+        <p:nvCxnSpPr>
+          <p:cNvPr id="77" name="Straight Arrow Connector 76"/>
+          <p:cNvCxnSpPr/>
+          <p:nvPr/>
+        </p:nvCxnSpPr>
+        <p:spPr>
+          <a:xfrm rot="19339793" flipV="1">
+            <a:off x="4337423" y="3992542"/>
+            <a:ext cx="747970" cy="181793"/>
+          </a:xfrm>
+          <a:prstGeom prst="straightConnector1">
+            <a:avLst/>
+          </a:prstGeom>
+          <a:ln w="28575" cmpd="sng">
+            <a:tailEnd type="arrow"/>
+          </a:ln>
+          <a:effectLst/>
+        </p:spPr>
+        <p:style>
+          <a:lnRef idx="2">
+            <a:schemeClr val="dk1"/>
+          </a:lnRef>
+          <a:fillRef idx="0">
+            <a:schemeClr val="dk1"/>
+          </a:fillRef>
+          <a:effectRef idx="1">
+            <a:schemeClr val="dk1"/>
+          </a:effectRef>
+          <a:fontRef idx="minor">
+            <a:schemeClr val="tx1"/>
+          </a:fontRef>
+        </p:style>
+      </p:cxnSp>
+      <p:cxnSp>
+        <p:nvCxnSpPr>
+          <p:cNvPr id="78" name="Straight Arrow Connector 77"/>
+          <p:cNvCxnSpPr/>
+          <p:nvPr/>
+        </p:nvCxnSpPr>
+        <p:spPr>
+          <a:xfrm rot="19339793">
+            <a:off x="4668706" y="4234933"/>
+            <a:ext cx="215981" cy="707073"/>
+          </a:xfrm>
+          <a:prstGeom prst="straightConnector1">
+            <a:avLst/>
+          </a:prstGeom>
+          <a:ln w="28575" cmpd="sng">
+            <a:tailEnd type="arrow"/>
+          </a:ln>
+          <a:effectLst/>
+        </p:spPr>
+        <p:style>
+          <a:lnRef idx="2">
+            <a:schemeClr val="dk1"/>
+          </a:lnRef>
+          <a:fillRef idx="0">
+            <a:schemeClr val="dk1"/>
+          </a:fillRef>
+          <a:effectRef idx="1">
+            <a:schemeClr val="dk1"/>
+          </a:effectRef>
+          <a:fontRef idx="minor">
+            <a:schemeClr val="tx1"/>
+          </a:fontRef>
+        </p:style>
+      </p:cxnSp>
+      <p:cxnSp>
+        <p:nvCxnSpPr>
+          <p:cNvPr id="79" name="Straight Arrow Connector 78"/>
+          <p:cNvCxnSpPr/>
+          <p:nvPr/>
+        </p:nvCxnSpPr>
+        <p:spPr>
+          <a:xfrm rot="19339793" flipH="1">
+            <a:off x="4035509" y="4531596"/>
+            <a:ext cx="631433" cy="375772"/>
+          </a:xfrm>
+          <a:prstGeom prst="straightConnector1">
+            <a:avLst/>
+          </a:prstGeom>
+          <a:ln w="28575" cmpd="sng">
+            <a:tailEnd type="arrow"/>
+          </a:ln>
+          <a:effectLst/>
+        </p:spPr>
+        <p:style>
+          <a:lnRef idx="2">
+            <a:schemeClr val="dk1"/>
+          </a:lnRef>
+          <a:fillRef idx="0">
+            <a:schemeClr val="dk1"/>
+          </a:fillRef>
+          <a:effectRef idx="1">
+            <a:schemeClr val="dk1"/>
+          </a:effectRef>
+          <a:fontRef idx="minor">
+            <a:schemeClr val="tx1"/>
+          </a:fontRef>
+        </p:style>
+      </p:cxnSp>
+      <p:sp>
+        <p:nvSpPr>
+          <p:cNvPr id="81" name="Oval 80"/>
+          <p:cNvSpPr/>
+          <p:nvPr/>
+        </p:nvSpPr>
+        <p:spPr>
+          <a:xfrm rot="19339793">
+            <a:off x="4442110" y="4344166"/>
+            <a:ext cx="65289" cy="65289"/>
+          </a:xfrm>
+          <a:prstGeom prst="ellipse">
+            <a:avLst/>
+          </a:prstGeom>
+        </p:spPr>
+        <p:style>
+          <a:lnRef idx="2">
+            <a:schemeClr val="dk1">
+              <a:shade val="50000"/>
+            </a:schemeClr>
+          </a:lnRef>
+          <a:fillRef idx="1">
+            <a:schemeClr val="dk1"/>
+          </a:fillRef>
+          <a:effectRef idx="0">
+            <a:schemeClr val="dk1"/>
+          </a:effectRef>
+          <a:fontRef idx="minor">
+            <a:schemeClr val="lt1"/>
+          </a:fontRef>
+        </p:style>
+        <p:txBody>
+          <a:bodyPr rtlCol="0" anchor="ctr"/>
+          <a:lstStyle/>
+          <a:p>
+            <a:pPr algn="ctr"/>
+            <a:endParaRPr lang="en-US"/>
+          </a:p>
+        </p:txBody>
+      </p:sp>
       <p:sp>
         <p:nvSpPr>
           <p:cNvPr id="86" name="TextBox 85"/>
@@ -12756,355 +12919,39 @@
       </p:grpSpPr>
       <p:sp>
         <p:nvSpPr>
-          <p:cNvPr id="4" name="Oval 3"/>
+          <p:cNvPr id="34" name="Oval 33"/>
           <p:cNvSpPr/>
           <p:nvPr/>
         </p:nvSpPr>
         <p:spPr>
           <a:xfrm>
-            <a:off x="1736810" y="1530863"/>
+            <a:off x="1739341" y="3616861"/>
             <a:ext cx="1475946" cy="1475946"/>
           </a:xfrm>
           <a:prstGeom prst="ellipse">
             <a:avLst/>
           </a:prstGeom>
-          <a:noFill/>
-        </p:spPr>
-        <p:style>
-          <a:lnRef idx="1">
-            <a:schemeClr val="accent1"/>
-          </a:lnRef>
-          <a:fillRef idx="3">
-            <a:schemeClr val="accent1"/>
-          </a:fillRef>
-          <a:effectRef idx="2">
-            <a:schemeClr val="accent1"/>
-          </a:effectRef>
-          <a:fontRef idx="minor">
+          <a:ln>
+            <a:solidFill>
+              <a:schemeClr val="bg1">
+                <a:lumMod val="65000"/>
+              </a:schemeClr>
+            </a:solidFill>
+            <a:prstDash val="dash"/>
+          </a:ln>
+        </p:spPr>
+        <p:style>
+          <a:lnRef idx="2">
+            <a:schemeClr val="dk1"/>
+          </a:lnRef>
+          <a:fillRef idx="1">
             <a:schemeClr val="lt1"/>
-          </a:fontRef>
-        </p:style>
-        <p:txBody>
-          <a:bodyPr rtlCol="0" anchor="ctr"/>
-          <a:lstStyle/>
-          <a:p>
-            <a:pPr algn="ctr"/>
-            <a:endParaRPr lang="en-US"/>
-          </a:p>
-        </p:txBody>
-      </p:sp>
-      <p:sp>
-        <p:nvSpPr>
-          <p:cNvPr id="5" name="TextBox 4"/>
-          <p:cNvSpPr txBox="1"/>
-          <p:nvPr/>
-        </p:nvSpPr>
-        <p:spPr>
-          <a:xfrm>
-            <a:off x="2049020" y="2936610"/>
-            <a:ext cx="889141" cy="461665"/>
-          </a:xfrm>
-          <a:prstGeom prst="rect">
-            <a:avLst/>
-          </a:prstGeom>
-          <a:noFill/>
-        </p:spPr>
-        <p:txBody>
-          <a:bodyPr wrap="square" rtlCol="0">
-            <a:spAutoFit/>
-          </a:bodyPr>
-          <a:lstStyle/>
-          <a:p>
-            <a:r>
-              <a:rPr lang="en-US" sz="2400" dirty="0" smtClean="0"/>
-              <a:t>g</a:t>
-            </a:r>
-            <a:r>
-              <a:rPr lang="en-US" sz="2400" baseline="-25000" dirty="0" smtClean="0"/>
-              <a:t>start</a:t>
-            </a:r>
-            <a:endParaRPr lang="en-US" sz="2400" baseline="-25000" dirty="0"/>
-          </a:p>
-        </p:txBody>
-      </p:sp>
-      <p:cxnSp>
-        <p:nvCxnSpPr>
-          <p:cNvPr id="6" name="Straight Arrow Connector 5"/>
-          <p:cNvCxnSpPr/>
-          <p:nvPr/>
-        </p:nvCxnSpPr>
-        <p:spPr>
-          <a:xfrm>
-            <a:off x="2443757" y="2264725"/>
-            <a:ext cx="224845" cy="736092"/>
-          </a:xfrm>
-          <a:prstGeom prst="straightConnector1">
-            <a:avLst/>
-          </a:prstGeom>
-          <a:ln w="28575" cmpd="sng">
-            <a:tailEnd type="arrow"/>
-          </a:ln>
-          <a:effectLst/>
-        </p:spPr>
-        <p:style>
-          <a:lnRef idx="2">
-            <a:schemeClr val="dk1"/>
-          </a:lnRef>
-          <a:fillRef idx="0">
-            <a:schemeClr val="dk1"/>
-          </a:fillRef>
-          <a:effectRef idx="1">
-            <a:schemeClr val="dk1"/>
-          </a:effectRef>
-          <a:fontRef idx="minor">
-            <a:schemeClr val="tx1"/>
-          </a:fontRef>
-        </p:style>
-      </p:cxnSp>
-      <p:cxnSp>
-        <p:nvCxnSpPr>
-          <p:cNvPr id="7" name="Straight Arrow Connector 6"/>
-          <p:cNvCxnSpPr/>
-          <p:nvPr/>
-        </p:nvCxnSpPr>
-        <p:spPr>
-          <a:xfrm flipH="1">
-            <a:off x="1819189" y="2274066"/>
-            <a:ext cx="631433" cy="375772"/>
-          </a:xfrm>
-          <a:prstGeom prst="straightConnector1">
-            <a:avLst/>
-          </a:prstGeom>
-          <a:ln w="28575" cmpd="sng">
-            <a:tailEnd type="arrow"/>
-          </a:ln>
-          <a:effectLst/>
-        </p:spPr>
-        <p:style>
-          <a:lnRef idx="2">
-            <a:schemeClr val="dk1"/>
-          </a:lnRef>
-          <a:fillRef idx="0">
-            <a:schemeClr val="dk1"/>
-          </a:fillRef>
-          <a:effectRef idx="1">
-            <a:schemeClr val="dk1"/>
-          </a:effectRef>
-          <a:fontRef idx="minor">
-            <a:schemeClr val="tx1"/>
-          </a:fontRef>
-        </p:style>
-      </p:cxnSp>
-      <p:sp>
-        <p:nvSpPr>
-          <p:cNvPr id="8" name="Oval 7"/>
-          <p:cNvSpPr/>
-          <p:nvPr/>
-        </p:nvSpPr>
-        <p:spPr>
-          <a:xfrm>
-            <a:off x="2412026" y="2253470"/>
-            <a:ext cx="65289" cy="65289"/>
-          </a:xfrm>
-          <a:prstGeom prst="ellipse">
-            <a:avLst/>
-          </a:prstGeom>
-        </p:spPr>
-        <p:style>
-          <a:lnRef idx="2">
-            <a:schemeClr val="dk1">
-              <a:shade val="50000"/>
-            </a:schemeClr>
-          </a:lnRef>
-          <a:fillRef idx="1">
-            <a:schemeClr val="dk1"/>
           </a:fillRef>
           <a:effectRef idx="0">
             <a:schemeClr val="dk1"/>
           </a:effectRef>
           <a:fontRef idx="minor">
-            <a:schemeClr val="lt1"/>
-          </a:fontRef>
-        </p:style>
-        <p:txBody>
-          <a:bodyPr rtlCol="0" anchor="ctr"/>
-          <a:lstStyle/>
-          <a:p>
-            <a:pPr algn="ctr"/>
-            <a:endParaRPr lang="en-US"/>
-          </a:p>
-        </p:txBody>
-      </p:sp>
-      <p:sp>
-        <p:nvSpPr>
-          <p:cNvPr id="9" name="TextBox 8"/>
-          <p:cNvSpPr txBox="1"/>
-          <p:nvPr/>
-        </p:nvSpPr>
-        <p:spPr>
-          <a:xfrm>
-            <a:off x="2050449" y="5022788"/>
-            <a:ext cx="889141" cy="461665"/>
-          </a:xfrm>
-          <a:prstGeom prst="rect">
-            <a:avLst/>
-          </a:prstGeom>
-          <a:noFill/>
-        </p:spPr>
-        <p:txBody>
-          <a:bodyPr wrap="square" rtlCol="0">
-            <a:spAutoFit/>
-          </a:bodyPr>
-          <a:lstStyle/>
-          <a:p>
-            <a:r>
-              <a:rPr lang="en-US" sz="2400" dirty="0" smtClean="0"/>
-              <a:t>g</a:t>
-            </a:r>
-            <a:r>
-              <a:rPr lang="en-US" sz="2400" baseline="-25000" dirty="0" smtClean="0"/>
-              <a:t>start</a:t>
-            </a:r>
-            <a:endParaRPr lang="en-US" sz="2400" baseline="-25000" dirty="0"/>
-          </a:p>
-        </p:txBody>
-      </p:sp>
-      <p:sp>
-        <p:nvSpPr>
-          <p:cNvPr id="10" name="Oval 9"/>
-          <p:cNvSpPr/>
-          <p:nvPr/>
-        </p:nvSpPr>
-        <p:spPr>
-          <a:xfrm rot="19527167">
-            <a:off x="1738239" y="3617041"/>
-            <a:ext cx="1475946" cy="1475946"/>
-          </a:xfrm>
-          <a:prstGeom prst="ellipse">
-            <a:avLst/>
-          </a:prstGeom>
-          <a:noFill/>
-        </p:spPr>
-        <p:style>
-          <a:lnRef idx="1">
-            <a:schemeClr val="accent1"/>
-          </a:lnRef>
-          <a:fillRef idx="3">
-            <a:schemeClr val="accent1"/>
-          </a:fillRef>
-          <a:effectRef idx="2">
-            <a:schemeClr val="accent1"/>
-          </a:effectRef>
-          <a:fontRef idx="minor">
-            <a:schemeClr val="lt1"/>
-          </a:fontRef>
-        </p:style>
-        <p:txBody>
-          <a:bodyPr rtlCol="0" anchor="ctr"/>
-          <a:lstStyle/>
-          <a:p>
-            <a:pPr algn="ctr"/>
-            <a:endParaRPr lang="en-US"/>
-          </a:p>
-        </p:txBody>
-      </p:sp>
-      <p:cxnSp>
-        <p:nvCxnSpPr>
-          <p:cNvPr id="11" name="Straight Arrow Connector 10"/>
-          <p:cNvCxnSpPr/>
-          <p:nvPr/>
-        </p:nvCxnSpPr>
-        <p:spPr>
-          <a:xfrm rot="19527167">
-            <a:off x="2637215" y="4240568"/>
-            <a:ext cx="224845" cy="736092"/>
-          </a:xfrm>
-          <a:prstGeom prst="straightConnector1">
-            <a:avLst/>
-          </a:prstGeom>
-          <a:ln w="28575" cmpd="sng">
-            <a:tailEnd type="arrow"/>
-          </a:ln>
-          <a:effectLst/>
-        </p:spPr>
-        <p:style>
-          <a:lnRef idx="2">
-            <a:schemeClr val="dk1"/>
-          </a:lnRef>
-          <a:fillRef idx="0">
-            <a:schemeClr val="dk1"/>
-          </a:fillRef>
-          <a:effectRef idx="1">
-            <a:schemeClr val="dk1"/>
-          </a:effectRef>
-          <a:fontRef idx="minor">
-            <a:schemeClr val="tx1"/>
-          </a:fontRef>
-        </p:style>
-      </p:cxnSp>
-      <p:cxnSp>
-        <p:nvCxnSpPr>
-          <p:cNvPr id="12" name="Straight Arrow Connector 11"/>
-          <p:cNvCxnSpPr/>
-          <p:nvPr/>
-        </p:nvCxnSpPr>
-        <p:spPr>
-          <a:xfrm rot="19527167" flipH="1">
-            <a:off x="1990066" y="4518929"/>
-            <a:ext cx="631433" cy="375772"/>
-          </a:xfrm>
-          <a:prstGeom prst="straightConnector1">
-            <a:avLst/>
-          </a:prstGeom>
-          <a:ln w="28575" cmpd="sng">
-            <a:tailEnd type="arrow"/>
-          </a:ln>
-          <a:effectLst/>
-        </p:spPr>
-        <p:style>
-          <a:lnRef idx="2">
-            <a:schemeClr val="dk1"/>
-          </a:lnRef>
-          <a:fillRef idx="0">
-            <a:schemeClr val="dk1"/>
-          </a:fillRef>
-          <a:effectRef idx="1">
-            <a:schemeClr val="dk1"/>
-          </a:effectRef>
-          <a:fontRef idx="minor">
-            <a:schemeClr val="tx1"/>
-          </a:fontRef>
-        </p:style>
-      </p:cxnSp>
-      <p:sp>
-        <p:nvSpPr>
-          <p:cNvPr id="13" name="Oval 12"/>
-          <p:cNvSpPr/>
-          <p:nvPr/>
-        </p:nvSpPr>
-        <p:spPr>
-          <a:xfrm rot="19527167">
-            <a:off x="2428563" y="4353677"/>
-            <a:ext cx="65289" cy="65289"/>
-          </a:xfrm>
-          <a:prstGeom prst="ellipse">
-            <a:avLst/>
-          </a:prstGeom>
-        </p:spPr>
-        <p:style>
-          <a:lnRef idx="2">
-            <a:schemeClr val="dk1">
-              <a:shade val="50000"/>
-            </a:schemeClr>
-          </a:lnRef>
-          <a:fillRef idx="1">
-            <a:schemeClr val="dk1"/>
-          </a:fillRef>
-          <a:effectRef idx="0">
-            <a:schemeClr val="dk1"/>
-          </a:effectRef>
-          <a:fontRef idx="minor">
-            <a:schemeClr val="lt1"/>
+            <a:schemeClr val="dk1"/>
           </a:fontRef>
         </p:style>
         <p:txBody>
@@ -14158,6 +14005,336 @@
           </a:p>
         </p:txBody>
       </p:sp>
+      <p:sp>
+        <p:nvSpPr>
+          <p:cNvPr id="35" name="Oval 34"/>
+          <p:cNvSpPr/>
+          <p:nvPr/>
+        </p:nvSpPr>
+        <p:spPr>
+          <a:xfrm>
+            <a:off x="1739341" y="1536106"/>
+            <a:ext cx="1475946" cy="1475946"/>
+          </a:xfrm>
+          <a:prstGeom prst="ellipse">
+            <a:avLst/>
+          </a:prstGeom>
+          <a:ln>
+            <a:solidFill>
+              <a:schemeClr val="bg1">
+                <a:lumMod val="65000"/>
+              </a:schemeClr>
+            </a:solidFill>
+            <a:prstDash val="dash"/>
+          </a:ln>
+        </p:spPr>
+        <p:style>
+          <a:lnRef idx="2">
+            <a:schemeClr val="dk1"/>
+          </a:lnRef>
+          <a:fillRef idx="1">
+            <a:schemeClr val="lt1"/>
+          </a:fillRef>
+          <a:effectRef idx="0">
+            <a:schemeClr val="dk1"/>
+          </a:effectRef>
+          <a:fontRef idx="minor">
+            <a:schemeClr val="dk1"/>
+          </a:fontRef>
+        </p:style>
+        <p:txBody>
+          <a:bodyPr rtlCol="0" anchor="ctr"/>
+          <a:lstStyle/>
+          <a:p>
+            <a:pPr algn="ctr"/>
+            <a:endParaRPr lang="en-US"/>
+          </a:p>
+        </p:txBody>
+      </p:sp>
+      <p:sp>
+        <p:nvSpPr>
+          <p:cNvPr id="36" name="TextBox 35"/>
+          <p:cNvSpPr txBox="1"/>
+          <p:nvPr/>
+        </p:nvSpPr>
+        <p:spPr>
+          <a:xfrm>
+            <a:off x="2051551" y="2940286"/>
+            <a:ext cx="889141" cy="461665"/>
+          </a:xfrm>
+          <a:prstGeom prst="rect">
+            <a:avLst/>
+          </a:prstGeom>
+          <a:noFill/>
+        </p:spPr>
+        <p:txBody>
+          <a:bodyPr wrap="square" rtlCol="0">
+            <a:spAutoFit/>
+          </a:bodyPr>
+          <a:lstStyle/>
+          <a:p>
+            <a:r>
+              <a:rPr lang="en-US" sz="2400" dirty="0" smtClean="0"/>
+              <a:t>g</a:t>
+            </a:r>
+            <a:r>
+              <a:rPr lang="en-US" sz="2400" baseline="-25000" dirty="0" smtClean="0"/>
+              <a:t>start</a:t>
+            </a:r>
+            <a:endParaRPr lang="en-US" sz="2400" baseline="-25000" dirty="0"/>
+          </a:p>
+        </p:txBody>
+      </p:sp>
+      <p:cxnSp>
+        <p:nvCxnSpPr>
+          <p:cNvPr id="37" name="Straight Arrow Connector 36"/>
+          <p:cNvCxnSpPr/>
+          <p:nvPr/>
+        </p:nvCxnSpPr>
+        <p:spPr>
+          <a:xfrm>
+            <a:off x="2446288" y="2268401"/>
+            <a:ext cx="224845" cy="736092"/>
+          </a:xfrm>
+          <a:prstGeom prst="straightConnector1">
+            <a:avLst/>
+          </a:prstGeom>
+          <a:ln w="28575" cmpd="sng">
+            <a:tailEnd type="arrow"/>
+          </a:ln>
+          <a:effectLst/>
+        </p:spPr>
+        <p:style>
+          <a:lnRef idx="2">
+            <a:schemeClr val="dk1"/>
+          </a:lnRef>
+          <a:fillRef idx="0">
+            <a:schemeClr val="dk1"/>
+          </a:fillRef>
+          <a:effectRef idx="1">
+            <a:schemeClr val="dk1"/>
+          </a:effectRef>
+          <a:fontRef idx="minor">
+            <a:schemeClr val="tx1"/>
+          </a:fontRef>
+        </p:style>
+      </p:cxnSp>
+      <p:cxnSp>
+        <p:nvCxnSpPr>
+          <p:cNvPr id="38" name="Straight Arrow Connector 37"/>
+          <p:cNvCxnSpPr/>
+          <p:nvPr/>
+        </p:nvCxnSpPr>
+        <p:spPr>
+          <a:xfrm flipH="1">
+            <a:off x="1821720" y="2277742"/>
+            <a:ext cx="631433" cy="375772"/>
+          </a:xfrm>
+          <a:prstGeom prst="straightConnector1">
+            <a:avLst/>
+          </a:prstGeom>
+          <a:ln w="28575" cmpd="sng">
+            <a:tailEnd type="arrow"/>
+          </a:ln>
+          <a:effectLst/>
+        </p:spPr>
+        <p:style>
+          <a:lnRef idx="2">
+            <a:schemeClr val="dk1"/>
+          </a:lnRef>
+          <a:fillRef idx="0">
+            <a:schemeClr val="dk1"/>
+          </a:fillRef>
+          <a:effectRef idx="1">
+            <a:schemeClr val="dk1"/>
+          </a:effectRef>
+          <a:fontRef idx="minor">
+            <a:schemeClr val="tx1"/>
+          </a:fontRef>
+        </p:style>
+      </p:cxnSp>
+      <p:sp>
+        <p:nvSpPr>
+          <p:cNvPr id="39" name="Oval 38"/>
+          <p:cNvSpPr/>
+          <p:nvPr/>
+        </p:nvSpPr>
+        <p:spPr>
+          <a:xfrm>
+            <a:off x="2414557" y="2257146"/>
+            <a:ext cx="65289" cy="65289"/>
+          </a:xfrm>
+          <a:prstGeom prst="ellipse">
+            <a:avLst/>
+          </a:prstGeom>
+        </p:spPr>
+        <p:style>
+          <a:lnRef idx="2">
+            <a:schemeClr val="dk1">
+              <a:shade val="50000"/>
+            </a:schemeClr>
+          </a:lnRef>
+          <a:fillRef idx="1">
+            <a:schemeClr val="dk1"/>
+          </a:fillRef>
+          <a:effectRef idx="0">
+            <a:schemeClr val="dk1"/>
+          </a:effectRef>
+          <a:fontRef idx="minor">
+            <a:schemeClr val="lt1"/>
+          </a:fontRef>
+        </p:style>
+        <p:txBody>
+          <a:bodyPr rtlCol="0" anchor="ctr"/>
+          <a:lstStyle/>
+          <a:p>
+            <a:pPr algn="ctr"/>
+            <a:endParaRPr lang="en-US"/>
+          </a:p>
+        </p:txBody>
+      </p:sp>
+      <p:sp>
+        <p:nvSpPr>
+          <p:cNvPr id="40" name="TextBox 39"/>
+          <p:cNvSpPr txBox="1"/>
+          <p:nvPr/>
+        </p:nvSpPr>
+        <p:spPr>
+          <a:xfrm>
+            <a:off x="2052980" y="5026464"/>
+            <a:ext cx="889141" cy="461665"/>
+          </a:xfrm>
+          <a:prstGeom prst="rect">
+            <a:avLst/>
+          </a:prstGeom>
+          <a:noFill/>
+        </p:spPr>
+        <p:txBody>
+          <a:bodyPr wrap="square" rtlCol="0">
+            <a:spAutoFit/>
+          </a:bodyPr>
+          <a:lstStyle/>
+          <a:p>
+            <a:r>
+              <a:rPr lang="en-US" sz="2400" dirty="0" smtClean="0"/>
+              <a:t>g</a:t>
+            </a:r>
+            <a:r>
+              <a:rPr lang="en-US" sz="2400" baseline="-25000" dirty="0" smtClean="0"/>
+              <a:t>start</a:t>
+            </a:r>
+            <a:endParaRPr lang="en-US" sz="2400" baseline="-25000" dirty="0"/>
+          </a:p>
+        </p:txBody>
+      </p:sp>
+      <p:cxnSp>
+        <p:nvCxnSpPr>
+          <p:cNvPr id="41" name="Straight Arrow Connector 40"/>
+          <p:cNvCxnSpPr/>
+          <p:nvPr/>
+        </p:nvCxnSpPr>
+        <p:spPr>
+          <a:xfrm rot="19527167">
+            <a:off x="2639746" y="4244244"/>
+            <a:ext cx="224845" cy="736092"/>
+          </a:xfrm>
+          <a:prstGeom prst="straightConnector1">
+            <a:avLst/>
+          </a:prstGeom>
+          <a:ln w="28575" cmpd="sng">
+            <a:tailEnd type="arrow"/>
+          </a:ln>
+          <a:effectLst/>
+        </p:spPr>
+        <p:style>
+          <a:lnRef idx="2">
+            <a:schemeClr val="dk1"/>
+          </a:lnRef>
+          <a:fillRef idx="0">
+            <a:schemeClr val="dk1"/>
+          </a:fillRef>
+          <a:effectRef idx="1">
+            <a:schemeClr val="dk1"/>
+          </a:effectRef>
+          <a:fontRef idx="minor">
+            <a:schemeClr val="tx1"/>
+          </a:fontRef>
+        </p:style>
+      </p:cxnSp>
+      <p:cxnSp>
+        <p:nvCxnSpPr>
+          <p:cNvPr id="42" name="Straight Arrow Connector 41"/>
+          <p:cNvCxnSpPr/>
+          <p:nvPr/>
+        </p:nvCxnSpPr>
+        <p:spPr>
+          <a:xfrm rot="19527167" flipH="1">
+            <a:off x="1992597" y="4522605"/>
+            <a:ext cx="631433" cy="375772"/>
+          </a:xfrm>
+          <a:prstGeom prst="straightConnector1">
+            <a:avLst/>
+          </a:prstGeom>
+          <a:ln w="28575" cmpd="sng">
+            <a:tailEnd type="arrow"/>
+          </a:ln>
+          <a:effectLst/>
+        </p:spPr>
+        <p:style>
+          <a:lnRef idx="2">
+            <a:schemeClr val="dk1"/>
+          </a:lnRef>
+          <a:fillRef idx="0">
+            <a:schemeClr val="dk1"/>
+          </a:fillRef>
+          <a:effectRef idx="1">
+            <a:schemeClr val="dk1"/>
+          </a:effectRef>
+          <a:fontRef idx="minor">
+            <a:schemeClr val="tx1"/>
+          </a:fontRef>
+        </p:style>
+      </p:cxnSp>
+      <p:sp>
+        <p:nvSpPr>
+          <p:cNvPr id="43" name="Oval 42"/>
+          <p:cNvSpPr/>
+          <p:nvPr/>
+        </p:nvSpPr>
+        <p:spPr>
+          <a:xfrm rot="19527167">
+            <a:off x="2431094" y="4357353"/>
+            <a:ext cx="65289" cy="65289"/>
+          </a:xfrm>
+          <a:prstGeom prst="ellipse">
+            <a:avLst/>
+          </a:prstGeom>
+        </p:spPr>
+        <p:style>
+          <a:lnRef idx="2">
+            <a:schemeClr val="dk1">
+              <a:shade val="50000"/>
+            </a:schemeClr>
+          </a:lnRef>
+          <a:fillRef idx="1">
+            <a:schemeClr val="dk1"/>
+          </a:fillRef>
+          <a:effectRef idx="0">
+            <a:schemeClr val="dk1"/>
+          </a:effectRef>
+          <a:fontRef idx="minor">
+            <a:schemeClr val="lt1"/>
+          </a:fontRef>
+        </p:style>
+        <p:txBody>
+          <a:bodyPr rtlCol="0" anchor="ctr"/>
+          <a:lstStyle/>
+          <a:p>
+            <a:pPr algn="ctr"/>
+            <a:endParaRPr lang="en-US"/>
+          </a:p>
+        </p:txBody>
+      </p:sp>
     </p:spTree>
     <p:extLst>
       <p:ext uri="{BB962C8B-B14F-4D97-AF65-F5344CB8AC3E}">
@@ -14190,32 +14367,39 @@
       </p:grpSpPr>
       <p:sp>
         <p:nvSpPr>
-          <p:cNvPr id="4" name="Oval 3"/>
+          <p:cNvPr id="34" name="Oval 33"/>
           <p:cNvSpPr/>
           <p:nvPr/>
         </p:nvSpPr>
         <p:spPr>
           <a:xfrm>
-            <a:off x="1736810" y="1530863"/>
+            <a:off x="1739341" y="1536106"/>
             <a:ext cx="1475946" cy="1475946"/>
           </a:xfrm>
           <a:prstGeom prst="ellipse">
             <a:avLst/>
           </a:prstGeom>
-          <a:noFill/>
-        </p:spPr>
-        <p:style>
-          <a:lnRef idx="1">
-            <a:schemeClr val="accent1"/>
-          </a:lnRef>
-          <a:fillRef idx="3">
-            <a:schemeClr val="accent1"/>
-          </a:fillRef>
-          <a:effectRef idx="2">
-            <a:schemeClr val="accent1"/>
-          </a:effectRef>
-          <a:fontRef idx="minor">
+          <a:ln>
+            <a:solidFill>
+              <a:schemeClr val="bg1">
+                <a:lumMod val="65000"/>
+              </a:schemeClr>
+            </a:solidFill>
+            <a:prstDash val="dash"/>
+          </a:ln>
+        </p:spPr>
+        <p:style>
+          <a:lnRef idx="2">
+            <a:schemeClr val="dk1"/>
+          </a:lnRef>
+          <a:fillRef idx="1">
             <a:schemeClr val="lt1"/>
+          </a:fillRef>
+          <a:effectRef idx="0">
+            <a:schemeClr val="dk1"/>
+          </a:effectRef>
+          <a:fontRef idx="minor">
+            <a:schemeClr val="dk1"/>
           </a:fontRef>
         </p:style>
         <p:txBody>
@@ -16235,32 +16419,39 @@
       </p:grpSpPr>
       <p:sp>
         <p:nvSpPr>
-          <p:cNvPr id="4" name="Oval 3"/>
+          <p:cNvPr id="39" name="Oval 38"/>
           <p:cNvSpPr/>
           <p:nvPr/>
         </p:nvSpPr>
         <p:spPr>
           <a:xfrm>
-            <a:off x="1736810" y="1530863"/>
+            <a:off x="1739341" y="1536106"/>
             <a:ext cx="1475946" cy="1475946"/>
           </a:xfrm>
           <a:prstGeom prst="ellipse">
             <a:avLst/>
           </a:prstGeom>
-          <a:noFill/>
-        </p:spPr>
-        <p:style>
-          <a:lnRef idx="1">
-            <a:schemeClr val="accent1"/>
-          </a:lnRef>
-          <a:fillRef idx="3">
-            <a:schemeClr val="accent1"/>
-          </a:fillRef>
-          <a:effectRef idx="2">
-            <a:schemeClr val="accent1"/>
-          </a:effectRef>
-          <a:fontRef idx="minor">
+          <a:ln>
+            <a:solidFill>
+              <a:schemeClr val="bg1">
+                <a:lumMod val="65000"/>
+              </a:schemeClr>
+            </a:solidFill>
+            <a:prstDash val="dash"/>
+          </a:ln>
+        </p:spPr>
+        <p:style>
+          <a:lnRef idx="2">
+            <a:schemeClr val="dk1"/>
+          </a:lnRef>
+          <a:fillRef idx="1">
             <a:schemeClr val="lt1"/>
+          </a:fillRef>
+          <a:effectRef idx="0">
+            <a:schemeClr val="dk1"/>
+          </a:effectRef>
+          <a:fontRef idx="minor">
+            <a:schemeClr val="dk1"/>
           </a:fontRef>
         </p:style>
         <p:txBody>
@@ -16269,44 +16460,6 @@
           <a:p>
             <a:pPr algn="ctr"/>
             <a:endParaRPr lang="en-US"/>
-          </a:p>
-        </p:txBody>
-      </p:sp>
-      <p:sp>
-        <p:nvSpPr>
-          <p:cNvPr id="5" name="TextBox 4"/>
-          <p:cNvSpPr txBox="1"/>
-          <p:nvPr/>
-        </p:nvSpPr>
-        <p:spPr>
-          <a:xfrm>
-            <a:off x="1705776" y="2929129"/>
-            <a:ext cx="1819858" cy="830997"/>
-          </a:xfrm>
-          <a:prstGeom prst="rect">
-            <a:avLst/>
-          </a:prstGeom>
-          <a:noFill/>
-        </p:spPr>
-        <p:txBody>
-          <a:bodyPr wrap="square" rtlCol="0">
-            <a:spAutoFit/>
-          </a:bodyPr>
-          <a:lstStyle/>
-          <a:p>
-            <a:r>
-              <a:rPr lang="en-US" sz="2400" dirty="0" smtClean="0"/>
-              <a:t>g</a:t>
-            </a:r>
-            <a:r>
-              <a:rPr lang="en-US" sz="2400" baseline="-25000" dirty="0" smtClean="0"/>
-              <a:t>start </a:t>
-            </a:r>
-            <a:r>
-              <a:rPr lang="en-US" sz="2400" dirty="0" smtClean="0"/>
-              <a:t>sample space</a:t>
-            </a:r>
-            <a:endParaRPr lang="en-US" sz="2400" dirty="0"/>
           </a:p>
         </p:txBody>
       </p:sp>
@@ -17578,6 +17731,40 @@
           </a:p>
         </p:txBody>
       </p:sp>
+      <p:sp>
+        <p:nvSpPr>
+          <p:cNvPr id="40" name="TextBox 39"/>
+          <p:cNvSpPr txBox="1"/>
+          <p:nvPr/>
+        </p:nvSpPr>
+        <p:spPr>
+          <a:xfrm>
+            <a:off x="2049020" y="2936610"/>
+            <a:ext cx="889141" cy="461665"/>
+          </a:xfrm>
+          <a:prstGeom prst="rect">
+            <a:avLst/>
+          </a:prstGeom>
+          <a:noFill/>
+        </p:spPr>
+        <p:txBody>
+          <a:bodyPr wrap="square" rtlCol="0">
+            <a:spAutoFit/>
+          </a:bodyPr>
+          <a:lstStyle/>
+          <a:p>
+            <a:r>
+              <a:rPr lang="en-US" sz="2400" dirty="0" smtClean="0"/>
+              <a:t>g</a:t>
+            </a:r>
+            <a:r>
+              <a:rPr lang="en-US" sz="2400" baseline="-25000" dirty="0" smtClean="0"/>
+              <a:t>start</a:t>
+            </a:r>
+            <a:endParaRPr lang="en-US" sz="2400" baseline="-25000" dirty="0"/>
+          </a:p>
+        </p:txBody>
+      </p:sp>
     </p:spTree>
     <p:extLst>
       <p:ext uri="{BB962C8B-B14F-4D97-AF65-F5344CB8AC3E}">
@@ -17610,6 +17797,98 @@
       </p:grpSpPr>
       <p:sp>
         <p:nvSpPr>
+          <p:cNvPr id="56" name="Oval 55"/>
+          <p:cNvSpPr/>
+          <p:nvPr/>
+        </p:nvSpPr>
+        <p:spPr>
+          <a:xfrm>
+            <a:off x="1126771" y="1488968"/>
+            <a:ext cx="1475946" cy="1475946"/>
+          </a:xfrm>
+          <a:prstGeom prst="ellipse">
+            <a:avLst/>
+          </a:prstGeom>
+          <a:ln>
+            <a:solidFill>
+              <a:schemeClr val="bg1">
+                <a:lumMod val="65000"/>
+              </a:schemeClr>
+            </a:solidFill>
+            <a:prstDash val="dash"/>
+          </a:ln>
+        </p:spPr>
+        <p:style>
+          <a:lnRef idx="2">
+            <a:schemeClr val="dk1"/>
+          </a:lnRef>
+          <a:fillRef idx="1">
+            <a:schemeClr val="lt1"/>
+          </a:fillRef>
+          <a:effectRef idx="0">
+            <a:schemeClr val="dk1"/>
+          </a:effectRef>
+          <a:fontRef idx="minor">
+            <a:schemeClr val="dk1"/>
+          </a:fontRef>
+        </p:style>
+        <p:txBody>
+          <a:bodyPr rtlCol="0" anchor="ctr"/>
+          <a:lstStyle/>
+          <a:p>
+            <a:pPr algn="ctr"/>
+            <a:endParaRPr lang="en-US"/>
+          </a:p>
+        </p:txBody>
+      </p:sp>
+      <p:sp>
+        <p:nvSpPr>
+          <p:cNvPr id="55" name="Oval 54"/>
+          <p:cNvSpPr/>
+          <p:nvPr/>
+        </p:nvSpPr>
+        <p:spPr>
+          <a:xfrm>
+            <a:off x="3286374" y="1388596"/>
+            <a:ext cx="1475946" cy="1475946"/>
+          </a:xfrm>
+          <a:prstGeom prst="ellipse">
+            <a:avLst/>
+          </a:prstGeom>
+          <a:ln>
+            <a:solidFill>
+              <a:schemeClr val="bg1">
+                <a:lumMod val="65000"/>
+              </a:schemeClr>
+            </a:solidFill>
+            <a:prstDash val="dash"/>
+          </a:ln>
+        </p:spPr>
+        <p:style>
+          <a:lnRef idx="2">
+            <a:schemeClr val="dk1"/>
+          </a:lnRef>
+          <a:fillRef idx="1">
+            <a:schemeClr val="lt1"/>
+          </a:fillRef>
+          <a:effectRef idx="0">
+            <a:schemeClr val="dk1"/>
+          </a:effectRef>
+          <a:fontRef idx="minor">
+            <a:schemeClr val="dk1"/>
+          </a:fontRef>
+        </p:style>
+        <p:txBody>
+          <a:bodyPr rtlCol="0" anchor="ctr"/>
+          <a:lstStyle/>
+          <a:p>
+            <a:pPr algn="ctr"/>
+            <a:endParaRPr lang="en-US"/>
+          </a:p>
+        </p:txBody>
+      </p:sp>
+      <p:sp>
+        <p:nvSpPr>
           <p:cNvPr id="49" name="Block Arc 48"/>
           <p:cNvSpPr/>
           <p:nvPr/>
@@ -17626,15 +17905,25 @@
               <a:gd name="adj3" fmla="val 47367"/>
             </a:avLst>
           </a:prstGeom>
-        </p:spPr>
-        <p:style>
-          <a:lnRef idx="1">
+          <a:solidFill>
+            <a:srgbClr val="8EB4E3"/>
+          </a:solidFill>
+          <a:ln>
+            <a:solidFill>
+              <a:srgbClr val="000000"/>
+            </a:solidFill>
+          </a:ln>
+        </p:spPr>
+        <p:style>
+          <a:lnRef idx="2">
+            <a:schemeClr val="accent1">
+              <a:shade val="50000"/>
+            </a:schemeClr>
+          </a:lnRef>
+          <a:fillRef idx="1">
             <a:schemeClr val="accent1"/>
-          </a:lnRef>
-          <a:fillRef idx="3">
-            <a:schemeClr val="accent1"/>
-          </a:fillRef>
-          <a:effectRef idx="2">
+          </a:fillRef>
+          <a:effectRef idx="0">
             <a:schemeClr val="accent1"/>
           </a:effectRef>
           <a:fontRef idx="minor">
@@ -17672,15 +17961,25 @@
               <a:gd name="adj3" fmla="val 47367"/>
             </a:avLst>
           </a:prstGeom>
-        </p:spPr>
-        <p:style>
-          <a:lnRef idx="1">
+          <a:solidFill>
+            <a:srgbClr val="8EB4E3"/>
+          </a:solidFill>
+          <a:ln>
+            <a:solidFill>
+              <a:srgbClr val="000000"/>
+            </a:solidFill>
+          </a:ln>
+        </p:spPr>
+        <p:style>
+          <a:lnRef idx="2">
+            <a:schemeClr val="accent1">
+              <a:shade val="50000"/>
+            </a:schemeClr>
+          </a:lnRef>
+          <a:fillRef idx="1">
             <a:schemeClr val="accent1"/>
-          </a:lnRef>
-          <a:fillRef idx="3">
-            <a:schemeClr val="accent1"/>
-          </a:fillRef>
-          <a:effectRef idx="2">
+          </a:fillRef>
+          <a:effectRef idx="0">
             <a:schemeClr val="accent1"/>
           </a:effectRef>
           <a:fontRef idx="minor">
@@ -17697,45 +17996,6 @@
                 <a:schemeClr val="tx1"/>
               </a:solidFill>
             </a:endParaRPr>
-          </a:p>
-        </p:txBody>
-      </p:sp>
-      <p:sp>
-        <p:nvSpPr>
-          <p:cNvPr id="4" name="Oval 3"/>
-          <p:cNvSpPr/>
-          <p:nvPr/>
-        </p:nvSpPr>
-        <p:spPr>
-          <a:xfrm>
-            <a:off x="1126771" y="1483738"/>
-            <a:ext cx="1475946" cy="1475946"/>
-          </a:xfrm>
-          <a:prstGeom prst="ellipse">
-            <a:avLst/>
-          </a:prstGeom>
-          <a:noFill/>
-        </p:spPr>
-        <p:style>
-          <a:lnRef idx="1">
-            <a:schemeClr val="accent1"/>
-          </a:lnRef>
-          <a:fillRef idx="3">
-            <a:schemeClr val="accent1"/>
-          </a:fillRef>
-          <a:effectRef idx="2">
-            <a:schemeClr val="accent1"/>
-          </a:effectRef>
-          <a:fontRef idx="minor">
-            <a:schemeClr val="lt1"/>
-          </a:fontRef>
-        </p:style>
-        <p:txBody>
-          <a:bodyPr rtlCol="0" anchor="ctr"/>
-          <a:lstStyle/>
-          <a:p>
-            <a:pPr algn="ctr"/>
-            <a:endParaRPr lang="en-US"/>
           </a:p>
         </p:txBody>
       </p:sp>
@@ -19041,45 +19301,6 @@
           </a:p>
         </p:txBody>
       </p:sp>
-      <p:sp>
-        <p:nvSpPr>
-          <p:cNvPr id="43" name="Oval 42"/>
-          <p:cNvSpPr/>
-          <p:nvPr/>
-        </p:nvSpPr>
-        <p:spPr>
-          <a:xfrm>
-            <a:off x="3283842" y="1389416"/>
-            <a:ext cx="1475946" cy="1475946"/>
-          </a:xfrm>
-          <a:prstGeom prst="ellipse">
-            <a:avLst/>
-          </a:prstGeom>
-          <a:noFill/>
-        </p:spPr>
-        <p:style>
-          <a:lnRef idx="1">
-            <a:schemeClr val="accent1"/>
-          </a:lnRef>
-          <a:fillRef idx="3">
-            <a:schemeClr val="accent1"/>
-          </a:fillRef>
-          <a:effectRef idx="2">
-            <a:schemeClr val="accent1"/>
-          </a:effectRef>
-          <a:fontRef idx="minor">
-            <a:schemeClr val="lt1"/>
-          </a:fontRef>
-        </p:style>
-        <p:txBody>
-          <a:bodyPr rtlCol="0" anchor="ctr"/>
-          <a:lstStyle/>
-          <a:p>
-            <a:pPr algn="ctr"/>
-            <a:endParaRPr lang="en-US"/>
-          </a:p>
-        </p:txBody>
-      </p:sp>
       <p:cxnSp>
         <p:nvCxnSpPr>
           <p:cNvPr id="44" name="Straight Arrow Connector 43"/>
@@ -19334,6 +19555,119 @@
     <p:extLst>
       <p:ext uri="{BB962C8B-B14F-4D97-AF65-F5344CB8AC3E}">
         <p14:creationId xmlns:p14="http://schemas.microsoft.com/office/powerpoint/2010/main" val="1467706622"/>
+      </p:ext>
+    </p:extLst>
+  </p:cSld>
+  <p:clrMapOvr>
+    <a:masterClrMapping/>
+  </p:clrMapOvr>
+</p:sld>
+</file>
+
+<file path=ppt/slides/slide22.xml><?xml version="1.0" encoding="utf-8"?>
+<p:sld xmlns:a="http://schemas.openxmlformats.org/drawingml/2006/main" xmlns:r="http://schemas.openxmlformats.org/officeDocument/2006/relationships" xmlns:p="http://schemas.openxmlformats.org/presentationml/2006/main">
+  <p:cSld>
+    <p:spTree>
+      <p:nvGrpSpPr>
+        <p:cNvPr id="1" name=""/>
+        <p:cNvGrpSpPr/>
+        <p:nvPr/>
+      </p:nvGrpSpPr>
+      <p:grpSpPr>
+        <a:xfrm>
+          <a:off x="0" y="0"/>
+          <a:ext cx="0" cy="0"/>
+          <a:chOff x="0" y="0"/>
+          <a:chExt cx="0" cy="0"/>
+        </a:xfrm>
+      </p:grpSpPr>
+      <p:pic>
+        <p:nvPicPr>
+          <p:cNvPr id="4" name="Picture 3"/>
+          <p:cNvPicPr>
+            <a:picLocks noChangeAspect="1"/>
+          </p:cNvPicPr>
+          <p:nvPr/>
+        </p:nvPicPr>
+        <p:blipFill>
+          <a:blip r:embed="rId2"/>
+          <a:stretch>
+            <a:fillRect/>
+          </a:stretch>
+        </p:blipFill>
+        <p:spPr>
+          <a:xfrm>
+            <a:off x="622301" y="714963"/>
+            <a:ext cx="4958648" cy="4948296"/>
+          </a:xfrm>
+          <a:prstGeom prst="rect">
+            <a:avLst/>
+          </a:prstGeom>
+        </p:spPr>
+      </p:pic>
+      <p:pic>
+        <p:nvPicPr>
+          <p:cNvPr id="5" name="Picture 4"/>
+          <p:cNvPicPr>
+            <a:picLocks noChangeAspect="1"/>
+          </p:cNvPicPr>
+          <p:nvPr/>
+        </p:nvPicPr>
+        <p:blipFill>
+          <a:blip r:embed="rId3"/>
+          <a:stretch>
+            <a:fillRect/>
+          </a:stretch>
+        </p:blipFill>
+        <p:spPr>
+          <a:xfrm>
+            <a:off x="5716882" y="2191925"/>
+            <a:ext cx="1460909" cy="2220150"/>
+          </a:xfrm>
+          <a:prstGeom prst="rect">
+            <a:avLst/>
+          </a:prstGeom>
+          <a:ln w="38100" cmpd="sng">
+            <a:solidFill>
+              <a:srgbClr val="000000"/>
+            </a:solidFill>
+          </a:ln>
+        </p:spPr>
+      </p:pic>
+      <p:sp>
+        <p:nvSpPr>
+          <p:cNvPr id="6" name="TextBox 5"/>
+          <p:cNvSpPr txBox="1"/>
+          <p:nvPr/>
+        </p:nvSpPr>
+        <p:spPr>
+          <a:xfrm>
+            <a:off x="6114810" y="4459111"/>
+            <a:ext cx="1063037" cy="307777"/>
+          </a:xfrm>
+          <a:prstGeom prst="rect">
+            <a:avLst/>
+          </a:prstGeom>
+          <a:noFill/>
+        </p:spPr>
+        <p:txBody>
+          <a:bodyPr wrap="square" rtlCol="0">
+            <a:spAutoFit/>
+          </a:bodyPr>
+          <a:lstStyle/>
+          <a:p>
+            <a:r>
+              <a:rPr lang="en-US" sz="1400" dirty="0" smtClean="0"/>
+              <a:t>Legend</a:t>
+            </a:r>
+            <a:endParaRPr lang="en-US" sz="1400" dirty="0"/>
+          </a:p>
+        </p:txBody>
+      </p:sp>
+    </p:spTree>
+    <p:extLst>
+      <p:ext uri="{BB962C8B-B14F-4D97-AF65-F5344CB8AC3E}">
+        <p14:creationId xmlns:p14="http://schemas.microsoft.com/office/powerpoint/2010/main" val="387987249"/>
       </p:ext>
     </p:extLst>
   </p:cSld>

</xml_diff>